<commit_message>
updates to project presentation
</commit_message>
<xml_diff>
--- a/project/april_11/john.pptx
+++ b/project/april_11/john.pptx
@@ -10,9 +10,14 @@
     <p:sldId id="285" r:id="rId4"/>
     <p:sldId id="279" r:id="rId5"/>
     <p:sldId id="280" r:id="rId6"/>
-    <p:sldId id="281" r:id="rId7"/>
-    <p:sldId id="282" r:id="rId8"/>
-    <p:sldId id="283" r:id="rId9"/>
+    <p:sldId id="286" r:id="rId7"/>
+    <p:sldId id="287" r:id="rId8"/>
+    <p:sldId id="281" r:id="rId9"/>
+    <p:sldId id="288" r:id="rId10"/>
+    <p:sldId id="289" r:id="rId11"/>
+    <p:sldId id="290" r:id="rId12"/>
+    <p:sldId id="282" r:id="rId13"/>
+    <p:sldId id="283" r:id="rId14"/>
   </p:sldIdLst>
   <p:sldSz cx="9144000" cy="6858000" type="screen4x3"/>
   <p:notesSz cx="6858000" cy="9144000"/>
@@ -3205,6 +3210,498 @@
 </p:sld>
 </file>
 
+<file path=ppt/slides/slide10.xml><?xml version="1.0" encoding="utf-8"?>
+<p:sld xmlns:a="http://schemas.openxmlformats.org/drawingml/2006/main" xmlns:r="http://schemas.openxmlformats.org/officeDocument/2006/relationships" xmlns:mc="http://schemas.openxmlformats.org/markup-compatibility/2006" xmlns:mv="urn:schemas-microsoft-com:mac:vml" xmlns:p="http://schemas.openxmlformats.org/presentationml/2006/main" mc:Ignorable="mv" mc:PreserveAttributes="mv:*">
+  <p:cSld>
+    <p:spTree>
+      <p:nvGrpSpPr>
+        <p:cNvPr id="1" name=""/>
+        <p:cNvGrpSpPr/>
+        <p:nvPr/>
+      </p:nvGrpSpPr>
+      <p:grpSpPr>
+        <a:xfrm>
+          <a:off x="0" y="0"/>
+          <a:ext cx="0" cy="0"/>
+          <a:chOff x="0" y="0"/>
+          <a:chExt cx="0" cy="0"/>
+        </a:xfrm>
+      </p:grpSpPr>
+      <p:pic>
+        <p:nvPicPr>
+          <p:cNvPr id="4" name="Picture 3" descr="simulations.png"/>
+          <p:cNvPicPr>
+            <a:picLocks noChangeAspect="1"/>
+          </p:cNvPicPr>
+          <p:nvPr/>
+        </p:nvPicPr>
+        <p:blipFill>
+          <a:blip r:embed="rId2"/>
+          <a:stretch>
+            <a:fillRect/>
+          </a:stretch>
+        </p:blipFill>
+        <p:spPr>
+          <a:xfrm>
+            <a:off x="0" y="0"/>
+            <a:ext cx="9144000" cy="6858000"/>
+          </a:xfrm>
+          <a:prstGeom prst="rect">
+            <a:avLst/>
+          </a:prstGeom>
+        </p:spPr>
+      </p:pic>
+      <p:sp>
+        <p:nvSpPr>
+          <p:cNvPr id="5" name="TextBox 4"/>
+          <p:cNvSpPr txBox="1"/>
+          <p:nvPr/>
+        </p:nvSpPr>
+        <p:spPr>
+          <a:xfrm>
+            <a:off x="-1" y="0"/>
+            <a:ext cx="9144001" cy="646331"/>
+          </a:xfrm>
+          <a:prstGeom prst="rect">
+            <a:avLst/>
+          </a:prstGeom>
+          <a:noFill/>
+        </p:spPr>
+        <p:txBody>
+          <a:bodyPr wrap="square" rtlCol="0">
+            <a:spAutoFit/>
+          </a:bodyPr>
+          <a:lstStyle/>
+          <a:p>
+            <a:pPr algn="ctr"/>
+            <a:r>
+              <a:rPr lang="en-US" sz="3600" b="1">
+                <a:solidFill>
+                  <a:schemeClr val="bg1"/>
+                </a:solidFill>
+                <a:effectLst>
+                  <a:outerShdw blurRad="50800" dist="38100" dir="2700000">
+                    <a:srgbClr val="000000">
+                      <a:alpha val="43000"/>
+                    </a:srgbClr>
+                  </a:outerShdw>
+                </a:effectLst>
+                <a:latin typeface="Helvetica Neue"/>
+                <a:cs typeface="Helvetica Neue"/>
+              </a:rPr>
+              <a:t>Step Response</a:t>
+            </a:r>
+          </a:p>
+        </p:txBody>
+      </p:sp>
+      <p:pic>
+        <p:nvPicPr>
+          <p:cNvPr id="7" name="Picture 6" descr="tran1.png"/>
+          <p:cNvPicPr>
+            <a:picLocks noChangeAspect="1"/>
+          </p:cNvPicPr>
+          <p:nvPr/>
+        </p:nvPicPr>
+        <p:blipFill>
+          <a:blip r:embed="rId3"/>
+          <a:stretch>
+            <a:fillRect/>
+          </a:stretch>
+        </p:blipFill>
+        <p:spPr>
+          <a:xfrm>
+            <a:off x="1211070" y="3685039"/>
+            <a:ext cx="6634221" cy="1624002"/>
+          </a:xfrm>
+          <a:prstGeom prst="rect">
+            <a:avLst/>
+          </a:prstGeom>
+        </p:spPr>
+      </p:pic>
+      <p:pic>
+        <p:nvPicPr>
+          <p:cNvPr id="8" name="Picture 7" descr="tran2.png"/>
+          <p:cNvPicPr>
+            <a:picLocks noChangeAspect="1"/>
+          </p:cNvPicPr>
+          <p:nvPr/>
+        </p:nvPicPr>
+        <p:blipFill>
+          <a:blip r:embed="rId4"/>
+          <a:stretch>
+            <a:fillRect/>
+          </a:stretch>
+        </p:blipFill>
+        <p:spPr>
+          <a:xfrm>
+            <a:off x="1211070" y="1413023"/>
+            <a:ext cx="6517912" cy="1615899"/>
+          </a:xfrm>
+          <a:prstGeom prst="rect">
+            <a:avLst/>
+          </a:prstGeom>
+        </p:spPr>
+      </p:pic>
+    </p:spTree>
+  </p:cSld>
+  <p:clrMapOvr>
+    <a:masterClrMapping/>
+  </p:clrMapOvr>
+  <p:timing>
+    <p:tnLst>
+      <p:par>
+        <p:cTn id="1" dur="indefinite" restart="never" nodeType="tmRoot"/>
+      </p:par>
+    </p:tnLst>
+  </p:timing>
+</p:sld>
+</file>
+
+<file path=ppt/slides/slide11.xml><?xml version="1.0" encoding="utf-8"?>
+<p:sld xmlns:a="http://schemas.openxmlformats.org/drawingml/2006/main" xmlns:r="http://schemas.openxmlformats.org/officeDocument/2006/relationships" xmlns:mc="http://schemas.openxmlformats.org/markup-compatibility/2006" xmlns:mv="urn:schemas-microsoft-com:mac:vml" xmlns:p="http://schemas.openxmlformats.org/presentationml/2006/main" mc:Ignorable="mv" mc:PreserveAttributes="mv:*">
+  <p:cSld>
+    <p:spTree>
+      <p:nvGrpSpPr>
+        <p:cNvPr id="1" name=""/>
+        <p:cNvGrpSpPr/>
+        <p:nvPr/>
+      </p:nvGrpSpPr>
+      <p:grpSpPr>
+        <a:xfrm>
+          <a:off x="0" y="0"/>
+          <a:ext cx="0" cy="0"/>
+          <a:chOff x="0" y="0"/>
+          <a:chExt cx="0" cy="0"/>
+        </a:xfrm>
+      </p:grpSpPr>
+      <p:pic>
+        <p:nvPicPr>
+          <p:cNvPr id="4" name="Picture 3" descr="simulations.png"/>
+          <p:cNvPicPr>
+            <a:picLocks noChangeAspect="1"/>
+          </p:cNvPicPr>
+          <p:nvPr/>
+        </p:nvPicPr>
+        <p:blipFill>
+          <a:blip r:embed="rId2"/>
+          <a:stretch>
+            <a:fillRect/>
+          </a:stretch>
+        </p:blipFill>
+        <p:spPr>
+          <a:xfrm>
+            <a:off x="0" y="0"/>
+            <a:ext cx="9144000" cy="6858000"/>
+          </a:xfrm>
+          <a:prstGeom prst="rect">
+            <a:avLst/>
+          </a:prstGeom>
+        </p:spPr>
+      </p:pic>
+      <p:sp>
+        <p:nvSpPr>
+          <p:cNvPr id="5" name="TextBox 4"/>
+          <p:cNvSpPr txBox="1"/>
+          <p:nvPr/>
+        </p:nvSpPr>
+        <p:spPr>
+          <a:xfrm>
+            <a:off x="-1" y="0"/>
+            <a:ext cx="9144001" cy="646331"/>
+          </a:xfrm>
+          <a:prstGeom prst="rect">
+            <a:avLst/>
+          </a:prstGeom>
+          <a:noFill/>
+        </p:spPr>
+        <p:txBody>
+          <a:bodyPr wrap="square" rtlCol="0">
+            <a:spAutoFit/>
+          </a:bodyPr>
+          <a:lstStyle/>
+          <a:p>
+            <a:pPr algn="ctr"/>
+            <a:r>
+              <a:rPr lang="en-US" sz="3600" b="1">
+                <a:solidFill>
+                  <a:schemeClr val="bg1"/>
+                </a:solidFill>
+                <a:effectLst>
+                  <a:outerShdw blurRad="50800" dist="38100" dir="2700000">
+                    <a:srgbClr val="000000">
+                      <a:alpha val="43000"/>
+                    </a:srgbClr>
+                  </a:outerShdw>
+                </a:effectLst>
+                <a:latin typeface="Helvetica Neue"/>
+                <a:cs typeface="Helvetica Neue"/>
+              </a:rPr>
+              <a:t>DC Sweep VREF</a:t>
+            </a:r>
+          </a:p>
+        </p:txBody>
+      </p:sp>
+      <p:pic>
+        <p:nvPicPr>
+          <p:cNvPr id="6" name="Picture 5" descr="Vout_vs_Vref.png"/>
+          <p:cNvPicPr>
+            <a:picLocks noChangeAspect="1"/>
+          </p:cNvPicPr>
+          <p:nvPr/>
+        </p:nvPicPr>
+        <p:blipFill>
+          <a:blip r:embed="rId3"/>
+          <a:stretch>
+            <a:fillRect/>
+          </a:stretch>
+        </p:blipFill>
+        <p:spPr>
+          <a:xfrm>
+            <a:off x="764755" y="1026125"/>
+            <a:ext cx="7815152" cy="4230494"/>
+          </a:xfrm>
+          <a:prstGeom prst="rect">
+            <a:avLst/>
+          </a:prstGeom>
+        </p:spPr>
+      </p:pic>
+    </p:spTree>
+  </p:cSld>
+  <p:clrMapOvr>
+    <a:masterClrMapping/>
+  </p:clrMapOvr>
+  <p:timing>
+    <p:tnLst>
+      <p:par>
+        <p:cTn id="1" dur="indefinite" restart="never" nodeType="tmRoot"/>
+      </p:par>
+    </p:tnLst>
+  </p:timing>
+</p:sld>
+</file>
+
+<file path=ppt/slides/slide12.xml><?xml version="1.0" encoding="utf-8"?>
+<p:sld xmlns:a="http://schemas.openxmlformats.org/drawingml/2006/main" xmlns:r="http://schemas.openxmlformats.org/officeDocument/2006/relationships" xmlns:mc="http://schemas.openxmlformats.org/markup-compatibility/2006" xmlns:mv="urn:schemas-microsoft-com:mac:vml" xmlns:p="http://schemas.openxmlformats.org/presentationml/2006/main" mc:Ignorable="mv" mc:PreserveAttributes="mv:*">
+  <p:cSld>
+    <p:spTree>
+      <p:nvGrpSpPr>
+        <p:cNvPr id="1" name=""/>
+        <p:cNvGrpSpPr/>
+        <p:nvPr/>
+      </p:nvGrpSpPr>
+      <p:grpSpPr>
+        <a:xfrm>
+          <a:off x="0" y="0"/>
+          <a:ext cx="0" cy="0"/>
+          <a:chOff x="0" y="0"/>
+          <a:chExt cx="0" cy="0"/>
+        </a:xfrm>
+      </p:grpSpPr>
+      <p:pic>
+        <p:nvPicPr>
+          <p:cNvPr id="4" name="Picture 3" descr="layout.png"/>
+          <p:cNvPicPr>
+            <a:picLocks noChangeAspect="1"/>
+          </p:cNvPicPr>
+          <p:nvPr/>
+        </p:nvPicPr>
+        <p:blipFill>
+          <a:blip r:embed="rId2"/>
+          <a:stretch>
+            <a:fillRect/>
+          </a:stretch>
+        </p:blipFill>
+        <p:spPr>
+          <a:xfrm>
+            <a:off x="0" y="0"/>
+            <a:ext cx="9144000" cy="6858000"/>
+          </a:xfrm>
+          <a:prstGeom prst="rect">
+            <a:avLst/>
+          </a:prstGeom>
+        </p:spPr>
+      </p:pic>
+      <p:sp>
+        <p:nvSpPr>
+          <p:cNvPr id="5" name="TextBox 4"/>
+          <p:cNvSpPr txBox="1"/>
+          <p:nvPr/>
+        </p:nvSpPr>
+        <p:spPr>
+          <a:xfrm>
+            <a:off x="-1" y="0"/>
+            <a:ext cx="9144001" cy="646331"/>
+          </a:xfrm>
+          <a:prstGeom prst="rect">
+            <a:avLst/>
+          </a:prstGeom>
+          <a:noFill/>
+        </p:spPr>
+        <p:txBody>
+          <a:bodyPr wrap="square" rtlCol="0">
+            <a:spAutoFit/>
+          </a:bodyPr>
+          <a:lstStyle/>
+          <a:p>
+            <a:pPr algn="ctr"/>
+            <a:r>
+              <a:rPr lang="en-US" sz="3600" b="1">
+                <a:solidFill>
+                  <a:schemeClr val="bg1"/>
+                </a:solidFill>
+                <a:effectLst>
+                  <a:outerShdw blurRad="50800" dist="38100" dir="2700000">
+                    <a:srgbClr val="000000">
+                      <a:alpha val="43000"/>
+                    </a:srgbClr>
+                  </a:outerShdw>
+                </a:effectLst>
+                <a:latin typeface="Helvetica Neue"/>
+                <a:cs typeface="Helvetica Neue"/>
+              </a:rPr>
+              <a:t>XXX</a:t>
+            </a:r>
+          </a:p>
+        </p:txBody>
+      </p:sp>
+    </p:spTree>
+  </p:cSld>
+  <p:clrMapOvr>
+    <a:masterClrMapping/>
+  </p:clrMapOvr>
+  <p:timing>
+    <p:tnLst>
+      <p:par>
+        <p:cTn id="1" dur="indefinite" restart="never" nodeType="tmRoot"/>
+      </p:par>
+    </p:tnLst>
+  </p:timing>
+</p:sld>
+</file>
+
+<file path=ppt/slides/slide13.xml><?xml version="1.0" encoding="utf-8"?>
+<p:sld xmlns:a="http://schemas.openxmlformats.org/drawingml/2006/main" xmlns:r="http://schemas.openxmlformats.org/officeDocument/2006/relationships" xmlns:mc="http://schemas.openxmlformats.org/markup-compatibility/2006" xmlns:mv="urn:schemas-microsoft-com:mac:vml" xmlns:p="http://schemas.openxmlformats.org/presentationml/2006/main" mc:Ignorable="mv" mc:PreserveAttributes="mv:*">
+  <p:cSld>
+    <p:spTree>
+      <p:nvGrpSpPr>
+        <p:cNvPr id="1" name=""/>
+        <p:cNvGrpSpPr/>
+        <p:nvPr/>
+      </p:nvGrpSpPr>
+      <p:grpSpPr>
+        <a:xfrm>
+          <a:off x="0" y="0"/>
+          <a:ext cx="0" cy="0"/>
+          <a:chOff x="0" y="0"/>
+          <a:chExt cx="0" cy="0"/>
+        </a:xfrm>
+      </p:grpSpPr>
+      <p:pic>
+        <p:nvPicPr>
+          <p:cNvPr id="4" name="Picture 3" descr="blank.png"/>
+          <p:cNvPicPr>
+            <a:picLocks noChangeAspect="1"/>
+          </p:cNvPicPr>
+          <p:nvPr/>
+        </p:nvPicPr>
+        <p:blipFill>
+          <a:blip r:embed="rId2"/>
+          <a:stretch>
+            <a:fillRect/>
+          </a:stretch>
+        </p:blipFill>
+        <p:spPr>
+          <a:xfrm>
+            <a:off x="0" y="0"/>
+            <a:ext cx="9144001" cy="6858001"/>
+          </a:xfrm>
+          <a:prstGeom prst="rect">
+            <a:avLst/>
+          </a:prstGeom>
+        </p:spPr>
+      </p:pic>
+      <p:sp>
+        <p:nvSpPr>
+          <p:cNvPr id="3" name="TextBox 2"/>
+          <p:cNvSpPr txBox="1"/>
+          <p:nvPr/>
+        </p:nvSpPr>
+        <p:spPr>
+          <a:xfrm>
+            <a:off x="-1" y="0"/>
+            <a:ext cx="9144001" cy="646331"/>
+          </a:xfrm>
+          <a:prstGeom prst="rect">
+            <a:avLst/>
+          </a:prstGeom>
+          <a:noFill/>
+        </p:spPr>
+        <p:txBody>
+          <a:bodyPr wrap="square" rtlCol="0">
+            <a:spAutoFit/>
+          </a:bodyPr>
+          <a:lstStyle/>
+          <a:p>
+            <a:pPr algn="ctr"/>
+            <a:r>
+              <a:rPr lang="en-US" sz="3600" b="1">
+                <a:solidFill>
+                  <a:schemeClr val="bg1"/>
+                </a:solidFill>
+                <a:effectLst>
+                  <a:outerShdw blurRad="50800" dist="38100" dir="2700000">
+                    <a:srgbClr val="000000">
+                      <a:alpha val="43000"/>
+                    </a:srgbClr>
+                  </a:outerShdw>
+                </a:effectLst>
+                <a:latin typeface="Helvetica Neue"/>
+                <a:cs typeface="Helvetica Neue"/>
+              </a:rPr>
+              <a:t>Thank You</a:t>
+            </a:r>
+          </a:p>
+        </p:txBody>
+      </p:sp>
+      <p:pic>
+        <p:nvPicPr>
+          <p:cNvPr id="5" name="Picture 4" descr="Question_mark_3d.png"/>
+          <p:cNvPicPr>
+            <a:picLocks noChangeAspect="1"/>
+          </p:cNvPicPr>
+          <p:nvPr/>
+        </p:nvPicPr>
+        <p:blipFill>
+          <a:blip r:embed="rId3"/>
+          <a:stretch>
+            <a:fillRect/>
+          </a:stretch>
+        </p:blipFill>
+        <p:spPr>
+          <a:xfrm>
+            <a:off x="3577038" y="1575998"/>
+            <a:ext cx="1720764" cy="3327529"/>
+          </a:xfrm>
+          <a:prstGeom prst="rect">
+            <a:avLst/>
+          </a:prstGeom>
+        </p:spPr>
+      </p:pic>
+    </p:spTree>
+  </p:cSld>
+  <p:clrMapOvr>
+    <a:masterClrMapping/>
+  </p:clrMapOvr>
+  <p:timing>
+    <p:tnLst>
+      <p:par>
+        <p:cTn id="1" dur="indefinite" restart="never" nodeType="tmRoot"/>
+      </p:par>
+    </p:tnLst>
+  </p:timing>
+</p:sld>
+</file>
+
 <file path=ppt/slides/slide2.xml><?xml version="1.0" encoding="utf-8"?>
 <p:sld xmlns:a="http://schemas.openxmlformats.org/drawingml/2006/main" xmlns:r="http://schemas.openxmlformats.org/officeDocument/2006/relationships" xmlns:mc="http://schemas.openxmlformats.org/markup-compatibility/2006" xmlns:mv="urn:schemas-microsoft-com:mac:vml" xmlns:p="http://schemas.openxmlformats.org/presentationml/2006/main" mc:Ignorable="mv" mc:PreserveAttributes="mv:*">
   <p:cSld>
@@ -6663,7 +7160,7 @@
                 <a:latin typeface="Helvetica Neue"/>
                 <a:cs typeface="Helvetica Neue"/>
               </a:rPr>
-              <a:t>Control System</a:t>
+              <a:t>Control System: PID</a:t>
             </a:r>
           </a:p>
         </p:txBody>
@@ -6702,7 +7199,7 @@
       </p:grpSpPr>
       <p:pic>
         <p:nvPicPr>
-          <p:cNvPr id="4" name="Picture 3" descr="simulations.png"/>
+          <p:cNvPr id="4" name="Picture 3" descr="schematics.png"/>
           <p:cNvPicPr>
             <a:picLocks noChangeAspect="1"/>
           </p:cNvPicPr>
@@ -6718,6 +7215,73 @@
           <a:xfrm>
             <a:off x="0" y="0"/>
             <a:ext cx="9144000" cy="6858000"/>
+          </a:xfrm>
+          <a:prstGeom prst="rect">
+            <a:avLst/>
+          </a:prstGeom>
+        </p:spPr>
+      </p:pic>
+      <p:sp>
+        <p:nvSpPr>
+          <p:cNvPr id="3" name="TextBox 2"/>
+          <p:cNvSpPr txBox="1"/>
+          <p:nvPr/>
+        </p:nvSpPr>
+        <p:spPr>
+          <a:xfrm>
+            <a:off x="-1" y="0"/>
+            <a:ext cx="9144001" cy="646331"/>
+          </a:xfrm>
+          <a:prstGeom prst="rect">
+            <a:avLst/>
+          </a:prstGeom>
+          <a:noFill/>
+        </p:spPr>
+        <p:txBody>
+          <a:bodyPr wrap="square" rtlCol="0">
+            <a:spAutoFit/>
+          </a:bodyPr>
+          <a:lstStyle/>
+          <a:p>
+            <a:pPr algn="ctr"/>
+            <a:r>
+              <a:rPr lang="en-US" sz="3600" b="1">
+                <a:solidFill>
+                  <a:schemeClr val="bg1"/>
+                </a:solidFill>
+                <a:effectLst>
+                  <a:outerShdw blurRad="50800" dist="38100" dir="2700000">
+                    <a:srgbClr val="000000">
+                      <a:alpha val="43000"/>
+                    </a:srgbClr>
+                  </a:outerShdw>
+                </a:effectLst>
+                <a:latin typeface="Helvetica Neue"/>
+                <a:cs typeface="Helvetica Neue"/>
+              </a:rPr>
+              <a:t>Control System: PID</a:t>
+            </a:r>
+          </a:p>
+        </p:txBody>
+      </p:sp>
+      <p:pic>
+        <p:nvPicPr>
+          <p:cNvPr id="5" name="Picture 4" descr="pid_big.png"/>
+          <p:cNvPicPr>
+            <a:picLocks noChangeAspect="1"/>
+          </p:cNvPicPr>
+          <p:nvPr/>
+        </p:nvPicPr>
+        <p:blipFill>
+          <a:blip r:embed="rId3"/>
+          <a:stretch>
+            <a:fillRect/>
+          </a:stretch>
+        </p:blipFill>
+        <p:spPr>
+          <a:xfrm>
+            <a:off x="482721" y="950427"/>
+            <a:ext cx="8287346" cy="4494734"/>
           </a:xfrm>
           <a:prstGeom prst="rect">
             <a:avLst/>
@@ -6758,7 +7322,7 @@
       </p:grpSpPr>
       <p:pic>
         <p:nvPicPr>
-          <p:cNvPr id="4" name="Picture 3" descr="layout.png"/>
+          <p:cNvPr id="4" name="Picture 3" descr="schematics.png"/>
           <p:cNvPicPr>
             <a:picLocks noChangeAspect="1"/>
           </p:cNvPicPr>
@@ -6774,6 +7338,73 @@
           <a:xfrm>
             <a:off x="0" y="0"/>
             <a:ext cx="9144000" cy="6858000"/>
+          </a:xfrm>
+          <a:prstGeom prst="rect">
+            <a:avLst/>
+          </a:prstGeom>
+        </p:spPr>
+      </p:pic>
+      <p:sp>
+        <p:nvSpPr>
+          <p:cNvPr id="3" name="TextBox 2"/>
+          <p:cNvSpPr txBox="1"/>
+          <p:nvPr/>
+        </p:nvSpPr>
+        <p:spPr>
+          <a:xfrm>
+            <a:off x="-1" y="0"/>
+            <a:ext cx="9144001" cy="646331"/>
+          </a:xfrm>
+          <a:prstGeom prst="rect">
+            <a:avLst/>
+          </a:prstGeom>
+          <a:noFill/>
+        </p:spPr>
+        <p:txBody>
+          <a:bodyPr wrap="square" rtlCol="0">
+            <a:spAutoFit/>
+          </a:bodyPr>
+          <a:lstStyle/>
+          <a:p>
+            <a:pPr algn="ctr"/>
+            <a:r>
+              <a:rPr lang="en-US" sz="3600" b="1">
+                <a:solidFill>
+                  <a:schemeClr val="bg1"/>
+                </a:solidFill>
+                <a:effectLst>
+                  <a:outerShdw blurRad="50800" dist="38100" dir="2700000">
+                    <a:srgbClr val="000000">
+                      <a:alpha val="43000"/>
+                    </a:srgbClr>
+                  </a:outerShdw>
+                </a:effectLst>
+                <a:latin typeface="Helvetica Neue"/>
+                <a:cs typeface="Helvetica Neue"/>
+              </a:rPr>
+              <a:t>Control System: PID</a:t>
+            </a:r>
+          </a:p>
+        </p:txBody>
+      </p:sp>
+      <p:pic>
+        <p:nvPicPr>
+          <p:cNvPr id="6" name="Picture 5" descr="reduced_schematic.png"/>
+          <p:cNvPicPr>
+            <a:picLocks noChangeAspect="1"/>
+          </p:cNvPicPr>
+          <p:nvPr/>
+        </p:nvPicPr>
+        <p:blipFill>
+          <a:blip r:embed="rId3"/>
+          <a:stretch>
+            <a:fillRect/>
+          </a:stretch>
+        </p:blipFill>
+        <p:spPr>
+          <a:xfrm>
+            <a:off x="379637" y="1522365"/>
+            <a:ext cx="8360671" cy="3262984"/>
           </a:xfrm>
           <a:prstGeom prst="rect">
             <a:avLst/>
@@ -6814,7 +7445,7 @@
       </p:grpSpPr>
       <p:pic>
         <p:nvPicPr>
-          <p:cNvPr id="4" name="Picture 3" descr="blank.png"/>
+          <p:cNvPr id="4" name="Picture 3" descr="simulations.png"/>
           <p:cNvPicPr>
             <a:picLocks noChangeAspect="1"/>
           </p:cNvPicPr>
@@ -6829,16 +7460,40 @@
         <p:spPr>
           <a:xfrm>
             <a:off x="0" y="0"/>
-            <a:ext cx="9144001" cy="6858001"/>
+            <a:ext cx="9144000" cy="6858000"/>
           </a:xfrm>
           <a:prstGeom prst="rect">
             <a:avLst/>
           </a:prstGeom>
         </p:spPr>
       </p:pic>
-      <p:sp>
-        <p:nvSpPr>
-          <p:cNvPr id="3" name="TextBox 2"/>
+      <p:pic>
+        <p:nvPicPr>
+          <p:cNvPr id="3" name="Picture 2" descr="dc_vout.png"/>
+          <p:cNvPicPr>
+            <a:picLocks noChangeAspect="1"/>
+          </p:cNvPicPr>
+          <p:nvPr/>
+        </p:nvPicPr>
+        <p:blipFill>
+          <a:blip r:embed="rId3"/>
+          <a:stretch>
+            <a:fillRect/>
+          </a:stretch>
+        </p:blipFill>
+        <p:spPr>
+          <a:xfrm>
+            <a:off x="302766" y="3048772"/>
+            <a:ext cx="8544774" cy="2133226"/>
+          </a:xfrm>
+          <a:prstGeom prst="rect">
+            <a:avLst/>
+          </a:prstGeom>
+        </p:spPr>
+      </p:pic>
+      <p:sp>
+        <p:nvSpPr>
+          <p:cNvPr id="5" name="TextBox 4"/>
           <p:cNvSpPr txBox="1"/>
           <p:nvPr/>
         </p:nvSpPr>
@@ -6874,14 +7529,113 @@
                 <a:latin typeface="Helvetica Neue"/>
                 <a:cs typeface="Helvetica Neue"/>
               </a:rPr>
-              <a:t>Thank You</a:t>
-            </a:r>
-          </a:p>
-        </p:txBody>
-      </p:sp>
+              <a:t>Steady State Output</a:t>
+            </a:r>
+          </a:p>
+        </p:txBody>
+      </p:sp>
+    </p:spTree>
+  </p:cSld>
+  <p:clrMapOvr>
+    <a:masterClrMapping/>
+  </p:clrMapOvr>
+  <p:timing>
+    <p:tnLst>
+      <p:par>
+        <p:cTn id="1" dur="indefinite" restart="never" nodeType="tmRoot"/>
+      </p:par>
+    </p:tnLst>
+  </p:timing>
+</p:sld>
+</file>
+
+<file path=ppt/slides/slide9.xml><?xml version="1.0" encoding="utf-8"?>
+<p:sld xmlns:a="http://schemas.openxmlformats.org/drawingml/2006/main" xmlns:r="http://schemas.openxmlformats.org/officeDocument/2006/relationships" xmlns:mc="http://schemas.openxmlformats.org/markup-compatibility/2006" xmlns:mv="urn:schemas-microsoft-com:mac:vml" xmlns:p="http://schemas.openxmlformats.org/presentationml/2006/main" mc:Ignorable="mv" mc:PreserveAttributes="mv:*">
+  <p:cSld>
+    <p:spTree>
+      <p:nvGrpSpPr>
+        <p:cNvPr id="1" name=""/>
+        <p:cNvGrpSpPr/>
+        <p:nvPr/>
+      </p:nvGrpSpPr>
+      <p:grpSpPr>
+        <a:xfrm>
+          <a:off x="0" y="0"/>
+          <a:ext cx="0" cy="0"/>
+          <a:chOff x="0" y="0"/>
+          <a:chExt cx="0" cy="0"/>
+        </a:xfrm>
+      </p:grpSpPr>
       <p:pic>
         <p:nvPicPr>
-          <p:cNvPr id="5" name="Picture 4" descr="Question_mark_3d.png"/>
+          <p:cNvPr id="4" name="Picture 3" descr="simulations.png"/>
+          <p:cNvPicPr>
+            <a:picLocks noChangeAspect="1"/>
+          </p:cNvPicPr>
+          <p:nvPr/>
+        </p:nvPicPr>
+        <p:blipFill>
+          <a:blip r:embed="rId2"/>
+          <a:stretch>
+            <a:fillRect/>
+          </a:stretch>
+        </p:blipFill>
+        <p:spPr>
+          <a:xfrm>
+            <a:off x="0" y="0"/>
+            <a:ext cx="9144000" cy="6858000"/>
+          </a:xfrm>
+          <a:prstGeom prst="rect">
+            <a:avLst/>
+          </a:prstGeom>
+        </p:spPr>
+      </p:pic>
+      <p:sp>
+        <p:nvSpPr>
+          <p:cNvPr id="5" name="TextBox 4"/>
+          <p:cNvSpPr txBox="1"/>
+          <p:nvPr/>
+        </p:nvSpPr>
+        <p:spPr>
+          <a:xfrm>
+            <a:off x="-1" y="0"/>
+            <a:ext cx="9144001" cy="646331"/>
+          </a:xfrm>
+          <a:prstGeom prst="rect">
+            <a:avLst/>
+          </a:prstGeom>
+          <a:noFill/>
+        </p:spPr>
+        <p:txBody>
+          <a:bodyPr wrap="square" rtlCol="0">
+            <a:spAutoFit/>
+          </a:bodyPr>
+          <a:lstStyle/>
+          <a:p>
+            <a:pPr algn="ctr"/>
+            <a:r>
+              <a:rPr lang="en-US" sz="3600" b="1">
+                <a:solidFill>
+                  <a:schemeClr val="bg1"/>
+                </a:solidFill>
+                <a:effectLst>
+                  <a:outerShdw blurRad="50800" dist="38100" dir="2700000">
+                    <a:srgbClr val="000000">
+                      <a:alpha val="43000"/>
+                    </a:srgbClr>
+                  </a:outerShdw>
+                </a:effectLst>
+                <a:latin typeface="Helvetica Neue"/>
+                <a:cs typeface="Helvetica Neue"/>
+              </a:rPr>
+              <a:t>Steady State Output</a:t>
+            </a:r>
+          </a:p>
+        </p:txBody>
+      </p:sp>
+      <p:pic>
+        <p:nvPicPr>
+          <p:cNvPr id="6" name="Picture 5" descr="out.png"/>
           <p:cNvPicPr>
             <a:picLocks noChangeAspect="1"/>
           </p:cNvPicPr>
@@ -6895,8 +7649,8 @@
         </p:blipFill>
         <p:spPr>
           <a:xfrm>
-            <a:off x="3577038" y="1575998"/>
-            <a:ext cx="1720764" cy="3327529"/>
+            <a:off x="558863" y="1017713"/>
+            <a:ext cx="8014058" cy="4349296"/>
           </a:xfrm>
           <a:prstGeom prst="rect">
             <a:avLst/>

</xml_diff>

<commit_message>
added PID diagram to deck
</commit_message>
<xml_diff>
--- a/project/april_11/john.pptx
+++ b/project/april_11/john.pptx
@@ -16,8 +16,9 @@
     <p:sldId id="288" r:id="rId10"/>
     <p:sldId id="289" r:id="rId11"/>
     <p:sldId id="290" r:id="rId12"/>
-    <p:sldId id="282" r:id="rId13"/>
-    <p:sldId id="283" r:id="rId14"/>
+    <p:sldId id="291" r:id="rId13"/>
+    <p:sldId id="282" r:id="rId14"/>
+    <p:sldId id="283" r:id="rId15"/>
   </p:sldIdLst>
   <p:sldSz cx="9144000" cy="6858000" type="screen4x3"/>
   <p:notesSz cx="6858000" cy="9144000"/>
@@ -3499,7 +3500,7 @@
       </p:grpSpPr>
       <p:pic>
         <p:nvPicPr>
-          <p:cNvPr id="4" name="Picture 3" descr="layout.png"/>
+          <p:cNvPr id="4" name="Picture 3" descr="simulations.png"/>
           <p:cNvPicPr>
             <a:picLocks noChangeAspect="1"/>
           </p:cNvPicPr>
@@ -3559,11 +3560,35 @@
                 <a:latin typeface="Helvetica Neue"/>
                 <a:cs typeface="Helvetica Neue"/>
               </a:rPr>
-              <a:t>XXX</a:t>
-            </a:r>
-          </a:p>
-        </p:txBody>
-      </p:sp>
+              <a:t>Loop Gain</a:t>
+            </a:r>
+          </a:p>
+        </p:txBody>
+      </p:sp>
+      <p:pic>
+        <p:nvPicPr>
+          <p:cNvPr id="7" name="Picture 6" descr="loopgain.png"/>
+          <p:cNvPicPr>
+            <a:picLocks noChangeAspect="1"/>
+          </p:cNvPicPr>
+          <p:nvPr/>
+        </p:nvPicPr>
+        <p:blipFill>
+          <a:blip r:embed="rId3"/>
+          <a:stretch>
+            <a:fillRect/>
+          </a:stretch>
+        </p:blipFill>
+        <p:spPr>
+          <a:xfrm>
+            <a:off x="563482" y="969316"/>
+            <a:ext cx="8105485" cy="4390470"/>
+          </a:xfrm>
+          <a:prstGeom prst="rect">
+            <a:avLst/>
+          </a:prstGeom>
+        </p:spPr>
+      </p:pic>
     </p:spTree>
   </p:cSld>
   <p:clrMapOvr>
@@ -3580,6 +3605,105 @@
 </file>
 
 <file path=ppt/slides/slide13.xml><?xml version="1.0" encoding="utf-8"?>
+<p:sld xmlns:a="http://schemas.openxmlformats.org/drawingml/2006/main" xmlns:r="http://schemas.openxmlformats.org/officeDocument/2006/relationships" xmlns:mc="http://schemas.openxmlformats.org/markup-compatibility/2006" xmlns:mv="urn:schemas-microsoft-com:mac:vml" xmlns:p="http://schemas.openxmlformats.org/presentationml/2006/main" mc:Ignorable="mv" mc:PreserveAttributes="mv:*">
+  <p:cSld>
+    <p:spTree>
+      <p:nvGrpSpPr>
+        <p:cNvPr id="1" name=""/>
+        <p:cNvGrpSpPr/>
+        <p:nvPr/>
+      </p:nvGrpSpPr>
+      <p:grpSpPr>
+        <a:xfrm>
+          <a:off x="0" y="0"/>
+          <a:ext cx="0" cy="0"/>
+          <a:chOff x="0" y="0"/>
+          <a:chExt cx="0" cy="0"/>
+        </a:xfrm>
+      </p:grpSpPr>
+      <p:pic>
+        <p:nvPicPr>
+          <p:cNvPr id="4" name="Picture 3" descr="layout.png"/>
+          <p:cNvPicPr>
+            <a:picLocks noChangeAspect="1"/>
+          </p:cNvPicPr>
+          <p:nvPr/>
+        </p:nvPicPr>
+        <p:blipFill>
+          <a:blip r:embed="rId2"/>
+          <a:stretch>
+            <a:fillRect/>
+          </a:stretch>
+        </p:blipFill>
+        <p:spPr>
+          <a:xfrm>
+            <a:off x="0" y="0"/>
+            <a:ext cx="9144000" cy="6858000"/>
+          </a:xfrm>
+          <a:prstGeom prst="rect">
+            <a:avLst/>
+          </a:prstGeom>
+        </p:spPr>
+      </p:pic>
+      <p:sp>
+        <p:nvSpPr>
+          <p:cNvPr id="5" name="TextBox 4"/>
+          <p:cNvSpPr txBox="1"/>
+          <p:nvPr/>
+        </p:nvSpPr>
+        <p:spPr>
+          <a:xfrm>
+            <a:off x="-1" y="0"/>
+            <a:ext cx="9144001" cy="646331"/>
+          </a:xfrm>
+          <a:prstGeom prst="rect">
+            <a:avLst/>
+          </a:prstGeom>
+          <a:noFill/>
+        </p:spPr>
+        <p:txBody>
+          <a:bodyPr wrap="square" rtlCol="0">
+            <a:spAutoFit/>
+          </a:bodyPr>
+          <a:lstStyle/>
+          <a:p>
+            <a:pPr algn="ctr"/>
+            <a:r>
+              <a:rPr lang="en-US" sz="3600" b="1">
+                <a:solidFill>
+                  <a:schemeClr val="bg1"/>
+                </a:solidFill>
+                <a:effectLst>
+                  <a:outerShdw blurRad="50800" dist="38100" dir="2700000">
+                    <a:srgbClr val="000000">
+                      <a:alpha val="43000"/>
+                    </a:srgbClr>
+                  </a:outerShdw>
+                </a:effectLst>
+                <a:latin typeface="Helvetica Neue"/>
+                <a:cs typeface="Helvetica Neue"/>
+              </a:rPr>
+              <a:t>Layout</a:t>
+            </a:r>
+          </a:p>
+        </p:txBody>
+      </p:sp>
+    </p:spTree>
+  </p:cSld>
+  <p:clrMapOvr>
+    <a:masterClrMapping/>
+  </p:clrMapOvr>
+  <p:timing>
+    <p:tnLst>
+      <p:par>
+        <p:cTn id="1" dur="indefinite" restart="never" nodeType="tmRoot"/>
+      </p:par>
+    </p:tnLst>
+  </p:timing>
+</p:sld>
+</file>
+
+<file path=ppt/slides/slide14.xml><?xml version="1.0" encoding="utf-8"?>
 <p:sld xmlns:a="http://schemas.openxmlformats.org/drawingml/2006/main" xmlns:r="http://schemas.openxmlformats.org/officeDocument/2006/relationships" xmlns:mc="http://schemas.openxmlformats.org/markup-compatibility/2006" xmlns:mv="urn:schemas-microsoft-com:mac:vml" xmlns:p="http://schemas.openxmlformats.org/presentationml/2006/main" mc:Ignorable="mv" mc:PreserveAttributes="mv:*">
   <p:cSld>
     <p:spTree>
@@ -7107,7 +7231,7 @@
           <p:nvPr/>
         </p:nvPicPr>
         <p:blipFill>
-          <a:blip r:embed="rId2"/>
+          <a:blip r:embed="rId3"/>
           <a:stretch>
             <a:fillRect/>
           </a:stretch>
@@ -7161,6 +7285,991 @@
                 <a:cs typeface="Helvetica Neue"/>
               </a:rPr>
               <a:t>Control System: PID</a:t>
+            </a:r>
+          </a:p>
+        </p:txBody>
+      </p:sp>
+      <p:cxnSp>
+        <p:nvCxnSpPr>
+          <p:cNvPr id="6" name="Straight Arrow Connector 5"/>
+          <p:cNvCxnSpPr/>
+          <p:nvPr/>
+        </p:nvCxnSpPr>
+        <p:spPr>
+          <a:xfrm rot="10800000">
+            <a:off x="6316111" y="2797243"/>
+            <a:ext cx="446533" cy="1589"/>
+          </a:xfrm>
+          <a:prstGeom prst="straightConnector1">
+            <a:avLst/>
+          </a:prstGeom>
+          <a:ln>
+            <a:tailEnd type="arrow"/>
+          </a:ln>
+        </p:spPr>
+        <p:style>
+          <a:lnRef idx="2">
+            <a:schemeClr val="accent1"/>
+          </a:lnRef>
+          <a:fillRef idx="0">
+            <a:schemeClr val="accent1"/>
+          </a:fillRef>
+          <a:effectRef idx="1">
+            <a:schemeClr val="accent1"/>
+          </a:effectRef>
+          <a:fontRef idx="minor">
+            <a:schemeClr val="tx1"/>
+          </a:fontRef>
+        </p:style>
+      </p:cxnSp>
+      <p:sp>
+        <p:nvSpPr>
+          <p:cNvPr id="7" name="Oval 6"/>
+          <p:cNvSpPr/>
+          <p:nvPr/>
+        </p:nvSpPr>
+        <p:spPr>
+          <a:xfrm>
+            <a:off x="5648091" y="2464821"/>
+            <a:ext cx="668017" cy="668017"/>
+          </a:xfrm>
+          <a:prstGeom prst="ellipse">
+            <a:avLst/>
+          </a:prstGeom>
+        </p:spPr>
+        <p:style>
+          <a:lnRef idx="1">
+            <a:schemeClr val="accent1"/>
+          </a:lnRef>
+          <a:fillRef idx="3">
+            <a:schemeClr val="accent1"/>
+          </a:fillRef>
+          <a:effectRef idx="2">
+            <a:schemeClr val="accent1"/>
+          </a:effectRef>
+          <a:fontRef idx="minor">
+            <a:schemeClr val="lt1"/>
+          </a:fontRef>
+        </p:style>
+        <p:txBody>
+          <a:bodyPr rtlCol="0" anchor="ctr"/>
+          <a:lstStyle/>
+          <a:p>
+            <a:pPr algn="ctr"/>
+            <a:endParaRPr lang="en-US"/>
+          </a:p>
+        </p:txBody>
+      </p:sp>
+      <p:cxnSp>
+        <p:nvCxnSpPr>
+          <p:cNvPr id="10" name="Straight Arrow Connector 9"/>
+          <p:cNvCxnSpPr/>
+          <p:nvPr/>
+        </p:nvCxnSpPr>
+        <p:spPr>
+          <a:xfrm rot="5400000" flipH="1" flipV="1">
+            <a:off x="5572642" y="3538172"/>
+            <a:ext cx="810668" cy="1588"/>
+          </a:xfrm>
+          <a:prstGeom prst="straightConnector1">
+            <a:avLst/>
+          </a:prstGeom>
+          <a:ln>
+            <a:tailEnd type="arrow"/>
+          </a:ln>
+        </p:spPr>
+        <p:style>
+          <a:lnRef idx="2">
+            <a:schemeClr val="accent1"/>
+          </a:lnRef>
+          <a:fillRef idx="0">
+            <a:schemeClr val="accent1"/>
+          </a:fillRef>
+          <a:effectRef idx="1">
+            <a:schemeClr val="accent1"/>
+          </a:effectRef>
+          <a:fontRef idx="minor">
+            <a:schemeClr val="tx1"/>
+          </a:fontRef>
+        </p:style>
+      </p:cxnSp>
+      <p:cxnSp>
+        <p:nvCxnSpPr>
+          <p:cNvPr id="12" name="Straight Arrow Connector 11"/>
+          <p:cNvCxnSpPr/>
+          <p:nvPr/>
+        </p:nvCxnSpPr>
+        <p:spPr>
+          <a:xfrm rot="10800000" flipV="1">
+            <a:off x="4426646" y="2789238"/>
+            <a:ext cx="1221446" cy="9592"/>
+          </a:xfrm>
+          <a:prstGeom prst="straightConnector1">
+            <a:avLst/>
+          </a:prstGeom>
+          <a:ln>
+            <a:tailEnd type="arrow"/>
+          </a:ln>
+        </p:spPr>
+        <p:style>
+          <a:lnRef idx="2">
+            <a:schemeClr val="accent1"/>
+          </a:lnRef>
+          <a:fillRef idx="0">
+            <a:schemeClr val="accent1"/>
+          </a:fillRef>
+          <a:effectRef idx="1">
+            <a:schemeClr val="accent1"/>
+          </a:effectRef>
+          <a:fontRef idx="minor">
+            <a:schemeClr val="tx1"/>
+          </a:fontRef>
+        </p:style>
+      </p:cxnSp>
+      <p:cxnSp>
+        <p:nvCxnSpPr>
+          <p:cNvPr id="15" name="Straight Connector 14"/>
+          <p:cNvCxnSpPr/>
+          <p:nvPr/>
+        </p:nvCxnSpPr>
+        <p:spPr>
+          <a:xfrm rot="5400000">
+            <a:off x="4753554" y="2365038"/>
+            <a:ext cx="856049" cy="1588"/>
+          </a:xfrm>
+          <a:prstGeom prst="line">
+            <a:avLst/>
+          </a:prstGeom>
+        </p:spPr>
+        <p:style>
+          <a:lnRef idx="2">
+            <a:schemeClr val="accent1"/>
+          </a:lnRef>
+          <a:fillRef idx="0">
+            <a:schemeClr val="accent1"/>
+          </a:fillRef>
+          <a:effectRef idx="1">
+            <a:schemeClr val="accent1"/>
+          </a:effectRef>
+          <a:fontRef idx="minor">
+            <a:schemeClr val="tx1"/>
+          </a:fontRef>
+        </p:style>
+      </p:cxnSp>
+      <p:cxnSp>
+        <p:nvCxnSpPr>
+          <p:cNvPr id="18" name="Straight Connector 17"/>
+          <p:cNvCxnSpPr/>
+          <p:nvPr/>
+        </p:nvCxnSpPr>
+        <p:spPr>
+          <a:xfrm rot="5400000">
+            <a:off x="4751965" y="3220294"/>
+            <a:ext cx="856049" cy="1588"/>
+          </a:xfrm>
+          <a:prstGeom prst="line">
+            <a:avLst/>
+          </a:prstGeom>
+        </p:spPr>
+        <p:style>
+          <a:lnRef idx="2">
+            <a:schemeClr val="accent1"/>
+          </a:lnRef>
+          <a:fillRef idx="0">
+            <a:schemeClr val="accent1"/>
+          </a:fillRef>
+          <a:effectRef idx="1">
+            <a:schemeClr val="accent1"/>
+          </a:effectRef>
+          <a:fontRef idx="minor">
+            <a:schemeClr val="tx1"/>
+          </a:fontRef>
+        </p:style>
+      </p:cxnSp>
+      <p:cxnSp>
+        <p:nvCxnSpPr>
+          <p:cNvPr id="19" name="Straight Arrow Connector 18"/>
+          <p:cNvCxnSpPr/>
+          <p:nvPr/>
+        </p:nvCxnSpPr>
+        <p:spPr>
+          <a:xfrm rot="10800000" flipV="1">
+            <a:off x="4426647" y="1926040"/>
+            <a:ext cx="752551" cy="15946"/>
+          </a:xfrm>
+          <a:prstGeom prst="straightConnector1">
+            <a:avLst/>
+          </a:prstGeom>
+          <a:ln>
+            <a:tailEnd type="arrow"/>
+          </a:ln>
+        </p:spPr>
+        <p:style>
+          <a:lnRef idx="2">
+            <a:schemeClr val="accent1"/>
+          </a:lnRef>
+          <a:fillRef idx="0">
+            <a:schemeClr val="accent1"/>
+          </a:fillRef>
+          <a:effectRef idx="1">
+            <a:schemeClr val="accent1"/>
+          </a:effectRef>
+          <a:fontRef idx="minor">
+            <a:schemeClr val="tx1"/>
+          </a:fontRef>
+        </p:style>
+      </p:cxnSp>
+      <p:cxnSp>
+        <p:nvCxnSpPr>
+          <p:cNvPr id="20" name="Straight Arrow Connector 19"/>
+          <p:cNvCxnSpPr/>
+          <p:nvPr/>
+        </p:nvCxnSpPr>
+        <p:spPr>
+          <a:xfrm rot="10800000">
+            <a:off x="4426648" y="3645290"/>
+            <a:ext cx="752549" cy="1"/>
+          </a:xfrm>
+          <a:prstGeom prst="straightConnector1">
+            <a:avLst/>
+          </a:prstGeom>
+          <a:ln>
+            <a:tailEnd type="arrow"/>
+          </a:ln>
+        </p:spPr>
+        <p:style>
+          <a:lnRef idx="2">
+            <a:schemeClr val="accent1"/>
+          </a:lnRef>
+          <a:fillRef idx="0">
+            <a:schemeClr val="accent1"/>
+          </a:fillRef>
+          <a:effectRef idx="1">
+            <a:schemeClr val="accent1"/>
+          </a:effectRef>
+          <a:fontRef idx="minor">
+            <a:schemeClr val="tx1"/>
+          </a:fontRef>
+        </p:style>
+      </p:cxnSp>
+      <p:sp>
+        <p:nvSpPr>
+          <p:cNvPr id="21" name="Rounded Rectangle 20"/>
+          <p:cNvSpPr/>
+          <p:nvPr/>
+        </p:nvSpPr>
+        <p:spPr>
+          <a:xfrm>
+            <a:off x="3677027" y="1656136"/>
+            <a:ext cx="749619" cy="552516"/>
+          </a:xfrm>
+          <a:prstGeom prst="roundRect">
+            <a:avLst/>
+          </a:prstGeom>
+        </p:spPr>
+        <p:style>
+          <a:lnRef idx="1">
+            <a:schemeClr val="accent1"/>
+          </a:lnRef>
+          <a:fillRef idx="3">
+            <a:schemeClr val="accent1"/>
+          </a:fillRef>
+          <a:effectRef idx="2">
+            <a:schemeClr val="accent1"/>
+          </a:effectRef>
+          <a:fontRef idx="minor">
+            <a:schemeClr val="lt1"/>
+          </a:fontRef>
+        </p:style>
+        <p:txBody>
+          <a:bodyPr rtlCol="0" anchor="b"/>
+          <a:lstStyle/>
+          <a:p>
+            <a:pPr algn="ctr"/>
+            <a:r>
+              <a:rPr lang="en-US" sz="3200" b="1">
+                <a:solidFill>
+                  <a:schemeClr val="tx1"/>
+                </a:solidFill>
+              </a:rPr>
+              <a:t>K</a:t>
+            </a:r>
+            <a:r>
+              <a:rPr lang="en-US" sz="3200" b="1" baseline="-25000">
+                <a:solidFill>
+                  <a:schemeClr val="tx1"/>
+                </a:solidFill>
+              </a:rPr>
+              <a:t>P</a:t>
+            </a:r>
+            <a:endParaRPr lang="en-US" sz="3200" b="1">
+              <a:solidFill>
+                <a:schemeClr val="tx1"/>
+              </a:solidFill>
+            </a:endParaRPr>
+          </a:p>
+        </p:txBody>
+      </p:sp>
+      <p:cxnSp>
+        <p:nvCxnSpPr>
+          <p:cNvPr id="29" name="Straight Arrow Connector 28"/>
+          <p:cNvCxnSpPr/>
+          <p:nvPr/>
+        </p:nvCxnSpPr>
+        <p:spPr>
+          <a:xfrm rot="10800000">
+            <a:off x="2629642" y="2786062"/>
+            <a:ext cx="1047386" cy="1588"/>
+          </a:xfrm>
+          <a:prstGeom prst="straightConnector1">
+            <a:avLst/>
+          </a:prstGeom>
+          <a:ln>
+            <a:tailEnd type="arrow"/>
+          </a:ln>
+        </p:spPr>
+        <p:style>
+          <a:lnRef idx="2">
+            <a:schemeClr val="accent1"/>
+          </a:lnRef>
+          <a:fillRef idx="0">
+            <a:schemeClr val="accent1"/>
+          </a:fillRef>
+          <a:effectRef idx="1">
+            <a:schemeClr val="accent1"/>
+          </a:effectRef>
+          <a:fontRef idx="minor">
+            <a:schemeClr val="tx1"/>
+          </a:fontRef>
+        </p:style>
+      </p:cxnSp>
+      <p:cxnSp>
+        <p:nvCxnSpPr>
+          <p:cNvPr id="30" name="Straight Arrow Connector 29"/>
+          <p:cNvCxnSpPr/>
+          <p:nvPr/>
+        </p:nvCxnSpPr>
+        <p:spPr>
+          <a:xfrm rot="16200000" flipH="1">
+            <a:off x="2029300" y="2189839"/>
+            <a:ext cx="524423" cy="2"/>
+          </a:xfrm>
+          <a:prstGeom prst="straightConnector1">
+            <a:avLst/>
+          </a:prstGeom>
+          <a:ln>
+            <a:tailEnd type="arrow"/>
+          </a:ln>
+        </p:spPr>
+        <p:style>
+          <a:lnRef idx="2">
+            <a:schemeClr val="accent1"/>
+          </a:lnRef>
+          <a:fillRef idx="0">
+            <a:schemeClr val="accent1"/>
+          </a:fillRef>
+          <a:effectRef idx="1">
+            <a:schemeClr val="accent1"/>
+          </a:effectRef>
+          <a:fontRef idx="minor">
+            <a:schemeClr val="tx1"/>
+          </a:fontRef>
+        </p:style>
+      </p:cxnSp>
+      <p:cxnSp>
+        <p:nvCxnSpPr>
+          <p:cNvPr id="31" name="Straight Arrow Connector 30"/>
+          <p:cNvCxnSpPr>
+            <a:endCxn id="38" idx="4"/>
+          </p:cNvCxnSpPr>
+          <p:nvPr/>
+        </p:nvCxnSpPr>
+        <p:spPr>
+          <a:xfrm rot="5400000" flipH="1" flipV="1">
+            <a:off x="2032229" y="3381091"/>
+            <a:ext cx="522042" cy="1588"/>
+          </a:xfrm>
+          <a:prstGeom prst="straightConnector1">
+            <a:avLst/>
+          </a:prstGeom>
+          <a:ln>
+            <a:tailEnd type="arrow"/>
+          </a:ln>
+        </p:spPr>
+        <p:style>
+          <a:lnRef idx="2">
+            <a:schemeClr val="accent1"/>
+          </a:lnRef>
+          <a:fillRef idx="0">
+            <a:schemeClr val="accent1"/>
+          </a:fillRef>
+          <a:effectRef idx="1">
+            <a:schemeClr val="accent1"/>
+          </a:effectRef>
+          <a:fontRef idx="minor">
+            <a:schemeClr val="tx1"/>
+          </a:fontRef>
+        </p:style>
+      </p:cxnSp>
+      <p:sp>
+        <p:nvSpPr>
+          <p:cNvPr id="38" name="Oval 37"/>
+          <p:cNvSpPr/>
+          <p:nvPr/>
+        </p:nvSpPr>
+        <p:spPr>
+          <a:xfrm>
+            <a:off x="1959241" y="2452053"/>
+            <a:ext cx="668017" cy="668017"/>
+          </a:xfrm>
+          <a:prstGeom prst="ellipse">
+            <a:avLst/>
+          </a:prstGeom>
+        </p:spPr>
+        <p:style>
+          <a:lnRef idx="1">
+            <a:schemeClr val="accent1"/>
+          </a:lnRef>
+          <a:fillRef idx="3">
+            <a:schemeClr val="accent1"/>
+          </a:fillRef>
+          <a:effectRef idx="2">
+            <a:schemeClr val="accent1"/>
+          </a:effectRef>
+          <a:fontRef idx="minor">
+            <a:schemeClr val="lt1"/>
+          </a:fontRef>
+        </p:style>
+        <p:txBody>
+          <a:bodyPr rtlCol="0" anchor="ctr"/>
+          <a:lstStyle/>
+          <a:p>
+            <a:pPr algn="ctr"/>
+            <a:endParaRPr lang="en-US"/>
+          </a:p>
+        </p:txBody>
+      </p:sp>
+      <p:cxnSp>
+        <p:nvCxnSpPr>
+          <p:cNvPr id="39" name="Straight Connector 38"/>
+          <p:cNvCxnSpPr/>
+          <p:nvPr/>
+        </p:nvCxnSpPr>
+        <p:spPr>
+          <a:xfrm>
+            <a:off x="2291510" y="1926040"/>
+            <a:ext cx="1387900" cy="1588"/>
+          </a:xfrm>
+          <a:prstGeom prst="line">
+            <a:avLst/>
+          </a:prstGeom>
+        </p:spPr>
+        <p:style>
+          <a:lnRef idx="2">
+            <a:schemeClr val="accent1"/>
+          </a:lnRef>
+          <a:fillRef idx="0">
+            <a:schemeClr val="accent1"/>
+          </a:fillRef>
+          <a:effectRef idx="1">
+            <a:schemeClr val="accent1"/>
+          </a:effectRef>
+          <a:fontRef idx="minor">
+            <a:schemeClr val="tx1"/>
+          </a:fontRef>
+        </p:style>
+      </p:cxnSp>
+      <p:cxnSp>
+        <p:nvCxnSpPr>
+          <p:cNvPr id="43" name="Straight Connector 42"/>
+          <p:cNvCxnSpPr/>
+          <p:nvPr/>
+        </p:nvCxnSpPr>
+        <p:spPr>
+          <a:xfrm>
+            <a:off x="2289127" y="3643701"/>
+            <a:ext cx="1387900" cy="1588"/>
+          </a:xfrm>
+          <a:prstGeom prst="line">
+            <a:avLst/>
+          </a:prstGeom>
+        </p:spPr>
+        <p:style>
+          <a:lnRef idx="2">
+            <a:schemeClr val="accent1"/>
+          </a:lnRef>
+          <a:fillRef idx="0">
+            <a:schemeClr val="accent1"/>
+          </a:fillRef>
+          <a:effectRef idx="1">
+            <a:schemeClr val="accent1"/>
+          </a:effectRef>
+          <a:fontRef idx="minor">
+            <a:schemeClr val="tx1"/>
+          </a:fontRef>
+        </p:style>
+      </p:cxnSp>
+      <p:cxnSp>
+        <p:nvCxnSpPr>
+          <p:cNvPr id="44" name="Straight Arrow Connector 43"/>
+          <p:cNvCxnSpPr/>
+          <p:nvPr/>
+        </p:nvCxnSpPr>
+        <p:spPr>
+          <a:xfrm rot="10800000">
+            <a:off x="911855" y="2784474"/>
+            <a:ext cx="1047386" cy="1588"/>
+          </a:xfrm>
+          <a:prstGeom prst="straightConnector1">
+            <a:avLst/>
+          </a:prstGeom>
+          <a:ln>
+            <a:tailEnd type="arrow"/>
+          </a:ln>
+        </p:spPr>
+        <p:style>
+          <a:lnRef idx="2">
+            <a:schemeClr val="accent1"/>
+          </a:lnRef>
+          <a:fillRef idx="0">
+            <a:schemeClr val="accent1"/>
+          </a:fillRef>
+          <a:effectRef idx="1">
+            <a:schemeClr val="accent1"/>
+          </a:effectRef>
+          <a:fontRef idx="minor">
+            <a:schemeClr val="tx1"/>
+          </a:fontRef>
+        </p:style>
+      </p:cxnSp>
+      <p:sp>
+        <p:nvSpPr>
+          <p:cNvPr id="45" name="Rounded Rectangle 44"/>
+          <p:cNvSpPr/>
+          <p:nvPr/>
+        </p:nvSpPr>
+        <p:spPr>
+          <a:xfrm>
+            <a:off x="3677027" y="2508216"/>
+            <a:ext cx="749619" cy="552516"/>
+          </a:xfrm>
+          <a:prstGeom prst="roundRect">
+            <a:avLst/>
+          </a:prstGeom>
+        </p:spPr>
+        <p:style>
+          <a:lnRef idx="1">
+            <a:schemeClr val="accent1"/>
+          </a:lnRef>
+          <a:fillRef idx="3">
+            <a:schemeClr val="accent1"/>
+          </a:fillRef>
+          <a:effectRef idx="2">
+            <a:schemeClr val="accent1"/>
+          </a:effectRef>
+          <a:fontRef idx="minor">
+            <a:schemeClr val="lt1"/>
+          </a:fontRef>
+        </p:style>
+        <p:txBody>
+          <a:bodyPr rtlCol="0" anchor="b"/>
+          <a:lstStyle/>
+          <a:p>
+            <a:pPr algn="ctr"/>
+            <a:endParaRPr lang="en-US" sz="3200" b="1"/>
+          </a:p>
+        </p:txBody>
+      </p:sp>
+      <p:sp>
+        <p:nvSpPr>
+          <p:cNvPr id="46" name="Rounded Rectangle 45"/>
+          <p:cNvSpPr/>
+          <p:nvPr/>
+        </p:nvSpPr>
+        <p:spPr>
+          <a:xfrm>
+            <a:off x="3679410" y="3383780"/>
+            <a:ext cx="747236" cy="552516"/>
+          </a:xfrm>
+          <a:prstGeom prst="roundRect">
+            <a:avLst/>
+          </a:prstGeom>
+        </p:spPr>
+        <p:style>
+          <a:lnRef idx="1">
+            <a:schemeClr val="accent1"/>
+          </a:lnRef>
+          <a:fillRef idx="3">
+            <a:schemeClr val="accent1"/>
+          </a:fillRef>
+          <a:effectRef idx="2">
+            <a:schemeClr val="accent1"/>
+          </a:effectRef>
+          <a:fontRef idx="minor">
+            <a:schemeClr val="lt1"/>
+          </a:fontRef>
+        </p:style>
+        <p:txBody>
+          <a:bodyPr rtlCol="0" anchor="b"/>
+          <a:lstStyle/>
+          <a:p>
+            <a:pPr algn="ctr"/>
+            <a:endParaRPr lang="en-US" sz="3200" b="1"/>
+          </a:p>
+        </p:txBody>
+      </p:sp>
+      <p:graphicFrame>
+        <p:nvGraphicFramePr>
+          <p:cNvPr id="47" name="Object 46"/>
+          <p:cNvGraphicFramePr>
+            <a:graphicFrameLocks noChangeAspect="1"/>
+          </p:cNvGraphicFramePr>
+          <p:nvPr/>
+        </p:nvGraphicFramePr>
+        <p:xfrm>
+          <a:off x="3903210" y="2508216"/>
+          <a:ext cx="523436" cy="552516"/>
+        </p:xfrm>
+        <a:graphic>
+          <a:graphicData uri="http://schemas.openxmlformats.org/presentationml/2006/ole">
+            <p:oleObj spid="_x0000_s17410" name="Equation" r:id="rId4" imgW="228600" imgH="241300" progId="Equation.3">
+              <p:embed/>
+            </p:oleObj>
+          </a:graphicData>
+        </a:graphic>
+      </p:graphicFrame>
+      <p:graphicFrame>
+        <p:nvGraphicFramePr>
+          <p:cNvPr id="17411" name="Object 3"/>
+          <p:cNvGraphicFramePr>
+            <a:graphicFrameLocks noChangeAspect="1"/>
+          </p:cNvGraphicFramePr>
+          <p:nvPr/>
+        </p:nvGraphicFramePr>
+        <p:xfrm>
+          <a:off x="3903210" y="3382860"/>
+          <a:ext cx="299872" cy="561440"/>
+        </p:xfrm>
+        <a:graphic>
+          <a:graphicData uri="http://schemas.openxmlformats.org/presentationml/2006/ole">
+            <p:oleObj spid="_x0000_s17411" name="Equation" r:id="rId5" imgW="190500" imgH="355600" progId="Equation.3">
+              <p:embed/>
+            </p:oleObj>
+          </a:graphicData>
+        </a:graphic>
+      </p:graphicFrame>
+      <p:sp>
+        <p:nvSpPr>
+          <p:cNvPr id="48" name="TextBox 47"/>
+          <p:cNvSpPr txBox="1"/>
+          <p:nvPr/>
+        </p:nvSpPr>
+        <p:spPr>
+          <a:xfrm>
+            <a:off x="5765356" y="2608998"/>
+            <a:ext cx="440145" cy="707886"/>
+          </a:xfrm>
+          <a:prstGeom prst="rect">
+            <a:avLst/>
+          </a:prstGeom>
+          <a:noFill/>
+        </p:spPr>
+        <p:txBody>
+          <a:bodyPr wrap="none" rtlCol="0">
+            <a:spAutoFit/>
+          </a:bodyPr>
+          <a:lstStyle/>
+          <a:p>
+            <a:r>
+              <a:rPr lang="en-US" sz="4000"/>
+              <a:t>+</a:t>
+            </a:r>
+          </a:p>
+        </p:txBody>
+      </p:sp>
+      <p:sp>
+        <p:nvSpPr>
+          <p:cNvPr id="49" name="TextBox 48"/>
+          <p:cNvSpPr txBox="1"/>
+          <p:nvPr/>
+        </p:nvSpPr>
+        <p:spPr>
+          <a:xfrm>
+            <a:off x="5987017" y="2253355"/>
+            <a:ext cx="396676" cy="923330"/>
+          </a:xfrm>
+          <a:prstGeom prst="rect">
+            <a:avLst/>
+          </a:prstGeom>
+          <a:noFill/>
+        </p:spPr>
+        <p:txBody>
+          <a:bodyPr wrap="none" rtlCol="0">
+            <a:spAutoFit/>
+          </a:bodyPr>
+          <a:lstStyle/>
+          <a:p>
+            <a:r>
+              <a:rPr lang="en-US" sz="5400"/>
+              <a:t>-</a:t>
+            </a:r>
+          </a:p>
+        </p:txBody>
+      </p:sp>
+      <p:sp>
+        <p:nvSpPr>
+          <p:cNvPr id="50" name="TextBox 49"/>
+          <p:cNvSpPr txBox="1"/>
+          <p:nvPr/>
+        </p:nvSpPr>
+        <p:spPr>
+          <a:xfrm>
+            <a:off x="2085548" y="2587336"/>
+            <a:ext cx="440145" cy="707886"/>
+          </a:xfrm>
+          <a:prstGeom prst="rect">
+            <a:avLst/>
+          </a:prstGeom>
+          <a:noFill/>
+        </p:spPr>
+        <p:txBody>
+          <a:bodyPr wrap="none" rtlCol="0">
+            <a:spAutoFit/>
+          </a:bodyPr>
+          <a:lstStyle/>
+          <a:p>
+            <a:r>
+              <a:rPr lang="en-US" sz="4000"/>
+              <a:t>+</a:t>
+            </a:r>
+          </a:p>
+        </p:txBody>
+      </p:sp>
+      <p:sp>
+        <p:nvSpPr>
+          <p:cNvPr id="51" name="TextBox 50"/>
+          <p:cNvSpPr txBox="1"/>
+          <p:nvPr/>
+        </p:nvSpPr>
+        <p:spPr>
+          <a:xfrm>
+            <a:off x="2294044" y="2352846"/>
+            <a:ext cx="440145" cy="707886"/>
+          </a:xfrm>
+          <a:prstGeom prst="rect">
+            <a:avLst/>
+          </a:prstGeom>
+          <a:noFill/>
+        </p:spPr>
+        <p:txBody>
+          <a:bodyPr wrap="none" rtlCol="0">
+            <a:spAutoFit/>
+          </a:bodyPr>
+          <a:lstStyle/>
+          <a:p>
+            <a:r>
+              <a:rPr lang="en-US" sz="4000"/>
+              <a:t>+</a:t>
+            </a:r>
+          </a:p>
+        </p:txBody>
+      </p:sp>
+      <p:sp>
+        <p:nvSpPr>
+          <p:cNvPr id="52" name="TextBox 51"/>
+          <p:cNvSpPr txBox="1"/>
+          <p:nvPr/>
+        </p:nvSpPr>
+        <p:spPr>
+          <a:xfrm>
+            <a:off x="2069054" y="2154273"/>
+            <a:ext cx="440145" cy="707886"/>
+          </a:xfrm>
+          <a:prstGeom prst="rect">
+            <a:avLst/>
+          </a:prstGeom>
+          <a:noFill/>
+        </p:spPr>
+        <p:txBody>
+          <a:bodyPr wrap="none" rtlCol="0">
+            <a:spAutoFit/>
+          </a:bodyPr>
+          <a:lstStyle/>
+          <a:p>
+            <a:r>
+              <a:rPr lang="en-US" sz="4000"/>
+              <a:t>+</a:t>
+            </a:r>
+          </a:p>
+        </p:txBody>
+      </p:sp>
+      <p:sp>
+        <p:nvSpPr>
+          <p:cNvPr id="53" name="TextBox 52"/>
+          <p:cNvSpPr txBox="1"/>
+          <p:nvPr/>
+        </p:nvSpPr>
+        <p:spPr>
+          <a:xfrm>
+            <a:off x="272156" y="2414401"/>
+            <a:ext cx="731691" cy="707886"/>
+          </a:xfrm>
+          <a:prstGeom prst="rect">
+            <a:avLst/>
+          </a:prstGeom>
+          <a:noFill/>
+        </p:spPr>
+        <p:txBody>
+          <a:bodyPr wrap="none" rtlCol="0">
+            <a:spAutoFit/>
+          </a:bodyPr>
+          <a:lstStyle/>
+          <a:p>
+            <a:r>
+              <a:rPr lang="en-US" sz="2000"/>
+              <a:t>Gate</a:t>
+            </a:r>
+          </a:p>
+          <a:p>
+            <a:r>
+              <a:rPr lang="en-US" sz="2000"/>
+              <a:t>Drive</a:t>
+            </a:r>
+          </a:p>
+        </p:txBody>
+      </p:sp>
+      <p:sp>
+        <p:nvSpPr>
+          <p:cNvPr id="54" name="TextBox 53"/>
+          <p:cNvSpPr txBox="1"/>
+          <p:nvPr/>
+        </p:nvSpPr>
+        <p:spPr>
+          <a:xfrm>
+            <a:off x="8130473" y="2584419"/>
+            <a:ext cx="675335" cy="400110"/>
+          </a:xfrm>
+          <a:prstGeom prst="rect">
+            <a:avLst/>
+          </a:prstGeom>
+          <a:noFill/>
+        </p:spPr>
+        <p:txBody>
+          <a:bodyPr wrap="none" rtlCol="0">
+            <a:spAutoFit/>
+          </a:bodyPr>
+          <a:lstStyle/>
+          <a:p>
+            <a:r>
+              <a:rPr lang="en-US" sz="2000"/>
+              <a:t>Vout</a:t>
+            </a:r>
+          </a:p>
+        </p:txBody>
+      </p:sp>
+      <p:sp>
+        <p:nvSpPr>
+          <p:cNvPr id="64" name="Rounded Rectangle 63"/>
+          <p:cNvSpPr/>
+          <p:nvPr/>
+        </p:nvSpPr>
+        <p:spPr>
+          <a:xfrm>
+            <a:off x="6762644" y="2522550"/>
+            <a:ext cx="921296" cy="552516"/>
+          </a:xfrm>
+          <a:prstGeom prst="roundRect">
+            <a:avLst/>
+          </a:prstGeom>
+        </p:spPr>
+        <p:style>
+          <a:lnRef idx="1">
+            <a:schemeClr val="accent1"/>
+          </a:lnRef>
+          <a:fillRef idx="3">
+            <a:schemeClr val="accent1"/>
+          </a:fillRef>
+          <a:effectRef idx="2">
+            <a:schemeClr val="accent1"/>
+          </a:effectRef>
+          <a:fontRef idx="minor">
+            <a:schemeClr val="lt1"/>
+          </a:fontRef>
+        </p:style>
+        <p:txBody>
+          <a:bodyPr rtlCol="0" anchor="b"/>
+          <a:lstStyle/>
+          <a:p>
+            <a:pPr algn="ctr"/>
+            <a:r>
+              <a:rPr lang="en-US" sz="3200" b="1">
+                <a:solidFill>
+                  <a:schemeClr val="tx1"/>
+                </a:solidFill>
+              </a:rPr>
+              <a:t>H</a:t>
+            </a:r>
+          </a:p>
+        </p:txBody>
+      </p:sp>
+      <p:cxnSp>
+        <p:nvCxnSpPr>
+          <p:cNvPr id="69" name="Straight Arrow Connector 68"/>
+          <p:cNvCxnSpPr/>
+          <p:nvPr/>
+        </p:nvCxnSpPr>
+        <p:spPr>
+          <a:xfrm rot="10800000">
+            <a:off x="7683940" y="2798832"/>
+            <a:ext cx="446533" cy="1589"/>
+          </a:xfrm>
+          <a:prstGeom prst="straightConnector1">
+            <a:avLst/>
+          </a:prstGeom>
+          <a:ln>
+            <a:tailEnd type="arrow"/>
+          </a:ln>
+        </p:spPr>
+        <p:style>
+          <a:lnRef idx="2">
+            <a:schemeClr val="accent1"/>
+          </a:lnRef>
+          <a:fillRef idx="0">
+            <a:schemeClr val="accent1"/>
+          </a:fillRef>
+          <a:effectRef idx="1">
+            <a:schemeClr val="accent1"/>
+          </a:effectRef>
+          <a:fontRef idx="minor">
+            <a:schemeClr val="tx1"/>
+          </a:fontRef>
+        </p:style>
+      </p:cxnSp>
+      <p:sp>
+        <p:nvSpPr>
+          <p:cNvPr id="70" name="TextBox 69"/>
+          <p:cNvSpPr txBox="1"/>
+          <p:nvPr/>
+        </p:nvSpPr>
+        <p:spPr>
+          <a:xfrm>
+            <a:off x="5708358" y="3936296"/>
+            <a:ext cx="620683" cy="400110"/>
+          </a:xfrm>
+          <a:prstGeom prst="rect">
+            <a:avLst/>
+          </a:prstGeom>
+          <a:noFill/>
+        </p:spPr>
+        <p:txBody>
+          <a:bodyPr wrap="none" rtlCol="0">
+            <a:spAutoFit/>
+          </a:bodyPr>
+          <a:lstStyle/>
+          <a:p>
+            <a:r>
+              <a:rPr lang="en-US" sz="2000"/>
+              <a:t>Vref</a:t>
             </a:r>
           </a:p>
         </p:txBody>
@@ -7628,7 +8737,7 @@
                 <a:latin typeface="Helvetica Neue"/>
                 <a:cs typeface="Helvetica Neue"/>
               </a:rPr>
-              <a:t>Steady State Output</a:t>
+              <a:t>4V Sine Wave on Input</a:t>
             </a:r>
           </a:p>
         </p:txBody>

</xml_diff>

<commit_message>
added spice files to repo
</commit_message>
<xml_diff>
--- a/project/april_11/john.pptx
+++ b/project/april_11/john.pptx
@@ -3311,8 +3311,8 @@
         </p:blipFill>
         <p:spPr>
           <a:xfrm>
-            <a:off x="1211070" y="3685039"/>
-            <a:ext cx="6634221" cy="1624002"/>
+            <a:off x="907184" y="3545997"/>
+            <a:ext cx="7407344" cy="1813256"/>
           </a:xfrm>
           <a:prstGeom prst="rect">
             <a:avLst/>
@@ -3335,8 +3335,8 @@
         </p:blipFill>
         <p:spPr>
           <a:xfrm>
-            <a:off x="1211070" y="1413023"/>
-            <a:ext cx="6517912" cy="1615899"/>
+            <a:off x="907184" y="1413023"/>
+            <a:ext cx="7407344" cy="1836404"/>
           </a:xfrm>
           <a:prstGeom prst="rect">
             <a:avLst/>
@@ -5219,8 +5219,8 @@
         </p:nvSpPr>
         <p:spPr>
           <a:xfrm>
-            <a:off x="3678218" y="1566836"/>
-            <a:ext cx="1756638" cy="3348081"/>
+            <a:off x="2793825" y="1299432"/>
+            <a:ext cx="3051436" cy="1490519"/>
           </a:xfrm>
           <a:prstGeom prst="roundRect">
             <a:avLst>
@@ -5278,13 +5278,83 @@
       </p:sp>
       <p:cxnSp>
         <p:nvCxnSpPr>
-          <p:cNvPr id="6" name="Straight Arrow Connector 5"/>
+          <p:cNvPr id="8" name="Straight Arrow Connector 7"/>
           <p:cNvCxnSpPr/>
           <p:nvPr/>
         </p:nvCxnSpPr>
         <p:spPr>
-          <a:xfrm>
-            <a:off x="2391669" y="2594850"/>
+          <a:xfrm rot="16200000" flipV="1">
+            <a:off x="3458220" y="3253282"/>
+            <a:ext cx="753060" cy="2"/>
+          </a:xfrm>
+          <a:prstGeom prst="straightConnector1">
+            <a:avLst/>
+          </a:prstGeom>
+          <a:ln w="31750" cap="flat" cmpd="sng" algn="ctr">
+            <a:solidFill>
+              <a:srgbClr val="008000"/>
+            </a:solidFill>
+            <a:prstDash val="solid"/>
+            <a:round/>
+            <a:headEnd type="none" w="med" len="med"/>
+            <a:tailEnd type="arrow" w="med" len="med"/>
+          </a:ln>
+          <a:effectLst/>
+        </p:spPr>
+        <p:style>
+          <a:lnRef idx="2">
+            <a:schemeClr val="accent1"/>
+          </a:lnRef>
+          <a:fillRef idx="0">
+            <a:schemeClr val="accent1"/>
+          </a:fillRef>
+          <a:effectRef idx="1">
+            <a:schemeClr val="accent1"/>
+          </a:effectRef>
+          <a:fontRef idx="minor">
+            <a:schemeClr val="tx1"/>
+          </a:fontRef>
+        </p:style>
+      </p:cxnSp>
+      <p:sp>
+        <p:nvSpPr>
+          <p:cNvPr id="9" name="TextBox 8"/>
+          <p:cNvSpPr txBox="1"/>
+          <p:nvPr/>
+        </p:nvSpPr>
+        <p:spPr>
+          <a:xfrm rot="16200000">
+            <a:off x="3033029" y="4312646"/>
+            <a:ext cx="1553962" cy="369332"/>
+          </a:xfrm>
+          <a:prstGeom prst="rect">
+            <a:avLst/>
+          </a:prstGeom>
+          <a:noFill/>
+        </p:spPr>
+        <p:txBody>
+          <a:bodyPr wrap="square" rtlCol="0">
+            <a:spAutoFit/>
+          </a:bodyPr>
+          <a:lstStyle/>
+          <a:p>
+            <a:pPr algn="r"/>
+            <a:r>
+              <a:rPr lang="en-US"/>
+              <a:t>10 Volt VDD</a:t>
+            </a:r>
+          </a:p>
+        </p:txBody>
+      </p:sp>
+      <p:cxnSp>
+        <p:nvCxnSpPr>
+          <p:cNvPr id="20" name="Straight Arrow Connector 19"/>
+          <p:cNvCxnSpPr/>
+          <p:nvPr/>
+        </p:nvCxnSpPr>
+        <p:spPr>
+          <a:xfrm>
+            <a:off x="1536137" y="1772726"/>
             <a:ext cx="1129856" cy="1588"/>
           </a:xfrm>
           <a:prstGeom prst="straightConnector1">
@@ -5318,13 +5388,13 @@
       </p:cxnSp>
       <p:sp>
         <p:nvSpPr>
-          <p:cNvPr id="7" name="TextBox 6"/>
+          <p:cNvPr id="21" name="TextBox 20"/>
           <p:cNvSpPr txBox="1"/>
           <p:nvPr/>
         </p:nvSpPr>
         <p:spPr>
           <a:xfrm>
-            <a:off x="837707" y="2395278"/>
+            <a:off x="-17825" y="1571566"/>
             <a:ext cx="1553962" cy="369332"/>
           </a:xfrm>
           <a:prstGeom prst="rect">
@@ -5341,21 +5411,21 @@
             <a:pPr algn="r"/>
             <a:r>
               <a:rPr lang="en-US"/>
-              <a:t>GND</a:t>
+              <a:t>VIN</a:t>
             </a:r>
           </a:p>
         </p:txBody>
       </p:sp>
       <p:cxnSp>
         <p:nvCxnSpPr>
-          <p:cNvPr id="8" name="Straight Arrow Connector 7"/>
+          <p:cNvPr id="31" name="Straight Arrow Connector 30"/>
           <p:cNvCxnSpPr/>
           <p:nvPr/>
         </p:nvCxnSpPr>
         <p:spPr>
-          <a:xfrm>
-            <a:off x="2391669" y="3485914"/>
-            <a:ext cx="1129856" cy="1588"/>
+          <a:xfrm rot="16200000" flipV="1">
+            <a:off x="4010776" y="3243660"/>
+            <a:ext cx="753060" cy="2"/>
           </a:xfrm>
           <a:prstGeom prst="straightConnector1">
             <a:avLst/>
@@ -5388,13 +5458,13 @@
       </p:cxnSp>
       <p:sp>
         <p:nvSpPr>
-          <p:cNvPr id="9" name="TextBox 8"/>
+          <p:cNvPr id="32" name="TextBox 31"/>
           <p:cNvSpPr txBox="1"/>
           <p:nvPr/>
         </p:nvSpPr>
         <p:spPr>
-          <a:xfrm>
-            <a:off x="837707" y="3286342"/>
+          <a:xfrm rot="16200000">
+            <a:off x="3585585" y="4303024"/>
             <a:ext cx="1553962" cy="369332"/>
           </a:xfrm>
           <a:prstGeom prst="rect">
@@ -5411,21 +5481,21 @@
             <a:pPr algn="r"/>
             <a:r>
               <a:rPr lang="en-US"/>
-              <a:t>10 Volt VDD</a:t>
+              <a:t>-10 Volt VSS</a:t>
             </a:r>
           </a:p>
         </p:txBody>
       </p:sp>
       <p:cxnSp>
         <p:nvCxnSpPr>
-          <p:cNvPr id="10" name="Straight Arrow Connector 9"/>
+          <p:cNvPr id="33" name="Straight Arrow Connector 32"/>
           <p:cNvCxnSpPr/>
           <p:nvPr/>
         </p:nvCxnSpPr>
         <p:spPr>
-          <a:xfrm>
-            <a:off x="2391669" y="4011488"/>
-            <a:ext cx="1129856" cy="1588"/>
+          <a:xfrm rot="16200000" flipV="1">
+            <a:off x="4495568" y="3253282"/>
+            <a:ext cx="753060" cy="2"/>
           </a:xfrm>
           <a:prstGeom prst="straightConnector1">
             <a:avLst/>
@@ -5458,13 +5528,13 @@
       </p:cxnSp>
       <p:sp>
         <p:nvSpPr>
-          <p:cNvPr id="11" name="TextBox 10"/>
+          <p:cNvPr id="34" name="TextBox 33"/>
           <p:cNvSpPr txBox="1"/>
           <p:nvPr/>
         </p:nvSpPr>
         <p:spPr>
-          <a:xfrm>
-            <a:off x="837707" y="3811916"/>
+          <a:xfrm rot="16200000">
+            <a:off x="4070377" y="4312646"/>
             <a:ext cx="1553962" cy="369332"/>
           </a:xfrm>
           <a:prstGeom prst="rect">
@@ -5481,90 +5551,20 @@
             <a:pPr algn="r"/>
             <a:r>
               <a:rPr lang="en-US"/>
-              <a:t>-10 Volt VSS</a:t>
+              <a:t>1.3 Volt VBIAS</a:t>
             </a:r>
           </a:p>
         </p:txBody>
       </p:sp>
       <p:cxnSp>
         <p:nvCxnSpPr>
-          <p:cNvPr id="12" name="Straight Arrow Connector 11"/>
+          <p:cNvPr id="35" name="Straight Arrow Connector 34"/>
           <p:cNvCxnSpPr/>
           <p:nvPr/>
         </p:nvCxnSpPr>
         <p:spPr>
           <a:xfrm>
-            <a:off x="2391669" y="4512937"/>
-            <a:ext cx="1129856" cy="1588"/>
-          </a:xfrm>
-          <a:prstGeom prst="straightConnector1">
-            <a:avLst/>
-          </a:prstGeom>
-          <a:ln w="31750" cap="flat" cmpd="sng" algn="ctr">
-            <a:solidFill>
-              <a:srgbClr val="008000"/>
-            </a:solidFill>
-            <a:prstDash val="solid"/>
-            <a:round/>
-            <a:headEnd type="none" w="med" len="med"/>
-            <a:tailEnd type="arrow" w="med" len="med"/>
-          </a:ln>
-          <a:effectLst/>
-        </p:spPr>
-        <p:style>
-          <a:lnRef idx="2">
-            <a:schemeClr val="accent1"/>
-          </a:lnRef>
-          <a:fillRef idx="0">
-            <a:schemeClr val="accent1"/>
-          </a:fillRef>
-          <a:effectRef idx="1">
-            <a:schemeClr val="accent1"/>
-          </a:effectRef>
-          <a:fontRef idx="minor">
-            <a:schemeClr val="tx1"/>
-          </a:fontRef>
-        </p:style>
-      </p:cxnSp>
-      <p:sp>
-        <p:nvSpPr>
-          <p:cNvPr id="13" name="TextBox 12"/>
-          <p:cNvSpPr txBox="1"/>
-          <p:nvPr/>
-        </p:nvSpPr>
-        <p:spPr>
-          <a:xfrm>
-            <a:off x="837707" y="4313365"/>
-            <a:ext cx="1553962" cy="369332"/>
-          </a:xfrm>
-          <a:prstGeom prst="rect">
-            <a:avLst/>
-          </a:prstGeom>
-          <a:noFill/>
-        </p:spPr>
-        <p:txBody>
-          <a:bodyPr wrap="square" rtlCol="0">
-            <a:spAutoFit/>
-          </a:bodyPr>
-          <a:lstStyle/>
-          <a:p>
-            <a:pPr algn="r"/>
-            <a:r>
-              <a:rPr lang="en-US"/>
-              <a:t>1.3 Volt VBIAS</a:t>
-            </a:r>
-          </a:p>
-        </p:txBody>
-      </p:sp>
-      <p:cxnSp>
-        <p:nvCxnSpPr>
-          <p:cNvPr id="14" name="Straight Arrow Connector 13"/>
-          <p:cNvCxnSpPr/>
-          <p:nvPr/>
-        </p:nvCxnSpPr>
-        <p:spPr>
-          <a:xfrm>
-            <a:off x="5542520" y="2086636"/>
+            <a:off x="1536137" y="2313857"/>
             <a:ext cx="1129856" cy="1588"/>
           </a:xfrm>
           <a:prstGeom prst="straightConnector1">
@@ -5598,13 +5598,13 @@
       </p:cxnSp>
       <p:sp>
         <p:nvSpPr>
-          <p:cNvPr id="15" name="TextBox 14"/>
+          <p:cNvPr id="36" name="TextBox 35"/>
           <p:cNvSpPr txBox="1"/>
           <p:nvPr/>
         </p:nvSpPr>
         <p:spPr>
           <a:xfrm>
-            <a:off x="6672376" y="1873546"/>
+            <a:off x="-17825" y="2112697"/>
             <a:ext cx="1553962" cy="369332"/>
           </a:xfrm>
           <a:prstGeom prst="rect">
@@ -5618,22 +5618,23 @@
           </a:bodyPr>
           <a:lstStyle/>
           <a:p>
+            <a:pPr algn="r"/>
             <a:r>
               <a:rPr lang="en-US"/>
-              <a:t>5 Volt VOUT</a:t>
+              <a:t>GND</a:t>
             </a:r>
           </a:p>
         </p:txBody>
       </p:sp>
       <p:cxnSp>
         <p:nvCxnSpPr>
-          <p:cNvPr id="16" name="Straight Arrow Connector 15"/>
+          <p:cNvPr id="38" name="Straight Arrow Connector 37"/>
           <p:cNvCxnSpPr/>
           <p:nvPr/>
         </p:nvCxnSpPr>
         <p:spPr>
           <a:xfrm>
-            <a:off x="5542520" y="2608368"/>
+            <a:off x="6018020" y="1774314"/>
             <a:ext cx="1129856" cy="1588"/>
           </a:xfrm>
           <a:prstGeom prst="straightConnector1">
@@ -5667,13 +5668,13 @@
       </p:cxnSp>
       <p:sp>
         <p:nvSpPr>
-          <p:cNvPr id="17" name="TextBox 16"/>
+          <p:cNvPr id="39" name="TextBox 38"/>
           <p:cNvSpPr txBox="1"/>
           <p:nvPr/>
         </p:nvSpPr>
         <p:spPr>
           <a:xfrm>
-            <a:off x="6672376" y="2395278"/>
+            <a:off x="7147876" y="1571566"/>
             <a:ext cx="1553962" cy="369332"/>
           </a:xfrm>
           <a:prstGeom prst="rect">
@@ -5689,20 +5690,20 @@
           <a:p>
             <a:r>
               <a:rPr lang="en-US"/>
-              <a:t>GND</a:t>
+              <a:t>5 Volt VOUT</a:t>
             </a:r>
           </a:p>
         </p:txBody>
       </p:sp>
       <p:cxnSp>
         <p:nvCxnSpPr>
-          <p:cNvPr id="20" name="Straight Arrow Connector 19"/>
+          <p:cNvPr id="40" name="Straight Arrow Connector 39"/>
           <p:cNvCxnSpPr/>
           <p:nvPr/>
         </p:nvCxnSpPr>
         <p:spPr>
           <a:xfrm>
-            <a:off x="2391669" y="2095333"/>
+            <a:off x="6018020" y="2315445"/>
             <a:ext cx="1129856" cy="1588"/>
           </a:xfrm>
           <a:prstGeom prst="straightConnector1">
@@ -5736,13 +5737,13 @@
       </p:cxnSp>
       <p:sp>
         <p:nvSpPr>
-          <p:cNvPr id="21" name="TextBox 20"/>
+          <p:cNvPr id="41" name="TextBox 40"/>
           <p:cNvSpPr txBox="1"/>
           <p:nvPr/>
         </p:nvSpPr>
         <p:spPr>
           <a:xfrm>
-            <a:off x="837707" y="1894173"/>
+            <a:off x="7147876" y="2112697"/>
             <a:ext cx="1553962" cy="369332"/>
           </a:xfrm>
           <a:prstGeom prst="rect">
@@ -5756,10 +5757,9 @@
           </a:bodyPr>
           <a:lstStyle/>
           <a:p>
-            <a:pPr algn="r"/>
             <a:r>
               <a:rPr lang="en-US"/>
-              <a:t>VIN</a:t>
+              <a:t>GND</a:t>
             </a:r>
           </a:p>
         </p:txBody>
@@ -5872,8 +5872,8 @@
           <p:nvPr/>
         </p:nvGraphicFramePr>
         <p:xfrm>
-          <a:off x="741633" y="1343769"/>
-          <a:ext cx="7713725" cy="3688079"/>
+          <a:off x="741633" y="1121525"/>
+          <a:ext cx="7713725" cy="4084319"/>
         </p:xfrm>
         <a:graphic>
           <a:graphicData uri="http://schemas.openxmlformats.org/drawingml/2006/table">
@@ -5882,9 +5882,9 @@
                 <a:tableStyleId>{7E9639D4-E3E2-4D34-9284-5A2195B3D0D7}</a:tableStyleId>
               </a:tblPr>
               <a:tblGrid>
-                <a:gridCol w="2197062"/>
-                <a:gridCol w="1863325"/>
-                <a:gridCol w="3653338"/>
+                <a:gridCol w="2425263"/>
+                <a:gridCol w="1789626"/>
+                <a:gridCol w="3498836"/>
               </a:tblGrid>
               <a:tr h="473296">
                 <a:tc>
@@ -6035,6 +6035,672 @@
                     <a:lstStyle/>
                     <a:p>
                       <a:pPr algn="ctr"/>
+                      <a:r>
+                        <a:rPr lang="en-US" sz="2000"/>
+                        <a:t>1.1 V</a:t>
+                      </a:r>
+                    </a:p>
+                  </a:txBody>
+                  <a:tcPr anchor="ctr">
+                    <a:lnL w="12700" cap="flat" cmpd="sng" algn="ctr">
+                      <a:solidFill>
+                        <a:scrgbClr r="0" g="0" b="0"/>
+                      </a:solidFill>
+                      <a:prstDash val="solid"/>
+                      <a:round/>
+                      <a:headEnd type="none" w="med" len="med"/>
+                      <a:tailEnd type="none" w="med" len="med"/>
+                    </a:lnL>
+                    <a:lnR w="12700" cap="flat" cmpd="sng" algn="ctr">
+                      <a:solidFill>
+                        <a:scrgbClr r="0" g="0" b="0"/>
+                      </a:solidFill>
+                      <a:prstDash val="solid"/>
+                      <a:round/>
+                      <a:headEnd type="none" w="med" len="med"/>
+                      <a:tailEnd type="none" w="med" len="med"/>
+                    </a:lnR>
+                    <a:lnT w="12700" cap="flat" cmpd="sng" algn="ctr">
+                      <a:solidFill>
+                        <a:scrgbClr r="0" g="0" b="0"/>
+                      </a:solidFill>
+                      <a:prstDash val="solid"/>
+                      <a:round/>
+                      <a:headEnd type="none" w="med" len="med"/>
+                      <a:tailEnd type="none" w="med" len="med"/>
+                    </a:lnT>
+                    <a:lnB w="12700" cap="flat" cmpd="sng" algn="ctr">
+                      <a:solidFill>
+                        <a:scrgbClr r="0" g="0" b="0"/>
+                      </a:solidFill>
+                      <a:prstDash val="solid"/>
+                      <a:round/>
+                      <a:headEnd type="none" w="med" len="med"/>
+                      <a:tailEnd type="none" w="med" len="med"/>
+                    </a:lnB>
+                  </a:tcPr>
+                </a:tc>
+                <a:tc>
+                  <a:txBody>
+                    <a:bodyPr/>
+                    <a:lstStyle/>
+                    <a:p>
+                      <a:pPr algn="ctr"/>
+                      <a:r>
+                        <a:rPr lang="en-US" sz="2000"/>
+                        <a:t>0.6 V</a:t>
+                      </a:r>
+                    </a:p>
+                  </a:txBody>
+                  <a:tcPr anchor="ctr">
+                    <a:lnL w="12700" cap="flat" cmpd="sng" algn="ctr">
+                      <a:solidFill>
+                        <a:scrgbClr r="0" g="0" b="0"/>
+                      </a:solidFill>
+                      <a:prstDash val="solid"/>
+                      <a:round/>
+                      <a:headEnd type="none" w="med" len="med"/>
+                      <a:tailEnd type="none" w="med" len="med"/>
+                    </a:lnL>
+                    <a:lnR w="12700" cap="flat" cmpd="sng" algn="ctr">
+                      <a:solidFill>
+                        <a:scrgbClr r="0" g="0" b="0"/>
+                      </a:solidFill>
+                      <a:prstDash val="solid"/>
+                      <a:round/>
+                      <a:headEnd type="none" w="med" len="med"/>
+                      <a:tailEnd type="none" w="med" len="med"/>
+                    </a:lnR>
+                    <a:lnT w="12700" cap="flat" cmpd="sng" algn="ctr">
+                      <a:solidFill>
+                        <a:scrgbClr r="0" g="0" b="0"/>
+                      </a:solidFill>
+                      <a:prstDash val="solid"/>
+                      <a:round/>
+                      <a:headEnd type="none" w="med" len="med"/>
+                      <a:tailEnd type="none" w="med" len="med"/>
+                    </a:lnT>
+                    <a:lnB w="12700" cap="flat" cmpd="sng" algn="ctr">
+                      <a:solidFill>
+                        <a:scrgbClr r="0" g="0" b="0"/>
+                      </a:solidFill>
+                      <a:prstDash val="solid"/>
+                      <a:round/>
+                      <a:headEnd type="none" w="med" len="med"/>
+                      <a:tailEnd type="none" w="med" len="med"/>
+                    </a:lnB>
+                  </a:tcPr>
+                </a:tc>
+              </a:tr>
+              <a:tr h="352850">
+                <a:tc>
+                  <a:txBody>
+                    <a:bodyPr/>
+                    <a:lstStyle/>
+                    <a:p>
+                      <a:pPr marL="0" marR="0" indent="0" algn="ctr" defTabSz="457200" rtl="0" eaLnBrk="1" fontAlgn="auto" latinLnBrk="0" hangingPunct="1">
+                        <a:lnSpc>
+                          <a:spcPct val="100000"/>
+                        </a:lnSpc>
+                        <a:spcBef>
+                          <a:spcPts val="0"/>
+                        </a:spcBef>
+                        <a:spcAft>
+                          <a:spcPts val="0"/>
+                        </a:spcAft>
+                        <a:buClrTx/>
+                        <a:buSzTx/>
+                        <a:buFontTx/>
+                        <a:buNone/>
+                        <a:tabLst/>
+                        <a:defRPr/>
+                      </a:pPr>
+                      <a:r>
+                        <a:rPr lang="en-US" sz="2000"/>
+                        <a:t>Required Capacitance</a:t>
+                      </a:r>
+                    </a:p>
+                  </a:txBody>
+                  <a:tcPr anchor="ctr">
+                    <a:lnL w="12700" cap="flat" cmpd="sng" algn="ctr">
+                      <a:solidFill>
+                        <a:scrgbClr r="0" g="0" b="0"/>
+                      </a:solidFill>
+                      <a:prstDash val="solid"/>
+                      <a:round/>
+                      <a:headEnd type="none" w="med" len="med"/>
+                      <a:tailEnd type="none" w="med" len="med"/>
+                    </a:lnL>
+                    <a:lnR w="12700" cap="flat" cmpd="sng" algn="ctr">
+                      <a:solidFill>
+                        <a:scrgbClr r="0" g="0" b="0"/>
+                      </a:solidFill>
+                      <a:prstDash val="solid"/>
+                      <a:round/>
+                      <a:headEnd type="none" w="med" len="med"/>
+                      <a:tailEnd type="none" w="med" len="med"/>
+                    </a:lnR>
+                    <a:lnT w="12700" cap="flat" cmpd="sng" algn="ctr">
+                      <a:solidFill>
+                        <a:scrgbClr r="0" g="0" b="0"/>
+                      </a:solidFill>
+                      <a:prstDash val="solid"/>
+                      <a:round/>
+                      <a:headEnd type="none" w="med" len="med"/>
+                      <a:tailEnd type="none" w="med" len="med"/>
+                    </a:lnT>
+                    <a:lnB w="12700" cap="flat" cmpd="sng" algn="ctr">
+                      <a:solidFill>
+                        <a:scrgbClr r="0" g="0" b="0"/>
+                      </a:solidFill>
+                      <a:prstDash val="solid"/>
+                      <a:round/>
+                      <a:headEnd type="none" w="med" len="med"/>
+                      <a:tailEnd type="none" w="med" len="med"/>
+                    </a:lnB>
+                  </a:tcPr>
+                </a:tc>
+                <a:tc>
+                  <a:txBody>
+                    <a:bodyPr/>
+                    <a:lstStyle/>
+                    <a:p>
+                      <a:pPr algn="ctr"/>
+                      <a:r>
+                        <a:rPr lang="en-US" sz="2000"/>
+                        <a:t>1 pF</a:t>
+                      </a:r>
+                    </a:p>
+                  </a:txBody>
+                  <a:tcPr anchor="ctr">
+                    <a:lnL w="12700" cap="flat" cmpd="sng" algn="ctr">
+                      <a:solidFill>
+                        <a:scrgbClr r="0" g="0" b="0"/>
+                      </a:solidFill>
+                      <a:prstDash val="solid"/>
+                      <a:round/>
+                      <a:headEnd type="none" w="med" len="med"/>
+                      <a:tailEnd type="none" w="med" len="med"/>
+                    </a:lnL>
+                    <a:lnR w="12700" cap="flat" cmpd="sng" algn="ctr">
+                      <a:solidFill>
+                        <a:scrgbClr r="0" g="0" b="0"/>
+                      </a:solidFill>
+                      <a:prstDash val="solid"/>
+                      <a:round/>
+                      <a:headEnd type="none" w="med" len="med"/>
+                      <a:tailEnd type="none" w="med" len="med"/>
+                    </a:lnR>
+                    <a:lnT w="12700" cap="flat" cmpd="sng" algn="ctr">
+                      <a:solidFill>
+                        <a:scrgbClr r="0" g="0" b="0"/>
+                      </a:solidFill>
+                      <a:prstDash val="solid"/>
+                      <a:round/>
+                      <a:headEnd type="none" w="med" len="med"/>
+                      <a:tailEnd type="none" w="med" len="med"/>
+                    </a:lnT>
+                    <a:lnB w="12700" cap="flat" cmpd="sng" algn="ctr">
+                      <a:solidFill>
+                        <a:scrgbClr r="0" g="0" b="0"/>
+                      </a:solidFill>
+                      <a:prstDash val="solid"/>
+                      <a:round/>
+                      <a:headEnd type="none" w="med" len="med"/>
+                      <a:tailEnd type="none" w="med" len="med"/>
+                    </a:lnB>
+                  </a:tcPr>
+                </a:tc>
+                <a:tc>
+                  <a:txBody>
+                    <a:bodyPr/>
+                    <a:lstStyle/>
+                    <a:p>
+                      <a:pPr marL="0" marR="0" indent="0" algn="ctr" defTabSz="457200" rtl="0" eaLnBrk="1" fontAlgn="auto" latinLnBrk="0" hangingPunct="1">
+                        <a:lnSpc>
+                          <a:spcPct val="100000"/>
+                        </a:lnSpc>
+                        <a:spcBef>
+                          <a:spcPts val="0"/>
+                        </a:spcBef>
+                        <a:spcAft>
+                          <a:spcPts val="0"/>
+                        </a:spcAft>
+                        <a:buClrTx/>
+                        <a:buSzTx/>
+                        <a:buFontTx/>
+                        <a:buNone/>
+                        <a:tabLst/>
+                        <a:defRPr/>
+                      </a:pPr>
+                      <a:r>
+                        <a:rPr lang="en-US" sz="2000"/>
+                        <a:t>22 μF</a:t>
+                      </a:r>
+                    </a:p>
+                  </a:txBody>
+                  <a:tcPr anchor="ctr">
+                    <a:lnL w="12700" cap="flat" cmpd="sng" algn="ctr">
+                      <a:solidFill>
+                        <a:scrgbClr r="0" g="0" b="0"/>
+                      </a:solidFill>
+                      <a:prstDash val="solid"/>
+                      <a:round/>
+                      <a:headEnd type="none" w="med" len="med"/>
+                      <a:tailEnd type="none" w="med" len="med"/>
+                    </a:lnL>
+                    <a:lnR w="12700" cap="flat" cmpd="sng" algn="ctr">
+                      <a:solidFill>
+                        <a:scrgbClr r="0" g="0" b="0"/>
+                      </a:solidFill>
+                      <a:prstDash val="solid"/>
+                      <a:round/>
+                      <a:headEnd type="none" w="med" len="med"/>
+                      <a:tailEnd type="none" w="med" len="med"/>
+                    </a:lnR>
+                    <a:lnT w="12700" cap="flat" cmpd="sng" algn="ctr">
+                      <a:solidFill>
+                        <a:scrgbClr r="0" g="0" b="0"/>
+                      </a:solidFill>
+                      <a:prstDash val="solid"/>
+                      <a:round/>
+                      <a:headEnd type="none" w="med" len="med"/>
+                      <a:tailEnd type="none" w="med" len="med"/>
+                    </a:lnT>
+                    <a:lnB w="12700" cap="flat" cmpd="sng" algn="ctr">
+                      <a:solidFill>
+                        <a:scrgbClr r="0" g="0" b="0"/>
+                      </a:solidFill>
+                      <a:prstDash val="solid"/>
+                      <a:round/>
+                      <a:headEnd type="none" w="med" len="med"/>
+                      <a:tailEnd type="none" w="med" len="med"/>
+                    </a:lnB>
+                  </a:tcPr>
+                </a:tc>
+              </a:tr>
+              <a:tr h="352850">
+                <a:tc>
+                  <a:txBody>
+                    <a:bodyPr/>
+                    <a:lstStyle/>
+                    <a:p>
+                      <a:pPr algn="ctr"/>
+                      <a:r>
+                        <a:rPr lang="en-US" sz="2000" baseline="0"/>
+                        <a:t>Pos. </a:t>
+                      </a:r>
+                      <a:r>
+                        <a:rPr lang="en-US" sz="2000"/>
+                        <a:t>Settling</a:t>
+                      </a:r>
+                      <a:r>
+                        <a:rPr lang="en-US" sz="2000" baseline="0"/>
+                        <a:t> Time</a:t>
+                      </a:r>
+                      <a:endParaRPr lang="en-US" sz="2000"/>
+                    </a:p>
+                  </a:txBody>
+                  <a:tcPr anchor="ctr">
+                    <a:lnL w="12700" cap="flat" cmpd="sng" algn="ctr">
+                      <a:solidFill>
+                        <a:scrgbClr r="0" g="0" b="0"/>
+                      </a:solidFill>
+                      <a:prstDash val="solid"/>
+                      <a:round/>
+                      <a:headEnd type="none" w="med" len="med"/>
+                      <a:tailEnd type="none" w="med" len="med"/>
+                    </a:lnL>
+                    <a:lnR w="12700" cap="flat" cmpd="sng" algn="ctr">
+                      <a:solidFill>
+                        <a:scrgbClr r="0" g="0" b="0"/>
+                      </a:solidFill>
+                      <a:prstDash val="solid"/>
+                      <a:round/>
+                      <a:headEnd type="none" w="med" len="med"/>
+                      <a:tailEnd type="none" w="med" len="med"/>
+                    </a:lnR>
+                    <a:lnT w="12700" cap="flat" cmpd="sng" algn="ctr">
+                      <a:solidFill>
+                        <a:scrgbClr r="0" g="0" b="0"/>
+                      </a:solidFill>
+                      <a:prstDash val="solid"/>
+                      <a:round/>
+                      <a:headEnd type="none" w="med" len="med"/>
+                      <a:tailEnd type="none" w="med" len="med"/>
+                    </a:lnT>
+                    <a:lnB w="12700" cap="flat" cmpd="sng" algn="ctr">
+                      <a:solidFill>
+                        <a:scrgbClr r="0" g="0" b="0"/>
+                      </a:solidFill>
+                      <a:prstDash val="solid"/>
+                      <a:round/>
+                      <a:headEnd type="none" w="med" len="med"/>
+                      <a:tailEnd type="none" w="med" len="med"/>
+                    </a:lnB>
+                  </a:tcPr>
+                </a:tc>
+                <a:tc>
+                  <a:txBody>
+                    <a:bodyPr/>
+                    <a:lstStyle/>
+                    <a:p>
+                      <a:pPr marL="0" marR="0" indent="0" algn="ctr" defTabSz="457200" rtl="0" eaLnBrk="1" fontAlgn="auto" latinLnBrk="0" hangingPunct="1">
+                        <a:lnSpc>
+                          <a:spcPct val="100000"/>
+                        </a:lnSpc>
+                        <a:spcBef>
+                          <a:spcPts val="0"/>
+                        </a:spcBef>
+                        <a:spcAft>
+                          <a:spcPts val="0"/>
+                        </a:spcAft>
+                        <a:buClrTx/>
+                        <a:buSzTx/>
+                        <a:buFontTx/>
+                        <a:buNone/>
+                        <a:tabLst/>
+                        <a:defRPr/>
+                      </a:pPr>
+                      <a:r>
+                        <a:rPr lang="en-US" sz="2000"/>
+                        <a:t>2 μS</a:t>
+                      </a:r>
+                    </a:p>
+                  </a:txBody>
+                  <a:tcPr anchor="ctr">
+                    <a:lnL w="12700" cap="flat" cmpd="sng" algn="ctr">
+                      <a:solidFill>
+                        <a:scrgbClr r="0" g="0" b="0"/>
+                      </a:solidFill>
+                      <a:prstDash val="solid"/>
+                      <a:round/>
+                      <a:headEnd type="none" w="med" len="med"/>
+                      <a:tailEnd type="none" w="med" len="med"/>
+                    </a:lnL>
+                    <a:lnR w="12700" cap="flat" cmpd="sng" algn="ctr">
+                      <a:solidFill>
+                        <a:scrgbClr r="0" g="0" b="0"/>
+                      </a:solidFill>
+                      <a:prstDash val="solid"/>
+                      <a:round/>
+                      <a:headEnd type="none" w="med" len="med"/>
+                      <a:tailEnd type="none" w="med" len="med"/>
+                    </a:lnR>
+                    <a:lnT w="12700" cap="flat" cmpd="sng" algn="ctr">
+                      <a:solidFill>
+                        <a:scrgbClr r="0" g="0" b="0"/>
+                      </a:solidFill>
+                      <a:prstDash val="solid"/>
+                      <a:round/>
+                      <a:headEnd type="none" w="med" len="med"/>
+                      <a:tailEnd type="none" w="med" len="med"/>
+                    </a:lnT>
+                    <a:lnB w="12700" cap="flat" cmpd="sng" algn="ctr">
+                      <a:solidFill>
+                        <a:scrgbClr r="0" g="0" b="0"/>
+                      </a:solidFill>
+                      <a:prstDash val="solid"/>
+                      <a:round/>
+                      <a:headEnd type="none" w="med" len="med"/>
+                      <a:tailEnd type="none" w="med" len="med"/>
+                    </a:lnB>
+                  </a:tcPr>
+                </a:tc>
+                <a:tc>
+                  <a:txBody>
+                    <a:bodyPr/>
+                    <a:lstStyle/>
+                    <a:p>
+                      <a:pPr algn="ctr"/>
+                      <a:r>
+                        <a:rPr lang="en-US" sz="2000"/>
+                        <a:t>150 μS</a:t>
+                      </a:r>
+                    </a:p>
+                  </a:txBody>
+                  <a:tcPr anchor="ctr">
+                    <a:lnL w="12700" cap="flat" cmpd="sng" algn="ctr">
+                      <a:solidFill>
+                        <a:scrgbClr r="0" g="0" b="0"/>
+                      </a:solidFill>
+                      <a:prstDash val="solid"/>
+                      <a:round/>
+                      <a:headEnd type="none" w="med" len="med"/>
+                      <a:tailEnd type="none" w="med" len="med"/>
+                    </a:lnL>
+                    <a:lnR w="12700" cap="flat" cmpd="sng" algn="ctr">
+                      <a:solidFill>
+                        <a:scrgbClr r="0" g="0" b="0"/>
+                      </a:solidFill>
+                      <a:prstDash val="solid"/>
+                      <a:round/>
+                      <a:headEnd type="none" w="med" len="med"/>
+                      <a:tailEnd type="none" w="med" len="med"/>
+                    </a:lnR>
+                    <a:lnT w="12700" cap="flat" cmpd="sng" algn="ctr">
+                      <a:solidFill>
+                        <a:scrgbClr r="0" g="0" b="0"/>
+                      </a:solidFill>
+                      <a:prstDash val="solid"/>
+                      <a:round/>
+                      <a:headEnd type="none" w="med" len="med"/>
+                      <a:tailEnd type="none" w="med" len="med"/>
+                    </a:lnT>
+                    <a:lnB w="12700" cap="flat" cmpd="sng" algn="ctr">
+                      <a:solidFill>
+                        <a:scrgbClr r="0" g="0" b="0"/>
+                      </a:solidFill>
+                      <a:prstDash val="solid"/>
+                      <a:round/>
+                      <a:headEnd type="none" w="med" len="med"/>
+                      <a:tailEnd type="none" w="med" len="med"/>
+                    </a:lnB>
+                  </a:tcPr>
+                </a:tc>
+              </a:tr>
+              <a:tr h="352850">
+                <a:tc>
+                  <a:txBody>
+                    <a:bodyPr/>
+                    <a:lstStyle/>
+                    <a:p>
+                      <a:pPr algn="ctr"/>
+                      <a:r>
+                        <a:rPr lang="en-US" sz="2000"/>
+                        <a:t>Neg. Settling Time</a:t>
+                      </a:r>
+                    </a:p>
+                  </a:txBody>
+                  <a:tcPr anchor="ctr">
+                    <a:lnL w="12700" cap="flat" cmpd="sng" algn="ctr">
+                      <a:solidFill>
+                        <a:scrgbClr r="0" g="0" b="0"/>
+                      </a:solidFill>
+                      <a:prstDash val="solid"/>
+                      <a:round/>
+                      <a:headEnd type="none" w="med" len="med"/>
+                      <a:tailEnd type="none" w="med" len="med"/>
+                    </a:lnL>
+                    <a:lnR w="12700" cap="flat" cmpd="sng" algn="ctr">
+                      <a:solidFill>
+                        <a:scrgbClr r="0" g="0" b="0"/>
+                      </a:solidFill>
+                      <a:prstDash val="solid"/>
+                      <a:round/>
+                      <a:headEnd type="none" w="med" len="med"/>
+                      <a:tailEnd type="none" w="med" len="med"/>
+                    </a:lnR>
+                    <a:lnT w="12700" cap="flat" cmpd="sng" algn="ctr">
+                      <a:solidFill>
+                        <a:scrgbClr r="0" g="0" b="0"/>
+                      </a:solidFill>
+                      <a:prstDash val="solid"/>
+                      <a:round/>
+                      <a:headEnd type="none" w="med" len="med"/>
+                      <a:tailEnd type="none" w="med" len="med"/>
+                    </a:lnT>
+                    <a:lnB w="12700" cap="flat" cmpd="sng" algn="ctr">
+                      <a:solidFill>
+                        <a:scrgbClr r="0" g="0" b="0"/>
+                      </a:solidFill>
+                      <a:prstDash val="solid"/>
+                      <a:round/>
+                      <a:headEnd type="none" w="med" len="med"/>
+                      <a:tailEnd type="none" w="med" len="med"/>
+                    </a:lnB>
+                  </a:tcPr>
+                </a:tc>
+                <a:tc>
+                  <a:txBody>
+                    <a:bodyPr/>
+                    <a:lstStyle/>
+                    <a:p>
+                      <a:pPr marL="0" marR="0" indent="0" algn="ctr" defTabSz="457200" rtl="0" eaLnBrk="1" fontAlgn="auto" latinLnBrk="0" hangingPunct="1">
+                        <a:lnSpc>
+                          <a:spcPct val="100000"/>
+                        </a:lnSpc>
+                        <a:spcBef>
+                          <a:spcPts val="0"/>
+                        </a:spcBef>
+                        <a:spcAft>
+                          <a:spcPts val="0"/>
+                        </a:spcAft>
+                        <a:buClrTx/>
+                        <a:buSzTx/>
+                        <a:buFontTx/>
+                        <a:buNone/>
+                        <a:tabLst/>
+                        <a:defRPr/>
+                      </a:pPr>
+                      <a:r>
+                        <a:rPr lang="en-US" sz="2000"/>
+                        <a:t>0.1 μS</a:t>
+                      </a:r>
+                    </a:p>
+                  </a:txBody>
+                  <a:tcPr anchor="ctr">
+                    <a:lnL w="12700" cap="flat" cmpd="sng" algn="ctr">
+                      <a:solidFill>
+                        <a:scrgbClr r="0" g="0" b="0"/>
+                      </a:solidFill>
+                      <a:prstDash val="solid"/>
+                      <a:round/>
+                      <a:headEnd type="none" w="med" len="med"/>
+                      <a:tailEnd type="none" w="med" len="med"/>
+                    </a:lnL>
+                    <a:lnR w="12700" cap="flat" cmpd="sng" algn="ctr">
+                      <a:solidFill>
+                        <a:scrgbClr r="0" g="0" b="0"/>
+                      </a:solidFill>
+                      <a:prstDash val="solid"/>
+                      <a:round/>
+                      <a:headEnd type="none" w="med" len="med"/>
+                      <a:tailEnd type="none" w="med" len="med"/>
+                    </a:lnR>
+                    <a:lnT w="12700" cap="flat" cmpd="sng" algn="ctr">
+                      <a:solidFill>
+                        <a:scrgbClr r="0" g="0" b="0"/>
+                      </a:solidFill>
+                      <a:prstDash val="solid"/>
+                      <a:round/>
+                      <a:headEnd type="none" w="med" len="med"/>
+                      <a:tailEnd type="none" w="med" len="med"/>
+                    </a:lnT>
+                    <a:lnB w="12700" cap="flat" cmpd="sng" algn="ctr">
+                      <a:solidFill>
+                        <a:scrgbClr r="0" g="0" b="0"/>
+                      </a:solidFill>
+                      <a:prstDash val="solid"/>
+                      <a:round/>
+                      <a:headEnd type="none" w="med" len="med"/>
+                      <a:tailEnd type="none" w="med" len="med"/>
+                    </a:lnB>
+                  </a:tcPr>
+                </a:tc>
+                <a:tc>
+                  <a:txBody>
+                    <a:bodyPr/>
+                    <a:lstStyle/>
+                    <a:p>
+                      <a:pPr marL="0" marR="0" indent="0" algn="ctr" defTabSz="457200" rtl="0" eaLnBrk="1" fontAlgn="auto" latinLnBrk="0" hangingPunct="1">
+                        <a:lnSpc>
+                          <a:spcPct val="100000"/>
+                        </a:lnSpc>
+                        <a:spcBef>
+                          <a:spcPts val="0"/>
+                        </a:spcBef>
+                        <a:spcAft>
+                          <a:spcPts val="0"/>
+                        </a:spcAft>
+                        <a:buClrTx/>
+                        <a:buSzTx/>
+                        <a:buFontTx/>
+                        <a:buNone/>
+                        <a:tabLst/>
+                        <a:defRPr/>
+                      </a:pPr>
+                      <a:r>
+                        <a:rPr lang="en-US" sz="2000"/>
+                        <a:t>100 μS</a:t>
+                      </a:r>
+                    </a:p>
+                  </a:txBody>
+                  <a:tcPr anchor="ctr">
+                    <a:lnL w="12700" cap="flat" cmpd="sng" algn="ctr">
+                      <a:solidFill>
+                        <a:scrgbClr r="0" g="0" b="0"/>
+                      </a:solidFill>
+                      <a:prstDash val="solid"/>
+                      <a:round/>
+                      <a:headEnd type="none" w="med" len="med"/>
+                      <a:tailEnd type="none" w="med" len="med"/>
+                    </a:lnL>
+                    <a:lnR w="12700" cap="flat" cmpd="sng" algn="ctr">
+                      <a:solidFill>
+                        <a:scrgbClr r="0" g="0" b="0"/>
+                      </a:solidFill>
+                      <a:prstDash val="solid"/>
+                      <a:round/>
+                      <a:headEnd type="none" w="med" len="med"/>
+                      <a:tailEnd type="none" w="med" len="med"/>
+                    </a:lnR>
+                    <a:lnT w="12700" cap="flat" cmpd="sng" algn="ctr">
+                      <a:solidFill>
+                        <a:scrgbClr r="0" g="0" b="0"/>
+                      </a:solidFill>
+                      <a:prstDash val="solid"/>
+                      <a:round/>
+                      <a:headEnd type="none" w="med" len="med"/>
+                      <a:tailEnd type="none" w="med" len="med"/>
+                    </a:lnT>
+                    <a:lnB w="12700" cap="flat" cmpd="sng" algn="ctr">
+                      <a:solidFill>
+                        <a:scrgbClr r="0" g="0" b="0"/>
+                      </a:solidFill>
+                      <a:prstDash val="solid"/>
+                      <a:round/>
+                      <a:headEnd type="none" w="med" len="med"/>
+                      <a:tailEnd type="none" w="med" len="med"/>
+                    </a:lnB>
+                  </a:tcPr>
+                </a:tc>
+              </a:tr>
+              <a:tr h="352850">
+                <a:tc>
+                  <a:txBody>
+                    <a:bodyPr/>
+                    <a:lstStyle/>
+                    <a:p>
+                      <a:pPr algn="ctr"/>
+                      <a:r>
+                        <a:rPr lang="en-US" sz="2000"/>
+                        <a:t>Quiescent</a:t>
+                      </a:r>
+                      <a:r>
+                        <a:rPr lang="en-US" sz="2000" baseline="0"/>
+                        <a:t> PWR Loss</a:t>
+                      </a:r>
                       <a:endParaRPr lang="en-US" sz="2000"/>
                     </a:p>
                   </a:txBody>
@@ -6125,8 +6791,6 @@
                     </a:lnB>
                   </a:tcPr>
                 </a:tc>
-              </a:tr>
-              <a:tr h="352850">
                 <a:tc>
                   <a:txBody>
                     <a:bodyPr/>
@@ -6135,258 +6799,8 @@
                       <a:pPr algn="ctr"/>
                       <a:r>
                         <a:rPr lang="en-US" sz="2000"/>
-                        <a:t>Settling</a:t>
+                        <a:t>0.5 mW</a:t>
                       </a:r>
-                      <a:r>
-                        <a:rPr lang="en-US" sz="2000" baseline="0"/>
-                        <a:t> Time</a:t>
-                      </a:r>
-                      <a:endParaRPr lang="en-US" sz="2000"/>
-                    </a:p>
-                  </a:txBody>
-                  <a:tcPr anchor="ctr">
-                    <a:lnL w="12700" cap="flat" cmpd="sng" algn="ctr">
-                      <a:solidFill>
-                        <a:scrgbClr r="0" g="0" b="0"/>
-                      </a:solidFill>
-                      <a:prstDash val="solid"/>
-                      <a:round/>
-                      <a:headEnd type="none" w="med" len="med"/>
-                      <a:tailEnd type="none" w="med" len="med"/>
-                    </a:lnL>
-                    <a:lnR w="12700" cap="flat" cmpd="sng" algn="ctr">
-                      <a:solidFill>
-                        <a:scrgbClr r="0" g="0" b="0"/>
-                      </a:solidFill>
-                      <a:prstDash val="solid"/>
-                      <a:round/>
-                      <a:headEnd type="none" w="med" len="med"/>
-                      <a:tailEnd type="none" w="med" len="med"/>
-                    </a:lnR>
-                    <a:lnT w="12700" cap="flat" cmpd="sng" algn="ctr">
-                      <a:solidFill>
-                        <a:scrgbClr r="0" g="0" b="0"/>
-                      </a:solidFill>
-                      <a:prstDash val="solid"/>
-                      <a:round/>
-                      <a:headEnd type="none" w="med" len="med"/>
-                      <a:tailEnd type="none" w="med" len="med"/>
-                    </a:lnT>
-                    <a:lnB w="12700" cap="flat" cmpd="sng" algn="ctr">
-                      <a:solidFill>
-                        <a:scrgbClr r="0" g="0" b="0"/>
-                      </a:solidFill>
-                      <a:prstDash val="solid"/>
-                      <a:round/>
-                      <a:headEnd type="none" w="med" len="med"/>
-                      <a:tailEnd type="none" w="med" len="med"/>
-                    </a:lnB>
-                  </a:tcPr>
-                </a:tc>
-                <a:tc>
-                  <a:txBody>
-                    <a:bodyPr/>
-                    <a:lstStyle/>
-                    <a:p>
-                      <a:pPr algn="ctr"/>
-                      <a:endParaRPr lang="en-US" sz="2000"/>
-                    </a:p>
-                  </a:txBody>
-                  <a:tcPr anchor="ctr">
-                    <a:lnL w="12700" cap="flat" cmpd="sng" algn="ctr">
-                      <a:solidFill>
-                        <a:scrgbClr r="0" g="0" b="0"/>
-                      </a:solidFill>
-                      <a:prstDash val="solid"/>
-                      <a:round/>
-                      <a:headEnd type="none" w="med" len="med"/>
-                      <a:tailEnd type="none" w="med" len="med"/>
-                    </a:lnL>
-                    <a:lnR w="12700" cap="flat" cmpd="sng" algn="ctr">
-                      <a:solidFill>
-                        <a:scrgbClr r="0" g="0" b="0"/>
-                      </a:solidFill>
-                      <a:prstDash val="solid"/>
-                      <a:round/>
-                      <a:headEnd type="none" w="med" len="med"/>
-                      <a:tailEnd type="none" w="med" len="med"/>
-                    </a:lnR>
-                    <a:lnT w="12700" cap="flat" cmpd="sng" algn="ctr">
-                      <a:solidFill>
-                        <a:scrgbClr r="0" g="0" b="0"/>
-                      </a:solidFill>
-                      <a:prstDash val="solid"/>
-                      <a:round/>
-                      <a:headEnd type="none" w="med" len="med"/>
-                      <a:tailEnd type="none" w="med" len="med"/>
-                    </a:lnT>
-                    <a:lnB w="12700" cap="flat" cmpd="sng" algn="ctr">
-                      <a:solidFill>
-                        <a:scrgbClr r="0" g="0" b="0"/>
-                      </a:solidFill>
-                      <a:prstDash val="solid"/>
-                      <a:round/>
-                      <a:headEnd type="none" w="med" len="med"/>
-                      <a:tailEnd type="none" w="med" len="med"/>
-                    </a:lnB>
-                  </a:tcPr>
-                </a:tc>
-                <a:tc>
-                  <a:txBody>
-                    <a:bodyPr/>
-                    <a:lstStyle/>
-                    <a:p>
-                      <a:pPr algn="ctr"/>
-                      <a:endParaRPr lang="en-US" sz="2000"/>
-                    </a:p>
-                  </a:txBody>
-                  <a:tcPr anchor="ctr">
-                    <a:lnL w="12700" cap="flat" cmpd="sng" algn="ctr">
-                      <a:solidFill>
-                        <a:scrgbClr r="0" g="0" b="0"/>
-                      </a:solidFill>
-                      <a:prstDash val="solid"/>
-                      <a:round/>
-                      <a:headEnd type="none" w="med" len="med"/>
-                      <a:tailEnd type="none" w="med" len="med"/>
-                    </a:lnL>
-                    <a:lnR w="12700" cap="flat" cmpd="sng" algn="ctr">
-                      <a:solidFill>
-                        <a:scrgbClr r="0" g="0" b="0"/>
-                      </a:solidFill>
-                      <a:prstDash val="solid"/>
-                      <a:round/>
-                      <a:headEnd type="none" w="med" len="med"/>
-                      <a:tailEnd type="none" w="med" len="med"/>
-                    </a:lnR>
-                    <a:lnT w="12700" cap="flat" cmpd="sng" algn="ctr">
-                      <a:solidFill>
-                        <a:scrgbClr r="0" g="0" b="0"/>
-                      </a:solidFill>
-                      <a:prstDash val="solid"/>
-                      <a:round/>
-                      <a:headEnd type="none" w="med" len="med"/>
-                      <a:tailEnd type="none" w="med" len="med"/>
-                    </a:lnT>
-                    <a:lnB w="12700" cap="flat" cmpd="sng" algn="ctr">
-                      <a:solidFill>
-                        <a:scrgbClr r="0" g="0" b="0"/>
-                      </a:solidFill>
-                      <a:prstDash val="solid"/>
-                      <a:round/>
-                      <a:headEnd type="none" w="med" len="med"/>
-                      <a:tailEnd type="none" w="med" len="med"/>
-                    </a:lnB>
-                  </a:tcPr>
-                </a:tc>
-              </a:tr>
-              <a:tr h="352850">
-                <a:tc>
-                  <a:txBody>
-                    <a:bodyPr/>
-                    <a:lstStyle/>
-                    <a:p>
-                      <a:pPr algn="ctr"/>
-                      <a:r>
-                        <a:rPr lang="en-US" sz="2000"/>
-                        <a:t>PWR Consumption</a:t>
-                      </a:r>
-                    </a:p>
-                  </a:txBody>
-                  <a:tcPr anchor="ctr">
-                    <a:lnL w="12700" cap="flat" cmpd="sng" algn="ctr">
-                      <a:solidFill>
-                        <a:scrgbClr r="0" g="0" b="0"/>
-                      </a:solidFill>
-                      <a:prstDash val="solid"/>
-                      <a:round/>
-                      <a:headEnd type="none" w="med" len="med"/>
-                      <a:tailEnd type="none" w="med" len="med"/>
-                    </a:lnL>
-                    <a:lnR w="12700" cap="flat" cmpd="sng" algn="ctr">
-                      <a:solidFill>
-                        <a:scrgbClr r="0" g="0" b="0"/>
-                      </a:solidFill>
-                      <a:prstDash val="solid"/>
-                      <a:round/>
-                      <a:headEnd type="none" w="med" len="med"/>
-                      <a:tailEnd type="none" w="med" len="med"/>
-                    </a:lnR>
-                    <a:lnT w="12700" cap="flat" cmpd="sng" algn="ctr">
-                      <a:solidFill>
-                        <a:scrgbClr r="0" g="0" b="0"/>
-                      </a:solidFill>
-                      <a:prstDash val="solid"/>
-                      <a:round/>
-                      <a:headEnd type="none" w="med" len="med"/>
-                      <a:tailEnd type="none" w="med" len="med"/>
-                    </a:lnT>
-                    <a:lnB w="12700" cap="flat" cmpd="sng" algn="ctr">
-                      <a:solidFill>
-                        <a:scrgbClr r="0" g="0" b="0"/>
-                      </a:solidFill>
-                      <a:prstDash val="solid"/>
-                      <a:round/>
-                      <a:headEnd type="none" w="med" len="med"/>
-                      <a:tailEnd type="none" w="med" len="med"/>
-                    </a:lnB>
-                  </a:tcPr>
-                </a:tc>
-                <a:tc>
-                  <a:txBody>
-                    <a:bodyPr/>
-                    <a:lstStyle/>
-                    <a:p>
-                      <a:pPr algn="ctr"/>
-                      <a:endParaRPr lang="en-US" sz="2000"/>
-                    </a:p>
-                  </a:txBody>
-                  <a:tcPr anchor="ctr">
-                    <a:lnL w="12700" cap="flat" cmpd="sng" algn="ctr">
-                      <a:solidFill>
-                        <a:scrgbClr r="0" g="0" b="0"/>
-                      </a:solidFill>
-                      <a:prstDash val="solid"/>
-                      <a:round/>
-                      <a:headEnd type="none" w="med" len="med"/>
-                      <a:tailEnd type="none" w="med" len="med"/>
-                    </a:lnL>
-                    <a:lnR w="12700" cap="flat" cmpd="sng" algn="ctr">
-                      <a:solidFill>
-                        <a:scrgbClr r="0" g="0" b="0"/>
-                      </a:solidFill>
-                      <a:prstDash val="solid"/>
-                      <a:round/>
-                      <a:headEnd type="none" w="med" len="med"/>
-                      <a:tailEnd type="none" w="med" len="med"/>
-                    </a:lnR>
-                    <a:lnT w="12700" cap="flat" cmpd="sng" algn="ctr">
-                      <a:solidFill>
-                        <a:scrgbClr r="0" g="0" b="0"/>
-                      </a:solidFill>
-                      <a:prstDash val="solid"/>
-                      <a:round/>
-                      <a:headEnd type="none" w="med" len="med"/>
-                      <a:tailEnd type="none" w="med" len="med"/>
-                    </a:lnT>
-                    <a:lnB w="12700" cap="flat" cmpd="sng" algn="ctr">
-                      <a:solidFill>
-                        <a:scrgbClr r="0" g="0" b="0"/>
-                      </a:solidFill>
-                      <a:prstDash val="solid"/>
-                      <a:round/>
-                      <a:headEnd type="none" w="med" len="med"/>
-                      <a:tailEnd type="none" w="med" len="med"/>
-                    </a:lnB>
-                  </a:tcPr>
-                </a:tc>
-                <a:tc>
-                  <a:txBody>
-                    <a:bodyPr/>
-                    <a:lstStyle/>
-                    <a:p>
-                      <a:pPr algn="ctr"/>
-                      <a:endParaRPr lang="en-US" sz="2000"/>
                     </a:p>
                   </a:txBody>
                   <a:tcPr anchor="ctr">
@@ -6585,7 +6999,10 @@
                     <a:lstStyle/>
                     <a:p>
                       <a:pPr algn="ctr"/>
-                      <a:endParaRPr lang="en-US" sz="2000"/>
+                      <a:r>
+                        <a:rPr lang="en-US" sz="2000"/>
+                        <a:t>Max. Input (+50 mV)</a:t>
+                      </a:r>
                     </a:p>
                   </a:txBody>
                   <a:tcPr anchor="ctr">
@@ -6681,6 +7098,14 @@
                     <a:lstStyle/>
                     <a:p>
                       <a:pPr algn="ctr"/>
+                      <a:r>
+                        <a:rPr lang="en-US" sz="2000"/>
+                        <a:t>6</a:t>
+                      </a:r>
+                      <a:r>
+                        <a:rPr lang="en-US" sz="2000" baseline="0"/>
+                        <a:t> Volts</a:t>
+                      </a:r>
                       <a:endParaRPr lang="en-US" sz="2000"/>
                     </a:p>
                   </a:txBody>
@@ -6731,7 +7156,10 @@
                     <a:lstStyle/>
                     <a:p>
                       <a:pPr algn="ctr"/>
-                      <a:endParaRPr lang="en-US" sz="2000"/>
+                      <a:r>
+                        <a:rPr lang="en-US" sz="2000"/>
+                        <a:t>Min. Input (-50 mV)</a:t>
+                      </a:r>
                     </a:p>
                   </a:txBody>
                   <a:tcPr anchor="ctr">
@@ -6827,7 +7255,10 @@
                     <a:lstStyle/>
                     <a:p>
                       <a:pPr algn="ctr"/>
-                      <a:endParaRPr lang="en-US" sz="2000"/>
+                      <a:r>
+                        <a:rPr lang="en-US" sz="2000"/>
+                        <a:t>15 Volts</a:t>
+                      </a:r>
                     </a:p>
                   </a:txBody>
                   <a:tcPr anchor="ctr">
@@ -6877,7 +7308,10 @@
                     <a:lstStyle/>
                     <a:p>
                       <a:pPr algn="ctr"/>
-                      <a:endParaRPr lang="en-US" sz="2000"/>
+                      <a:r>
+                        <a:rPr lang="en-US" sz="2000"/>
+                        <a:t>Max Output Current</a:t>
+                      </a:r>
                     </a:p>
                   </a:txBody>
                   <a:tcPr anchor="ctr">
@@ -6925,7 +7359,10 @@
                     <a:lstStyle/>
                     <a:p>
                       <a:pPr algn="ctr"/>
-                      <a:endParaRPr lang="en-US" sz="2000"/>
+                      <a:r>
+                        <a:rPr lang="en-US" sz="2000"/>
+                        <a:t>0.5 A</a:t>
+                      </a:r>
                     </a:p>
                   </a:txBody>
                   <a:tcPr anchor="ctr">
@@ -6973,153 +7410,10 @@
                     <a:lstStyle/>
                     <a:p>
                       <a:pPr algn="ctr"/>
-                      <a:endParaRPr lang="en-US" sz="2000"/>
-                    </a:p>
-                  </a:txBody>
-                  <a:tcPr anchor="ctr">
-                    <a:lnL w="12700" cap="flat" cmpd="sng" algn="ctr">
-                      <a:solidFill>
-                        <a:scrgbClr r="0" g="0" b="0"/>
-                      </a:solidFill>
-                      <a:prstDash val="solid"/>
-                      <a:round/>
-                      <a:headEnd type="none" w="med" len="med"/>
-                      <a:tailEnd type="none" w="med" len="med"/>
-                    </a:lnL>
-                    <a:lnR w="12700" cap="flat" cmpd="sng" algn="ctr">
-                      <a:solidFill>
-                        <a:scrgbClr r="0" g="0" b="0"/>
-                      </a:solidFill>
-                      <a:prstDash val="solid"/>
-                      <a:round/>
-                      <a:headEnd type="none" w="med" len="med"/>
-                      <a:tailEnd type="none" w="med" len="med"/>
-                    </a:lnR>
-                    <a:lnT w="12700" cap="flat" cmpd="sng" algn="ctr">
-                      <a:solidFill>
-                        <a:scrgbClr r="0" g="0" b="0"/>
-                      </a:solidFill>
-                      <a:prstDash val="solid"/>
-                      <a:round/>
-                      <a:headEnd type="none" w="med" len="med"/>
-                      <a:tailEnd type="none" w="med" len="med"/>
-                    </a:lnT>
-                    <a:lnB w="12700" cap="flat" cmpd="sng" algn="ctr">
-                      <a:solidFill>
-                        <a:scrgbClr r="0" g="0" b="0"/>
-                      </a:solidFill>
-                      <a:prstDash val="solid"/>
-                      <a:round/>
-                      <a:headEnd type="none" w="med" len="med"/>
-                      <a:tailEnd type="none" w="med" len="med"/>
-                    </a:lnB>
-                  </a:tcPr>
-                </a:tc>
-              </a:tr>
-              <a:tr h="352850">
-                <a:tc>
-                  <a:txBody>
-                    <a:bodyPr/>
-                    <a:lstStyle/>
-                    <a:p>
-                      <a:pPr algn="ctr"/>
-                      <a:endParaRPr lang="en-US" sz="2000"/>
-                    </a:p>
-                  </a:txBody>
-                  <a:tcPr anchor="ctr">
-                    <a:lnL w="12700" cap="flat" cmpd="sng" algn="ctr">
-                      <a:solidFill>
-                        <a:scrgbClr r="0" g="0" b="0"/>
-                      </a:solidFill>
-                      <a:prstDash val="solid"/>
-                      <a:round/>
-                      <a:headEnd type="none" w="med" len="med"/>
-                      <a:tailEnd type="none" w="med" len="med"/>
-                    </a:lnL>
-                    <a:lnR w="12700" cap="flat" cmpd="sng" algn="ctr">
-                      <a:solidFill>
-                        <a:scrgbClr r="0" g="0" b="0"/>
-                      </a:solidFill>
-                      <a:prstDash val="solid"/>
-                      <a:round/>
-                      <a:headEnd type="none" w="med" len="med"/>
-                      <a:tailEnd type="none" w="med" len="med"/>
-                    </a:lnR>
-                    <a:lnT w="12700" cap="flat" cmpd="sng" algn="ctr">
-                      <a:solidFill>
-                        <a:scrgbClr r="0" g="0" b="0"/>
-                      </a:solidFill>
-                      <a:prstDash val="solid"/>
-                      <a:round/>
-                      <a:headEnd type="none" w="med" len="med"/>
-                      <a:tailEnd type="none" w="med" len="med"/>
-                    </a:lnT>
-                    <a:lnB w="12700" cap="flat" cmpd="sng" algn="ctr">
-                      <a:solidFill>
-                        <a:scrgbClr r="0" g="0" b="0"/>
-                      </a:solidFill>
-                      <a:prstDash val="solid"/>
-                      <a:round/>
-                      <a:headEnd type="none" w="med" len="med"/>
-                      <a:tailEnd type="none" w="med" len="med"/>
-                    </a:lnB>
-                  </a:tcPr>
-                </a:tc>
-                <a:tc>
-                  <a:txBody>
-                    <a:bodyPr/>
-                    <a:lstStyle/>
-                    <a:p>
-                      <a:pPr algn="ctr"/>
-                      <a:endParaRPr lang="en-US" sz="2000"/>
-                    </a:p>
-                  </a:txBody>
-                  <a:tcPr anchor="ctr">
-                    <a:lnL w="12700" cap="flat" cmpd="sng" algn="ctr">
-                      <a:solidFill>
-                        <a:scrgbClr r="0" g="0" b="0"/>
-                      </a:solidFill>
-                      <a:prstDash val="solid"/>
-                      <a:round/>
-                      <a:headEnd type="none" w="med" len="med"/>
-                      <a:tailEnd type="none" w="med" len="med"/>
-                    </a:lnL>
-                    <a:lnR w="12700" cap="flat" cmpd="sng" algn="ctr">
-                      <a:solidFill>
-                        <a:scrgbClr r="0" g="0" b="0"/>
-                      </a:solidFill>
-                      <a:prstDash val="solid"/>
-                      <a:round/>
-                      <a:headEnd type="none" w="med" len="med"/>
-                      <a:tailEnd type="none" w="med" len="med"/>
-                    </a:lnR>
-                    <a:lnT w="12700" cap="flat" cmpd="sng" algn="ctr">
-                      <a:solidFill>
-                        <a:scrgbClr r="0" g="0" b="0"/>
-                      </a:solidFill>
-                      <a:prstDash val="solid"/>
-                      <a:round/>
-                      <a:headEnd type="none" w="med" len="med"/>
-                      <a:tailEnd type="none" w="med" len="med"/>
-                    </a:lnT>
-                    <a:lnB w="12700" cap="flat" cmpd="sng" algn="ctr">
-                      <a:solidFill>
-                        <a:scrgbClr r="0" g="0" b="0"/>
-                      </a:solidFill>
-                      <a:prstDash val="solid"/>
-                      <a:round/>
-                      <a:headEnd type="none" w="med" len="med"/>
-                      <a:tailEnd type="none" w="med" len="med"/>
-                    </a:lnB>
-                  </a:tcPr>
-                </a:tc>
-                <a:tc>
-                  <a:txBody>
-                    <a:bodyPr/>
-                    <a:lstStyle/>
-                    <a:p>
-                      <a:pPr algn="ctr"/>
-                      <a:endParaRPr lang="en-US" sz="2000"/>
+                      <a:r>
+                        <a:rPr lang="en-US" sz="2000"/>
+                        <a:t>3 A</a:t>
+                      </a:r>
                     </a:p>
                   </a:txBody>
                   <a:tcPr anchor="ctr">
@@ -7168,7 +7462,7 @@
       </p:graphicFrame>
       <p:pic>
         <p:nvPicPr>
-          <p:cNvPr id="14" name="Picture 13" descr="Screen shot 2012-04-29 at 4.06.38 PM.png"/>
+          <p:cNvPr id="7" name="Picture 6" descr="Screen Shot 2013-04-09 at 5.31.54 PM.png"/>
           <p:cNvPicPr>
             <a:picLocks noChangeAspect="1"/>
           </p:cNvPicPr>
@@ -7182,8 +7476,200 @@
         </p:blipFill>
         <p:spPr>
           <a:xfrm>
-            <a:off x="250224" y="1913776"/>
-            <a:ext cx="417249" cy="309956"/>
+            <a:off x="257730" y="2418600"/>
+            <a:ext cx="441853" cy="407198"/>
+          </a:xfrm>
+          <a:prstGeom prst="rect">
+            <a:avLst/>
+          </a:prstGeom>
+        </p:spPr>
+      </p:pic>
+      <p:pic>
+        <p:nvPicPr>
+          <p:cNvPr id="8" name="Picture 7" descr="Screen Shot 2013-04-09 at 5.32.01 PM.png"/>
+          <p:cNvPicPr>
+            <a:picLocks noChangeAspect="1"/>
+          </p:cNvPicPr>
+          <p:nvPr/>
+        </p:nvPicPr>
+        <p:blipFill>
+          <a:blip r:embed="rId4"/>
+          <a:stretch>
+            <a:fillRect/>
+          </a:stretch>
+        </p:blipFill>
+        <p:spPr>
+          <a:xfrm>
+            <a:off x="265813" y="1657178"/>
+            <a:ext cx="441853" cy="378731"/>
+          </a:xfrm>
+          <a:prstGeom prst="rect">
+            <a:avLst/>
+          </a:prstGeom>
+        </p:spPr>
+      </p:pic>
+      <p:pic>
+        <p:nvPicPr>
+          <p:cNvPr id="9" name="Picture 8" descr="Screen Shot 2013-04-09 at 5.31.54 PM.png"/>
+          <p:cNvPicPr>
+            <a:picLocks noChangeAspect="1"/>
+          </p:cNvPicPr>
+          <p:nvPr/>
+        </p:nvPicPr>
+        <p:blipFill>
+          <a:blip r:embed="rId3"/>
+          <a:stretch>
+            <a:fillRect/>
+          </a:stretch>
+        </p:blipFill>
+        <p:spPr>
+          <a:xfrm>
+            <a:off x="249319" y="2825798"/>
+            <a:ext cx="441853" cy="407198"/>
+          </a:xfrm>
+          <a:prstGeom prst="rect">
+            <a:avLst/>
+          </a:prstGeom>
+        </p:spPr>
+      </p:pic>
+      <p:pic>
+        <p:nvPicPr>
+          <p:cNvPr id="10" name="Picture 9" descr="Screen Shot 2013-04-09 at 5.31.54 PM.png"/>
+          <p:cNvPicPr>
+            <a:picLocks noChangeAspect="1"/>
+          </p:cNvPicPr>
+          <p:nvPr/>
+        </p:nvPicPr>
+        <p:blipFill>
+          <a:blip r:embed="rId3"/>
+          <a:stretch>
+            <a:fillRect/>
+          </a:stretch>
+        </p:blipFill>
+        <p:spPr>
+          <a:xfrm>
+            <a:off x="257730" y="3622285"/>
+            <a:ext cx="441853" cy="407198"/>
+          </a:xfrm>
+          <a:prstGeom prst="rect">
+            <a:avLst/>
+          </a:prstGeom>
+        </p:spPr>
+      </p:pic>
+      <p:pic>
+        <p:nvPicPr>
+          <p:cNvPr id="15" name="Picture 14" descr="Screen Shot 2013-04-09 at 5.32.01 PM.png"/>
+          <p:cNvPicPr>
+            <a:picLocks noChangeAspect="1"/>
+          </p:cNvPicPr>
+          <p:nvPr/>
+        </p:nvPicPr>
+        <p:blipFill>
+          <a:blip r:embed="rId4"/>
+          <a:stretch>
+            <a:fillRect/>
+          </a:stretch>
+        </p:blipFill>
+        <p:spPr>
+          <a:xfrm>
+            <a:off x="257730" y="4815232"/>
+            <a:ext cx="441853" cy="378731"/>
+          </a:xfrm>
+          <a:prstGeom prst="rect">
+            <a:avLst/>
+          </a:prstGeom>
+        </p:spPr>
+      </p:pic>
+      <p:pic>
+        <p:nvPicPr>
+          <p:cNvPr id="16" name="Picture 15" descr="Screen Shot 2013-04-09 at 5.32.01 PM.png"/>
+          <p:cNvPicPr>
+            <a:picLocks noChangeAspect="1"/>
+          </p:cNvPicPr>
+          <p:nvPr/>
+        </p:nvPicPr>
+        <p:blipFill>
+          <a:blip r:embed="rId4"/>
+          <a:stretch>
+            <a:fillRect/>
+          </a:stretch>
+        </p:blipFill>
+        <p:spPr>
+          <a:xfrm>
+            <a:off x="257730" y="3243882"/>
+            <a:ext cx="441853" cy="378731"/>
+          </a:xfrm>
+          <a:prstGeom prst="rect">
+            <a:avLst/>
+          </a:prstGeom>
+        </p:spPr>
+      </p:pic>
+      <p:pic>
+        <p:nvPicPr>
+          <p:cNvPr id="17" name="Picture 16" descr="Screen Shot 2013-04-09 at 5.31.54 PM.png"/>
+          <p:cNvPicPr>
+            <a:picLocks noChangeAspect="1"/>
+          </p:cNvPicPr>
+          <p:nvPr/>
+        </p:nvPicPr>
+        <p:blipFill>
+          <a:blip r:embed="rId3"/>
+          <a:stretch>
+            <a:fillRect/>
+          </a:stretch>
+        </p:blipFill>
+        <p:spPr>
+          <a:xfrm>
+            <a:off x="257730" y="2028224"/>
+            <a:ext cx="441853" cy="407198"/>
+          </a:xfrm>
+          <a:prstGeom prst="rect">
+            <a:avLst/>
+          </a:prstGeom>
+        </p:spPr>
+      </p:pic>
+      <p:pic>
+        <p:nvPicPr>
+          <p:cNvPr id="18" name="Picture 17" descr="Screen Shot 2013-04-09 at 5.32.01 PM.png"/>
+          <p:cNvPicPr>
+            <a:picLocks noChangeAspect="1"/>
+          </p:cNvPicPr>
+          <p:nvPr/>
+        </p:nvPicPr>
+        <p:blipFill>
+          <a:blip r:embed="rId4"/>
+          <a:stretch>
+            <a:fillRect/>
+          </a:stretch>
+        </p:blipFill>
+        <p:spPr>
+          <a:xfrm>
+            <a:off x="257730" y="4045977"/>
+            <a:ext cx="441853" cy="378731"/>
+          </a:xfrm>
+          <a:prstGeom prst="rect">
+            <a:avLst/>
+          </a:prstGeom>
+        </p:spPr>
+      </p:pic>
+      <p:pic>
+        <p:nvPicPr>
+          <p:cNvPr id="19" name="Picture 18" descr="Screen Shot 2013-04-09 at 5.32.01 PM.png"/>
+          <p:cNvPicPr>
+            <a:picLocks noChangeAspect="1"/>
+          </p:cNvPicPr>
+          <p:nvPr/>
+        </p:nvPicPr>
+        <p:blipFill>
+          <a:blip r:embed="rId4"/>
+          <a:stretch>
+            <a:fillRect/>
+          </a:stretch>
+        </p:blipFill>
+        <p:spPr>
+          <a:xfrm>
+            <a:off x="257566" y="4449449"/>
+            <a:ext cx="441853" cy="378731"/>
           </a:xfrm>
           <a:prstGeom prst="rect">
             <a:avLst/>

</xml_diff>

<commit_message>
finished april 11 powerpoint
</commit_message>
<xml_diff>
--- a/project/april_11/john.pptx
+++ b/project/april_11/john.pptx
@@ -18,7 +18,8 @@
     <p:sldId id="290" r:id="rId12"/>
     <p:sldId id="291" r:id="rId13"/>
     <p:sldId id="282" r:id="rId14"/>
-    <p:sldId id="283" r:id="rId15"/>
+    <p:sldId id="292" r:id="rId15"/>
+    <p:sldId id="283" r:id="rId16"/>
   </p:sldIdLst>
   <p:sldSz cx="9144000" cy="6858000" type="screen4x3"/>
   <p:notesSz cx="6858000" cy="9144000"/>
@@ -3683,7 +3684,862 @@
                 <a:latin typeface="Helvetica Neue"/>
                 <a:cs typeface="Helvetica Neue"/>
               </a:rPr>
-              <a:t>Layout</a:t>
+              <a:t>Layout Floorplan</a:t>
+            </a:r>
+          </a:p>
+        </p:txBody>
+      </p:sp>
+      <p:sp>
+        <p:nvSpPr>
+          <p:cNvPr id="6" name="Rectangle 5"/>
+          <p:cNvSpPr/>
+          <p:nvPr/>
+        </p:nvSpPr>
+        <p:spPr>
+          <a:xfrm>
+            <a:off x="2135914" y="1377980"/>
+            <a:ext cx="3232873" cy="230903"/>
+          </a:xfrm>
+          <a:prstGeom prst="rect">
+            <a:avLst/>
+          </a:prstGeom>
+        </p:spPr>
+        <p:style>
+          <a:lnRef idx="1">
+            <a:schemeClr val="accent1"/>
+          </a:lnRef>
+          <a:fillRef idx="3">
+            <a:schemeClr val="accent1"/>
+          </a:fillRef>
+          <a:effectRef idx="2">
+            <a:schemeClr val="accent1"/>
+          </a:effectRef>
+          <a:fontRef idx="minor">
+            <a:schemeClr val="lt1"/>
+          </a:fontRef>
+        </p:style>
+        <p:txBody>
+          <a:bodyPr rtlCol="0" anchor="ctr"/>
+          <a:lstStyle/>
+          <a:p>
+            <a:pPr algn="ctr"/>
+            <a:r>
+              <a:rPr lang="en-US"/>
+              <a:t>VIN RAIL</a:t>
+            </a:r>
+          </a:p>
+        </p:txBody>
+      </p:sp>
+      <p:sp>
+        <p:nvSpPr>
+          <p:cNvPr id="7" name="Rectangle 6"/>
+          <p:cNvSpPr/>
+          <p:nvPr/>
+        </p:nvSpPr>
+        <p:spPr>
+          <a:xfrm>
+            <a:off x="2135914" y="5055939"/>
+            <a:ext cx="6671924" cy="247396"/>
+          </a:xfrm>
+          <a:prstGeom prst="rect">
+            <a:avLst/>
+          </a:prstGeom>
+        </p:spPr>
+        <p:style>
+          <a:lnRef idx="1">
+            <a:schemeClr val="accent1"/>
+          </a:lnRef>
+          <a:fillRef idx="3">
+            <a:schemeClr val="accent1"/>
+          </a:fillRef>
+          <a:effectRef idx="2">
+            <a:schemeClr val="accent1"/>
+          </a:effectRef>
+          <a:fontRef idx="minor">
+            <a:schemeClr val="lt1"/>
+          </a:fontRef>
+        </p:style>
+        <p:txBody>
+          <a:bodyPr rtlCol="0" anchor="ctr"/>
+          <a:lstStyle/>
+          <a:p>
+            <a:pPr algn="ctr"/>
+            <a:r>
+              <a:rPr lang="en-US"/>
+              <a:t>GND RAIL</a:t>
+            </a:r>
+          </a:p>
+        </p:txBody>
+      </p:sp>
+      <p:sp>
+        <p:nvSpPr>
+          <p:cNvPr id="8" name="Rectangle 7"/>
+          <p:cNvSpPr/>
+          <p:nvPr/>
+        </p:nvSpPr>
+        <p:spPr>
+          <a:xfrm>
+            <a:off x="5521187" y="1377980"/>
+            <a:ext cx="3286651" cy="230903"/>
+          </a:xfrm>
+          <a:prstGeom prst="rect">
+            <a:avLst/>
+          </a:prstGeom>
+        </p:spPr>
+        <p:style>
+          <a:lnRef idx="1">
+            <a:schemeClr val="accent1"/>
+          </a:lnRef>
+          <a:fillRef idx="3">
+            <a:schemeClr val="accent1"/>
+          </a:fillRef>
+          <a:effectRef idx="2">
+            <a:schemeClr val="accent1"/>
+          </a:effectRef>
+          <a:fontRef idx="minor">
+            <a:schemeClr val="lt1"/>
+          </a:fontRef>
+        </p:style>
+        <p:txBody>
+          <a:bodyPr rtlCol="0" anchor="ctr"/>
+          <a:lstStyle/>
+          <a:p>
+            <a:pPr algn="ctr"/>
+            <a:r>
+              <a:rPr lang="en-US"/>
+              <a:t>VOUT RAIL</a:t>
+            </a:r>
+          </a:p>
+        </p:txBody>
+      </p:sp>
+      <p:sp>
+        <p:nvSpPr>
+          <p:cNvPr id="9" name="Rectangle 8"/>
+          <p:cNvSpPr/>
+          <p:nvPr/>
+        </p:nvSpPr>
+        <p:spPr>
+          <a:xfrm>
+            <a:off x="2135915" y="1740835"/>
+            <a:ext cx="2366924" cy="3183144"/>
+          </a:xfrm>
+          <a:prstGeom prst="rect">
+            <a:avLst/>
+          </a:prstGeom>
+        </p:spPr>
+        <p:style>
+          <a:lnRef idx="1">
+            <a:schemeClr val="accent2"/>
+          </a:lnRef>
+          <a:fillRef idx="3">
+            <a:schemeClr val="accent2"/>
+          </a:fillRef>
+          <a:effectRef idx="2">
+            <a:schemeClr val="accent2"/>
+          </a:effectRef>
+          <a:fontRef idx="minor">
+            <a:schemeClr val="lt1"/>
+          </a:fontRef>
+        </p:style>
+        <p:txBody>
+          <a:bodyPr rtlCol="0" anchor="ctr"/>
+          <a:lstStyle/>
+          <a:p>
+            <a:pPr algn="ctr"/>
+            <a:r>
+              <a:rPr lang="en-US"/>
+              <a:t>OP AMP 1</a:t>
+            </a:r>
+          </a:p>
+        </p:txBody>
+      </p:sp>
+      <p:sp>
+        <p:nvSpPr>
+          <p:cNvPr id="10" name="Rectangle 9"/>
+          <p:cNvSpPr/>
+          <p:nvPr/>
+        </p:nvSpPr>
+        <p:spPr>
+          <a:xfrm>
+            <a:off x="4655239" y="1740835"/>
+            <a:ext cx="2366924" cy="3183144"/>
+          </a:xfrm>
+          <a:prstGeom prst="rect">
+            <a:avLst/>
+          </a:prstGeom>
+        </p:spPr>
+        <p:style>
+          <a:lnRef idx="1">
+            <a:schemeClr val="accent2"/>
+          </a:lnRef>
+          <a:fillRef idx="3">
+            <a:schemeClr val="accent2"/>
+          </a:fillRef>
+          <a:effectRef idx="2">
+            <a:schemeClr val="accent2"/>
+          </a:effectRef>
+          <a:fontRef idx="minor">
+            <a:schemeClr val="lt1"/>
+          </a:fontRef>
+        </p:style>
+        <p:txBody>
+          <a:bodyPr rtlCol="0" anchor="ctr"/>
+          <a:lstStyle/>
+          <a:p>
+            <a:pPr algn="ctr"/>
+            <a:r>
+              <a:rPr lang="en-US"/>
+              <a:t>OP AMP 2</a:t>
+            </a:r>
+          </a:p>
+        </p:txBody>
+      </p:sp>
+      <p:sp>
+        <p:nvSpPr>
+          <p:cNvPr id="11" name="Rectangle 10"/>
+          <p:cNvSpPr/>
+          <p:nvPr/>
+        </p:nvSpPr>
+        <p:spPr>
+          <a:xfrm>
+            <a:off x="7191402" y="1740835"/>
+            <a:ext cx="1616436" cy="1690526"/>
+          </a:xfrm>
+          <a:prstGeom prst="rect">
+            <a:avLst/>
+          </a:prstGeom>
+        </p:spPr>
+        <p:style>
+          <a:lnRef idx="1">
+            <a:schemeClr val="accent3"/>
+          </a:lnRef>
+          <a:fillRef idx="3">
+            <a:schemeClr val="accent3"/>
+          </a:fillRef>
+          <a:effectRef idx="2">
+            <a:schemeClr val="accent3"/>
+          </a:effectRef>
+          <a:fontRef idx="minor">
+            <a:schemeClr val="lt1"/>
+          </a:fontRef>
+        </p:style>
+        <p:txBody>
+          <a:bodyPr rtlCol="0" anchor="ctr"/>
+          <a:lstStyle/>
+          <a:p>
+            <a:pPr algn="ctr"/>
+            <a:r>
+              <a:rPr lang="en-US"/>
+              <a:t>Power </a:t>
+            </a:r>
+          </a:p>
+          <a:p>
+            <a:pPr algn="ctr"/>
+            <a:r>
+              <a:rPr lang="en-US"/>
+              <a:t>MOSFET</a:t>
+            </a:r>
+          </a:p>
+        </p:txBody>
+      </p:sp>
+      <p:sp>
+        <p:nvSpPr>
+          <p:cNvPr id="12" name="Rectangle 11"/>
+          <p:cNvSpPr/>
+          <p:nvPr/>
+        </p:nvSpPr>
+        <p:spPr>
+          <a:xfrm>
+            <a:off x="7191402" y="3612809"/>
+            <a:ext cx="1616436" cy="1311170"/>
+          </a:xfrm>
+          <a:prstGeom prst="rect">
+            <a:avLst/>
+          </a:prstGeom>
+        </p:spPr>
+        <p:style>
+          <a:lnRef idx="1">
+            <a:schemeClr val="accent4"/>
+          </a:lnRef>
+          <a:fillRef idx="3">
+            <a:schemeClr val="accent4"/>
+          </a:fillRef>
+          <a:effectRef idx="2">
+            <a:schemeClr val="accent4"/>
+          </a:effectRef>
+          <a:fontRef idx="minor">
+            <a:schemeClr val="lt1"/>
+          </a:fontRef>
+        </p:style>
+        <p:txBody>
+          <a:bodyPr rtlCol="0" anchor="ctr"/>
+          <a:lstStyle/>
+          <a:p>
+            <a:pPr algn="ctr"/>
+            <a:r>
+              <a:rPr lang="en-US"/>
+              <a:t>Common </a:t>
+            </a:r>
+          </a:p>
+          <a:p>
+            <a:pPr algn="ctr"/>
+            <a:r>
+              <a:rPr lang="en-US"/>
+              <a:t>Centroid</a:t>
+            </a:r>
+          </a:p>
+          <a:p>
+            <a:pPr algn="ctr"/>
+            <a:r>
+              <a:rPr lang="en-US"/>
+              <a:t>Precision </a:t>
+            </a:r>
+          </a:p>
+          <a:p>
+            <a:pPr algn="ctr"/>
+            <a:r>
+              <a:rPr lang="en-US"/>
+              <a:t>Resistors</a:t>
+            </a:r>
+          </a:p>
+        </p:txBody>
+      </p:sp>
+      <p:cxnSp>
+        <p:nvCxnSpPr>
+          <p:cNvPr id="14" name="Straight Arrow Connector 13"/>
+          <p:cNvCxnSpPr/>
+          <p:nvPr/>
+        </p:nvCxnSpPr>
+        <p:spPr>
+          <a:xfrm rot="5400000">
+            <a:off x="436860" y="3332407"/>
+            <a:ext cx="3183144" cy="1588"/>
+          </a:xfrm>
+          <a:prstGeom prst="straightConnector1">
+            <a:avLst/>
+          </a:prstGeom>
+          <a:ln>
+            <a:solidFill>
+              <a:schemeClr val="tx1"/>
+            </a:solidFill>
+            <a:headEnd type="arrow"/>
+            <a:tailEnd type="arrow"/>
+          </a:ln>
+          <a:effectLst/>
+        </p:spPr>
+        <p:style>
+          <a:lnRef idx="2">
+            <a:schemeClr val="accent1"/>
+          </a:lnRef>
+          <a:fillRef idx="0">
+            <a:schemeClr val="accent1"/>
+          </a:fillRef>
+          <a:effectRef idx="1">
+            <a:schemeClr val="accent1"/>
+          </a:effectRef>
+          <a:fontRef idx="minor">
+            <a:schemeClr val="tx1"/>
+          </a:fontRef>
+        </p:style>
+      </p:cxnSp>
+      <p:sp>
+        <p:nvSpPr>
+          <p:cNvPr id="15" name="TextBox 14"/>
+          <p:cNvSpPr txBox="1"/>
+          <p:nvPr/>
+        </p:nvSpPr>
+        <p:spPr>
+          <a:xfrm rot="16200000">
+            <a:off x="1413263" y="3120427"/>
+            <a:ext cx="899142" cy="369332"/>
+          </a:xfrm>
+          <a:prstGeom prst="rect">
+            <a:avLst/>
+          </a:prstGeom>
+          <a:noFill/>
+        </p:spPr>
+        <p:txBody>
+          <a:bodyPr wrap="none" rtlCol="0">
+            <a:spAutoFit/>
+          </a:bodyPr>
+          <a:lstStyle/>
+          <a:p>
+            <a:r>
+              <a:rPr lang="en-US"/>
+              <a:t>250 μm</a:t>
+            </a:r>
+          </a:p>
+        </p:txBody>
+      </p:sp>
+      <p:cxnSp>
+        <p:nvCxnSpPr>
+          <p:cNvPr id="16" name="Straight Arrow Connector 15"/>
+          <p:cNvCxnSpPr/>
+          <p:nvPr/>
+        </p:nvCxnSpPr>
+        <p:spPr>
+          <a:xfrm rot="5400000">
+            <a:off x="1864711" y="1488628"/>
+            <a:ext cx="327441" cy="1588"/>
+          </a:xfrm>
+          <a:prstGeom prst="straightConnector1">
+            <a:avLst/>
+          </a:prstGeom>
+          <a:ln>
+            <a:solidFill>
+              <a:schemeClr val="tx1"/>
+            </a:solidFill>
+            <a:headEnd type="arrow"/>
+            <a:tailEnd type="arrow"/>
+          </a:ln>
+          <a:effectLst/>
+        </p:spPr>
+        <p:style>
+          <a:lnRef idx="2">
+            <a:schemeClr val="accent1"/>
+          </a:lnRef>
+          <a:fillRef idx="0">
+            <a:schemeClr val="accent1"/>
+          </a:fillRef>
+          <a:effectRef idx="1">
+            <a:schemeClr val="accent1"/>
+          </a:effectRef>
+          <a:fontRef idx="minor">
+            <a:schemeClr val="tx1"/>
+          </a:fontRef>
+        </p:style>
+      </p:cxnSp>
+      <p:sp>
+        <p:nvSpPr>
+          <p:cNvPr id="17" name="TextBox 16"/>
+          <p:cNvSpPr txBox="1"/>
+          <p:nvPr/>
+        </p:nvSpPr>
+        <p:spPr>
+          <a:xfrm rot="16200000">
+            <a:off x="1368170" y="1386767"/>
+            <a:ext cx="899142" cy="369332"/>
+          </a:xfrm>
+          <a:prstGeom prst="rect">
+            <a:avLst/>
+          </a:prstGeom>
+          <a:noFill/>
+        </p:spPr>
+        <p:txBody>
+          <a:bodyPr wrap="square" rtlCol="0">
+            <a:spAutoFit/>
+          </a:bodyPr>
+          <a:lstStyle/>
+          <a:p>
+            <a:r>
+              <a:rPr lang="en-US"/>
+              <a:t>20 μm</a:t>
+            </a:r>
+          </a:p>
+        </p:txBody>
+      </p:sp>
+      <p:cxnSp>
+        <p:nvCxnSpPr>
+          <p:cNvPr id="19" name="Straight Arrow Connector 18"/>
+          <p:cNvCxnSpPr/>
+          <p:nvPr/>
+        </p:nvCxnSpPr>
+        <p:spPr>
+          <a:xfrm rot="5400000">
+            <a:off x="1864710" y="5200231"/>
+            <a:ext cx="327441" cy="1588"/>
+          </a:xfrm>
+          <a:prstGeom prst="straightConnector1">
+            <a:avLst/>
+          </a:prstGeom>
+          <a:ln>
+            <a:solidFill>
+              <a:schemeClr val="tx1"/>
+            </a:solidFill>
+            <a:headEnd type="arrow"/>
+            <a:tailEnd type="arrow"/>
+          </a:ln>
+          <a:effectLst/>
+        </p:spPr>
+        <p:style>
+          <a:lnRef idx="2">
+            <a:schemeClr val="accent1"/>
+          </a:lnRef>
+          <a:fillRef idx="0">
+            <a:schemeClr val="accent1"/>
+          </a:fillRef>
+          <a:effectRef idx="1">
+            <a:schemeClr val="accent1"/>
+          </a:effectRef>
+          <a:fontRef idx="minor">
+            <a:schemeClr val="tx1"/>
+          </a:fontRef>
+        </p:style>
+      </p:cxnSp>
+      <p:sp>
+        <p:nvSpPr>
+          <p:cNvPr id="20" name="TextBox 19"/>
+          <p:cNvSpPr txBox="1"/>
+          <p:nvPr/>
+        </p:nvSpPr>
+        <p:spPr>
+          <a:xfrm rot="16200000">
+            <a:off x="1368169" y="4938561"/>
+            <a:ext cx="899142" cy="369332"/>
+          </a:xfrm>
+          <a:prstGeom prst="rect">
+            <a:avLst/>
+          </a:prstGeom>
+          <a:noFill/>
+        </p:spPr>
+        <p:txBody>
+          <a:bodyPr wrap="square" rtlCol="0">
+            <a:spAutoFit/>
+          </a:bodyPr>
+          <a:lstStyle/>
+          <a:p>
+            <a:r>
+              <a:rPr lang="en-US"/>
+              <a:t>20 μm</a:t>
+            </a:r>
+          </a:p>
+        </p:txBody>
+      </p:sp>
+      <p:cxnSp>
+        <p:nvCxnSpPr>
+          <p:cNvPr id="21" name="Straight Arrow Connector 20"/>
+          <p:cNvCxnSpPr/>
+          <p:nvPr/>
+        </p:nvCxnSpPr>
+        <p:spPr>
+          <a:xfrm rot="10800000">
+            <a:off x="2135915" y="2016790"/>
+            <a:ext cx="2366926" cy="1588"/>
+          </a:xfrm>
+          <a:prstGeom prst="straightConnector1">
+            <a:avLst/>
+          </a:prstGeom>
+          <a:ln>
+            <a:solidFill>
+              <a:schemeClr val="tx1"/>
+            </a:solidFill>
+            <a:headEnd type="arrow"/>
+            <a:tailEnd type="arrow"/>
+          </a:ln>
+          <a:effectLst/>
+        </p:spPr>
+        <p:style>
+          <a:lnRef idx="2">
+            <a:schemeClr val="accent1"/>
+          </a:lnRef>
+          <a:fillRef idx="0">
+            <a:schemeClr val="accent1"/>
+          </a:fillRef>
+          <a:effectRef idx="1">
+            <a:schemeClr val="accent1"/>
+          </a:effectRef>
+          <a:fontRef idx="minor">
+            <a:schemeClr val="tx1"/>
+          </a:fontRef>
+        </p:style>
+      </p:cxnSp>
+      <p:sp>
+        <p:nvSpPr>
+          <p:cNvPr id="22" name="TextBox 21"/>
+          <p:cNvSpPr txBox="1"/>
+          <p:nvPr/>
+        </p:nvSpPr>
+        <p:spPr>
+          <a:xfrm>
+            <a:off x="2821639" y="1676529"/>
+            <a:ext cx="899142" cy="369332"/>
+          </a:xfrm>
+          <a:prstGeom prst="rect">
+            <a:avLst/>
+          </a:prstGeom>
+          <a:noFill/>
+        </p:spPr>
+        <p:txBody>
+          <a:bodyPr wrap="square" rtlCol="0">
+            <a:spAutoFit/>
+          </a:bodyPr>
+          <a:lstStyle/>
+          <a:p>
+            <a:r>
+              <a:rPr lang="en-US"/>
+              <a:t>200 μm</a:t>
+            </a:r>
+          </a:p>
+        </p:txBody>
+      </p:sp>
+      <p:cxnSp>
+        <p:nvCxnSpPr>
+          <p:cNvPr id="25" name="Straight Arrow Connector 24"/>
+          <p:cNvCxnSpPr/>
+          <p:nvPr/>
+        </p:nvCxnSpPr>
+        <p:spPr>
+          <a:xfrm rot="10800000">
+            <a:off x="4655241" y="2018378"/>
+            <a:ext cx="2366926" cy="1588"/>
+          </a:xfrm>
+          <a:prstGeom prst="straightConnector1">
+            <a:avLst/>
+          </a:prstGeom>
+          <a:ln>
+            <a:solidFill>
+              <a:schemeClr val="tx1"/>
+            </a:solidFill>
+            <a:headEnd type="arrow"/>
+            <a:tailEnd type="arrow"/>
+          </a:ln>
+          <a:effectLst/>
+        </p:spPr>
+        <p:style>
+          <a:lnRef idx="2">
+            <a:schemeClr val="accent1"/>
+          </a:lnRef>
+          <a:fillRef idx="0">
+            <a:schemeClr val="accent1"/>
+          </a:fillRef>
+          <a:effectRef idx="1">
+            <a:schemeClr val="accent1"/>
+          </a:effectRef>
+          <a:fontRef idx="minor">
+            <a:schemeClr val="tx1"/>
+          </a:fontRef>
+        </p:style>
+      </p:cxnSp>
+      <p:sp>
+        <p:nvSpPr>
+          <p:cNvPr id="26" name="TextBox 25"/>
+          <p:cNvSpPr txBox="1"/>
+          <p:nvPr/>
+        </p:nvSpPr>
+        <p:spPr>
+          <a:xfrm>
+            <a:off x="5340965" y="1678117"/>
+            <a:ext cx="899142" cy="369332"/>
+          </a:xfrm>
+          <a:prstGeom prst="rect">
+            <a:avLst/>
+          </a:prstGeom>
+          <a:noFill/>
+        </p:spPr>
+        <p:txBody>
+          <a:bodyPr wrap="square" rtlCol="0">
+            <a:spAutoFit/>
+          </a:bodyPr>
+          <a:lstStyle/>
+          <a:p>
+            <a:r>
+              <a:rPr lang="en-US"/>
+              <a:t>200 μm</a:t>
+            </a:r>
+          </a:p>
+        </p:txBody>
+      </p:sp>
+      <p:cxnSp>
+        <p:nvCxnSpPr>
+          <p:cNvPr id="27" name="Straight Arrow Connector 26"/>
+          <p:cNvCxnSpPr/>
+          <p:nvPr/>
+        </p:nvCxnSpPr>
+        <p:spPr>
+          <a:xfrm rot="10800000">
+            <a:off x="7191402" y="2016790"/>
+            <a:ext cx="1616436" cy="4765"/>
+          </a:xfrm>
+          <a:prstGeom prst="straightConnector1">
+            <a:avLst/>
+          </a:prstGeom>
+          <a:ln>
+            <a:solidFill>
+              <a:schemeClr val="tx1"/>
+            </a:solidFill>
+            <a:headEnd type="arrow"/>
+            <a:tailEnd type="arrow"/>
+          </a:ln>
+          <a:effectLst/>
+        </p:spPr>
+        <p:style>
+          <a:lnRef idx="2">
+            <a:schemeClr val="accent1"/>
+          </a:lnRef>
+          <a:fillRef idx="0">
+            <a:schemeClr val="accent1"/>
+          </a:fillRef>
+          <a:effectRef idx="1">
+            <a:schemeClr val="accent1"/>
+          </a:effectRef>
+          <a:fontRef idx="minor">
+            <a:schemeClr val="tx1"/>
+          </a:fontRef>
+        </p:style>
+      </p:cxnSp>
+      <p:sp>
+        <p:nvSpPr>
+          <p:cNvPr id="28" name="TextBox 27"/>
+          <p:cNvSpPr txBox="1"/>
+          <p:nvPr/>
+        </p:nvSpPr>
+        <p:spPr>
+          <a:xfrm>
+            <a:off x="7576207" y="1679705"/>
+            <a:ext cx="899142" cy="369332"/>
+          </a:xfrm>
+          <a:prstGeom prst="rect">
+            <a:avLst/>
+          </a:prstGeom>
+          <a:noFill/>
+        </p:spPr>
+        <p:txBody>
+          <a:bodyPr wrap="square" rtlCol="0">
+            <a:spAutoFit/>
+          </a:bodyPr>
+          <a:lstStyle/>
+          <a:p>
+            <a:r>
+              <a:rPr lang="en-US"/>
+              <a:t>70 μm</a:t>
+            </a:r>
+          </a:p>
+        </p:txBody>
+      </p:sp>
+      <p:cxnSp>
+        <p:nvCxnSpPr>
+          <p:cNvPr id="30" name="Straight Arrow Connector 29"/>
+          <p:cNvCxnSpPr/>
+          <p:nvPr/>
+        </p:nvCxnSpPr>
+        <p:spPr>
+          <a:xfrm rot="10800000">
+            <a:off x="2135914" y="1187288"/>
+            <a:ext cx="6671926" cy="29073"/>
+          </a:xfrm>
+          <a:prstGeom prst="straightConnector1">
+            <a:avLst/>
+          </a:prstGeom>
+          <a:ln w="76200" cap="flat" cmpd="sng" algn="ctr">
+            <a:solidFill>
+              <a:schemeClr val="tx1"/>
+            </a:solidFill>
+            <a:prstDash val="solid"/>
+            <a:round/>
+            <a:headEnd type="arrow" w="med" len="med"/>
+            <a:tailEnd type="arrow" w="med" len="med"/>
+          </a:ln>
+          <a:effectLst/>
+        </p:spPr>
+        <p:style>
+          <a:lnRef idx="2">
+            <a:schemeClr val="accent1"/>
+          </a:lnRef>
+          <a:fillRef idx="0">
+            <a:schemeClr val="accent1"/>
+          </a:fillRef>
+          <a:effectRef idx="1">
+            <a:schemeClr val="accent1"/>
+          </a:effectRef>
+          <a:fontRef idx="minor">
+            <a:schemeClr val="tx1"/>
+          </a:fontRef>
+        </p:style>
+      </p:cxnSp>
+      <p:sp>
+        <p:nvSpPr>
+          <p:cNvPr id="31" name="TextBox 30"/>
+          <p:cNvSpPr txBox="1"/>
+          <p:nvPr/>
+        </p:nvSpPr>
+        <p:spPr>
+          <a:xfrm>
+            <a:off x="4516167" y="737683"/>
+            <a:ext cx="2010040" cy="523220"/>
+          </a:xfrm>
+          <a:prstGeom prst="rect">
+            <a:avLst/>
+          </a:prstGeom>
+          <a:noFill/>
+        </p:spPr>
+        <p:txBody>
+          <a:bodyPr wrap="square" rtlCol="0">
+            <a:spAutoFit/>
+          </a:bodyPr>
+          <a:lstStyle/>
+          <a:p>
+            <a:r>
+              <a:rPr lang="en-US" sz="2800" b="1"/>
+              <a:t>0.47 mm</a:t>
+            </a:r>
+          </a:p>
+        </p:txBody>
+      </p:sp>
+      <p:cxnSp>
+        <p:nvCxnSpPr>
+          <p:cNvPr id="34" name="Straight Arrow Connector 33"/>
+          <p:cNvCxnSpPr/>
+          <p:nvPr/>
+        </p:nvCxnSpPr>
+        <p:spPr>
+          <a:xfrm rot="5400000" flipH="1" flipV="1">
+            <a:off x="-389177" y="3340659"/>
+            <a:ext cx="3925355" cy="1588"/>
+          </a:xfrm>
+          <a:prstGeom prst="straightConnector1">
+            <a:avLst/>
+          </a:prstGeom>
+          <a:ln w="76200" cap="flat" cmpd="sng" algn="ctr">
+            <a:solidFill>
+              <a:schemeClr val="tx1"/>
+            </a:solidFill>
+            <a:prstDash val="solid"/>
+            <a:round/>
+            <a:headEnd type="arrow" w="med" len="med"/>
+            <a:tailEnd type="arrow" w="med" len="med"/>
+          </a:ln>
+          <a:effectLst/>
+        </p:spPr>
+        <p:style>
+          <a:lnRef idx="2">
+            <a:schemeClr val="accent1"/>
+          </a:lnRef>
+          <a:fillRef idx="0">
+            <a:schemeClr val="accent1"/>
+          </a:fillRef>
+          <a:effectRef idx="1">
+            <a:schemeClr val="accent1"/>
+          </a:effectRef>
+          <a:fontRef idx="minor">
+            <a:schemeClr val="tx1"/>
+          </a:fontRef>
+        </p:style>
+      </p:cxnSp>
+      <p:sp>
+        <p:nvSpPr>
+          <p:cNvPr id="37" name="TextBox 36"/>
+          <p:cNvSpPr txBox="1"/>
+          <p:nvPr/>
+        </p:nvSpPr>
+        <p:spPr>
+          <a:xfrm>
+            <a:off x="151105" y="2733527"/>
+            <a:ext cx="2010040" cy="523220"/>
+          </a:xfrm>
+          <a:prstGeom prst="rect">
+            <a:avLst/>
+          </a:prstGeom>
+          <a:noFill/>
+        </p:spPr>
+        <p:txBody>
+          <a:bodyPr wrap="square" rtlCol="0">
+            <a:spAutoFit/>
+          </a:bodyPr>
+          <a:lstStyle/>
+          <a:p>
+            <a:r>
+              <a:rPr lang="en-US" sz="2800" b="1"/>
+              <a:t>0.29 mm</a:t>
             </a:r>
           </a:p>
         </p:txBody>
@@ -3704,6 +4560,612 @@
 </file>
 
 <file path=ppt/slides/slide14.xml><?xml version="1.0" encoding="utf-8"?>
+<p:sld xmlns:a="http://schemas.openxmlformats.org/drawingml/2006/main" xmlns:r="http://schemas.openxmlformats.org/officeDocument/2006/relationships" xmlns:mc="http://schemas.openxmlformats.org/markup-compatibility/2006" xmlns:mv="urn:schemas-microsoft-com:mac:vml" xmlns:p="http://schemas.openxmlformats.org/presentationml/2006/main" mc:Ignorable="mv" mc:PreserveAttributes="mv:*">
+  <p:cSld>
+    <p:spTree>
+      <p:nvGrpSpPr>
+        <p:cNvPr id="1" name=""/>
+        <p:cNvGrpSpPr/>
+        <p:nvPr/>
+      </p:nvGrpSpPr>
+      <p:grpSpPr>
+        <a:xfrm>
+          <a:off x="0" y="0"/>
+          <a:ext cx="0" cy="0"/>
+          <a:chOff x="0" y="0"/>
+          <a:chExt cx="0" cy="0"/>
+        </a:xfrm>
+      </p:grpSpPr>
+      <p:pic>
+        <p:nvPicPr>
+          <p:cNvPr id="4" name="Picture 3" descr="layout.png"/>
+          <p:cNvPicPr>
+            <a:picLocks noChangeAspect="1"/>
+          </p:cNvPicPr>
+          <p:nvPr/>
+        </p:nvPicPr>
+        <p:blipFill>
+          <a:blip r:embed="rId2"/>
+          <a:stretch>
+            <a:fillRect/>
+          </a:stretch>
+        </p:blipFill>
+        <p:spPr>
+          <a:xfrm>
+            <a:off x="0" y="0"/>
+            <a:ext cx="9144000" cy="6858000"/>
+          </a:xfrm>
+          <a:prstGeom prst="rect">
+            <a:avLst/>
+          </a:prstGeom>
+        </p:spPr>
+      </p:pic>
+      <p:sp>
+        <p:nvSpPr>
+          <p:cNvPr id="5" name="TextBox 4"/>
+          <p:cNvSpPr txBox="1"/>
+          <p:nvPr/>
+        </p:nvSpPr>
+        <p:spPr>
+          <a:xfrm>
+            <a:off x="-1" y="0"/>
+            <a:ext cx="9144001" cy="646331"/>
+          </a:xfrm>
+          <a:prstGeom prst="rect">
+            <a:avLst/>
+          </a:prstGeom>
+          <a:noFill/>
+        </p:spPr>
+        <p:txBody>
+          <a:bodyPr wrap="square" rtlCol="0">
+            <a:spAutoFit/>
+          </a:bodyPr>
+          <a:lstStyle/>
+          <a:p>
+            <a:pPr algn="ctr"/>
+            <a:r>
+              <a:rPr lang="en-US" sz="3600" b="1">
+                <a:solidFill>
+                  <a:schemeClr val="bg1"/>
+                </a:solidFill>
+                <a:effectLst>
+                  <a:outerShdw blurRad="50800" dist="38100" dir="2700000">
+                    <a:srgbClr val="000000">
+                      <a:alpha val="43000"/>
+                    </a:srgbClr>
+                  </a:outerShdw>
+                </a:effectLst>
+                <a:latin typeface="Helvetica Neue"/>
+                <a:cs typeface="Helvetica Neue"/>
+              </a:rPr>
+              <a:t>Common Centroid Plan</a:t>
+            </a:r>
+          </a:p>
+        </p:txBody>
+      </p:sp>
+      <p:cxnSp>
+        <p:nvCxnSpPr>
+          <p:cNvPr id="32" name="Straight Connector 31"/>
+          <p:cNvCxnSpPr/>
+          <p:nvPr/>
+        </p:nvCxnSpPr>
+        <p:spPr>
+          <a:xfrm rot="5400000">
+            <a:off x="80100" y="3187274"/>
+            <a:ext cx="4428373" cy="1588"/>
+          </a:xfrm>
+          <a:prstGeom prst="line">
+            <a:avLst/>
+          </a:prstGeom>
+          <a:ln>
+            <a:solidFill>
+              <a:srgbClr val="000000"/>
+            </a:solidFill>
+          </a:ln>
+          <a:effectLst/>
+        </p:spPr>
+        <p:style>
+          <a:lnRef idx="2">
+            <a:schemeClr val="accent1"/>
+          </a:lnRef>
+          <a:fillRef idx="0">
+            <a:schemeClr val="accent1"/>
+          </a:fillRef>
+          <a:effectRef idx="1">
+            <a:schemeClr val="accent1"/>
+          </a:effectRef>
+          <a:fontRef idx="minor">
+            <a:schemeClr val="tx1"/>
+          </a:fontRef>
+        </p:style>
+      </p:cxnSp>
+      <p:sp>
+        <p:nvSpPr>
+          <p:cNvPr id="33" name="TextBox 32"/>
+          <p:cNvSpPr txBox="1"/>
+          <p:nvPr/>
+        </p:nvSpPr>
+        <p:spPr>
+          <a:xfrm>
+            <a:off x="428850" y="1352944"/>
+            <a:ext cx="1545215" cy="523220"/>
+          </a:xfrm>
+          <a:prstGeom prst="rect">
+            <a:avLst/>
+          </a:prstGeom>
+          <a:noFill/>
+        </p:spPr>
+        <p:txBody>
+          <a:bodyPr wrap="none" rtlCol="0">
+            <a:spAutoFit/>
+          </a:bodyPr>
+          <a:lstStyle/>
+          <a:p>
+            <a:r>
+              <a:rPr lang="en-US" sz="2800" b="1"/>
+              <a:t>Op Amps</a:t>
+            </a:r>
+          </a:p>
+        </p:txBody>
+      </p:sp>
+      <p:sp>
+        <p:nvSpPr>
+          <p:cNvPr id="36" name="TextBox 35"/>
+          <p:cNvSpPr txBox="1"/>
+          <p:nvPr/>
+        </p:nvSpPr>
+        <p:spPr>
+          <a:xfrm>
+            <a:off x="2626534" y="1091334"/>
+            <a:ext cx="1570813" cy="954107"/>
+          </a:xfrm>
+          <a:prstGeom prst="rect">
+            <a:avLst/>
+          </a:prstGeom>
+          <a:noFill/>
+        </p:spPr>
+        <p:txBody>
+          <a:bodyPr wrap="none" rtlCol="0">
+            <a:spAutoFit/>
+          </a:bodyPr>
+          <a:lstStyle/>
+          <a:p>
+            <a:r>
+              <a:rPr lang="en-US" sz="2800" b="1"/>
+              <a:t>Inverting</a:t>
+            </a:r>
+          </a:p>
+          <a:p>
+            <a:r>
+              <a:rPr lang="en-US" sz="2800" b="1"/>
+              <a:t>Amplifier</a:t>
+            </a:r>
+          </a:p>
+        </p:txBody>
+      </p:sp>
+      <p:sp>
+        <p:nvSpPr>
+          <p:cNvPr id="38" name="TextBox 37"/>
+          <p:cNvSpPr txBox="1"/>
+          <p:nvPr/>
+        </p:nvSpPr>
+        <p:spPr>
+          <a:xfrm>
+            <a:off x="4597597" y="1091334"/>
+            <a:ext cx="1862033" cy="954107"/>
+          </a:xfrm>
+          <a:prstGeom prst="rect">
+            <a:avLst/>
+          </a:prstGeom>
+          <a:noFill/>
+        </p:spPr>
+        <p:txBody>
+          <a:bodyPr wrap="none" rtlCol="0">
+            <a:spAutoFit/>
+          </a:bodyPr>
+          <a:lstStyle/>
+          <a:p>
+            <a:r>
+              <a:rPr lang="en-US" sz="2800" b="1"/>
+              <a:t>Differential</a:t>
+            </a:r>
+          </a:p>
+          <a:p>
+            <a:r>
+              <a:rPr lang="en-US" sz="2800" b="1"/>
+              <a:t>Amplifier</a:t>
+            </a:r>
+          </a:p>
+        </p:txBody>
+      </p:sp>
+      <p:sp>
+        <p:nvSpPr>
+          <p:cNvPr id="39" name="TextBox 38"/>
+          <p:cNvSpPr txBox="1"/>
+          <p:nvPr/>
+        </p:nvSpPr>
+        <p:spPr>
+          <a:xfrm>
+            <a:off x="6973052" y="1091334"/>
+            <a:ext cx="1590975" cy="954107"/>
+          </a:xfrm>
+          <a:prstGeom prst="rect">
+            <a:avLst/>
+          </a:prstGeom>
+          <a:noFill/>
+        </p:spPr>
+        <p:txBody>
+          <a:bodyPr wrap="none" rtlCol="0">
+            <a:spAutoFit/>
+          </a:bodyPr>
+          <a:lstStyle/>
+          <a:p>
+            <a:r>
+              <a:rPr lang="en-US" sz="2800" b="1"/>
+              <a:t>Feedback</a:t>
+            </a:r>
+          </a:p>
+          <a:p>
+            <a:r>
+              <a:rPr lang="en-US" sz="2800" b="1"/>
+              <a:t>Divider</a:t>
+            </a:r>
+          </a:p>
+        </p:txBody>
+      </p:sp>
+      <p:cxnSp>
+        <p:nvCxnSpPr>
+          <p:cNvPr id="40" name="Straight Connector 39"/>
+          <p:cNvCxnSpPr/>
+          <p:nvPr/>
+        </p:nvCxnSpPr>
+        <p:spPr>
+          <a:xfrm rot="5400000">
+            <a:off x="2273041" y="3187273"/>
+            <a:ext cx="4428373" cy="1588"/>
+          </a:xfrm>
+          <a:prstGeom prst="line">
+            <a:avLst/>
+          </a:prstGeom>
+          <a:ln>
+            <a:solidFill>
+              <a:srgbClr val="000000"/>
+            </a:solidFill>
+          </a:ln>
+          <a:effectLst/>
+        </p:spPr>
+        <p:style>
+          <a:lnRef idx="2">
+            <a:schemeClr val="accent1"/>
+          </a:lnRef>
+          <a:fillRef idx="0">
+            <a:schemeClr val="accent1"/>
+          </a:fillRef>
+          <a:effectRef idx="1">
+            <a:schemeClr val="accent1"/>
+          </a:effectRef>
+          <a:fontRef idx="minor">
+            <a:schemeClr val="tx1"/>
+          </a:fontRef>
+        </p:style>
+      </p:cxnSp>
+      <p:cxnSp>
+        <p:nvCxnSpPr>
+          <p:cNvPr id="41" name="Straight Connector 40"/>
+          <p:cNvCxnSpPr/>
+          <p:nvPr/>
+        </p:nvCxnSpPr>
+        <p:spPr>
+          <a:xfrm rot="5400000">
+            <a:off x="4433787" y="3187277"/>
+            <a:ext cx="4428373" cy="1588"/>
+          </a:xfrm>
+          <a:prstGeom prst="line">
+            <a:avLst/>
+          </a:prstGeom>
+          <a:ln>
+            <a:solidFill>
+              <a:srgbClr val="000000"/>
+            </a:solidFill>
+          </a:ln>
+          <a:effectLst/>
+        </p:spPr>
+        <p:style>
+          <a:lnRef idx="2">
+            <a:schemeClr val="accent1"/>
+          </a:lnRef>
+          <a:fillRef idx="0">
+            <a:schemeClr val="accent1"/>
+          </a:fillRef>
+          <a:effectRef idx="1">
+            <a:schemeClr val="accent1"/>
+          </a:effectRef>
+          <a:fontRef idx="minor">
+            <a:schemeClr val="tx1"/>
+          </a:fontRef>
+        </p:style>
+      </p:cxnSp>
+      <p:sp>
+        <p:nvSpPr>
+          <p:cNvPr id="42" name="TextBox 41"/>
+          <p:cNvSpPr txBox="1"/>
+          <p:nvPr/>
+        </p:nvSpPr>
+        <p:spPr>
+          <a:xfrm>
+            <a:off x="354633" y="3051207"/>
+            <a:ext cx="1929660" cy="923330"/>
+          </a:xfrm>
+          <a:prstGeom prst="rect">
+            <a:avLst/>
+          </a:prstGeom>
+          <a:noFill/>
+        </p:spPr>
+        <p:txBody>
+          <a:bodyPr wrap="none" rtlCol="0">
+            <a:spAutoFit/>
+          </a:bodyPr>
+          <a:lstStyle/>
+          <a:p>
+            <a:pPr algn="ctr"/>
+            <a:r>
+              <a:rPr lang="en-US"/>
+              <a:t>Common centroid</a:t>
+            </a:r>
+          </a:p>
+          <a:p>
+            <a:pPr algn="ctr"/>
+            <a:r>
+              <a:rPr lang="en-US"/>
+              <a:t>already completed</a:t>
+            </a:r>
+          </a:p>
+          <a:p>
+            <a:pPr algn="ctr"/>
+            <a:r>
+              <a:rPr lang="en-US"/>
+              <a:t>in homework 4</a:t>
+            </a:r>
+          </a:p>
+        </p:txBody>
+      </p:sp>
+      <p:sp>
+        <p:nvSpPr>
+          <p:cNvPr id="43" name="TextBox 42"/>
+          <p:cNvSpPr txBox="1"/>
+          <p:nvPr/>
+        </p:nvSpPr>
+        <p:spPr>
+          <a:xfrm>
+            <a:off x="2816478" y="2506938"/>
+            <a:ext cx="1380869" cy="2031325"/>
+          </a:xfrm>
+          <a:prstGeom prst="rect">
+            <a:avLst/>
+          </a:prstGeom>
+          <a:noFill/>
+        </p:spPr>
+        <p:txBody>
+          <a:bodyPr wrap="none" rtlCol="0">
+            <a:spAutoFit/>
+          </a:bodyPr>
+          <a:lstStyle/>
+          <a:p>
+            <a:pPr algn="ctr"/>
+            <a:r>
+              <a:rPr lang="en-US"/>
+              <a:t>R1: 50 kΩ</a:t>
+            </a:r>
+          </a:p>
+          <a:p>
+            <a:pPr algn="ctr"/>
+            <a:r>
+              <a:rPr lang="en-US"/>
+              <a:t>R2: 1 kΩ</a:t>
+            </a:r>
+          </a:p>
+          <a:p>
+            <a:pPr algn="ctr"/>
+            <a:endParaRPr lang="en-US"/>
+          </a:p>
+          <a:p>
+            <a:pPr algn="ctr"/>
+            <a:r>
+              <a:rPr lang="en-US"/>
+              <a:t>Unit Resistor</a:t>
+            </a:r>
+          </a:p>
+          <a:p>
+            <a:pPr algn="ctr"/>
+            <a:r>
+              <a:rPr lang="en-US"/>
+              <a:t>for common</a:t>
+            </a:r>
+          </a:p>
+          <a:p>
+            <a:pPr algn="ctr"/>
+            <a:r>
+              <a:rPr lang="en-US"/>
+              <a:t>centroid:</a:t>
+            </a:r>
+          </a:p>
+          <a:p>
+            <a:pPr algn="ctr"/>
+            <a:r>
+              <a:rPr lang="en-US"/>
+              <a:t>1 kΩ</a:t>
+            </a:r>
+          </a:p>
+        </p:txBody>
+      </p:sp>
+      <p:sp>
+        <p:nvSpPr>
+          <p:cNvPr id="44" name="TextBox 43"/>
+          <p:cNvSpPr txBox="1"/>
+          <p:nvPr/>
+        </p:nvSpPr>
+        <p:spPr>
+          <a:xfrm>
+            <a:off x="4873965" y="2506938"/>
+            <a:ext cx="1380869" cy="2585323"/>
+          </a:xfrm>
+          <a:prstGeom prst="rect">
+            <a:avLst/>
+          </a:prstGeom>
+          <a:noFill/>
+        </p:spPr>
+        <p:txBody>
+          <a:bodyPr wrap="none" rtlCol="0">
+            <a:spAutoFit/>
+          </a:bodyPr>
+          <a:lstStyle/>
+          <a:p>
+            <a:pPr algn="ctr"/>
+            <a:r>
+              <a:rPr lang="en-US"/>
+              <a:t>R1: 10 kΩ</a:t>
+            </a:r>
+          </a:p>
+          <a:p>
+            <a:pPr algn="ctr"/>
+            <a:r>
+              <a:rPr lang="en-US"/>
+              <a:t>R2: 10 kΩ</a:t>
+            </a:r>
+          </a:p>
+          <a:p>
+            <a:pPr algn="ctr"/>
+            <a:r>
+              <a:rPr lang="en-US"/>
+              <a:t>R3: 10 kΩ</a:t>
+            </a:r>
+          </a:p>
+          <a:p>
+            <a:pPr algn="ctr"/>
+            <a:r>
+              <a:rPr lang="en-US"/>
+              <a:t>R4: 10 kΩ</a:t>
+            </a:r>
+          </a:p>
+          <a:p>
+            <a:pPr algn="ctr"/>
+            <a:endParaRPr lang="en-US"/>
+          </a:p>
+          <a:p>
+            <a:pPr algn="ctr"/>
+            <a:r>
+              <a:rPr lang="en-US"/>
+              <a:t>Unit Resistor</a:t>
+            </a:r>
+          </a:p>
+          <a:p>
+            <a:pPr algn="ctr"/>
+            <a:r>
+              <a:rPr lang="en-US"/>
+              <a:t>for common</a:t>
+            </a:r>
+          </a:p>
+          <a:p>
+            <a:pPr algn="ctr"/>
+            <a:r>
+              <a:rPr lang="en-US"/>
+              <a:t>centroid:</a:t>
+            </a:r>
+          </a:p>
+          <a:p>
+            <a:pPr algn="ctr"/>
+            <a:r>
+              <a:rPr lang="en-US"/>
+              <a:t>2.5 kΩ</a:t>
+            </a:r>
+          </a:p>
+        </p:txBody>
+      </p:sp>
+      <p:sp>
+        <p:nvSpPr>
+          <p:cNvPr id="45" name="TextBox 44"/>
+          <p:cNvSpPr txBox="1"/>
+          <p:nvPr/>
+        </p:nvSpPr>
+        <p:spPr>
+          <a:xfrm>
+            <a:off x="7067700" y="2506938"/>
+            <a:ext cx="1380869" cy="2031325"/>
+          </a:xfrm>
+          <a:prstGeom prst="rect">
+            <a:avLst/>
+          </a:prstGeom>
+          <a:noFill/>
+        </p:spPr>
+        <p:txBody>
+          <a:bodyPr wrap="none" rtlCol="0">
+            <a:spAutoFit/>
+          </a:bodyPr>
+          <a:lstStyle/>
+          <a:p>
+            <a:pPr algn="ctr"/>
+            <a:r>
+              <a:rPr lang="en-US"/>
+              <a:t>R1: 1 kΩ</a:t>
+            </a:r>
+          </a:p>
+          <a:p>
+            <a:pPr algn="ctr"/>
+            <a:r>
+              <a:rPr lang="en-US"/>
+              <a:t>R2: 1 kΩ</a:t>
+            </a:r>
+          </a:p>
+          <a:p>
+            <a:pPr algn="ctr"/>
+            <a:endParaRPr lang="en-US"/>
+          </a:p>
+          <a:p>
+            <a:pPr algn="ctr"/>
+            <a:r>
+              <a:rPr lang="en-US"/>
+              <a:t>Unit Resistor</a:t>
+            </a:r>
+          </a:p>
+          <a:p>
+            <a:pPr algn="ctr"/>
+            <a:r>
+              <a:rPr lang="en-US"/>
+              <a:t>for common</a:t>
+            </a:r>
+          </a:p>
+          <a:p>
+            <a:pPr algn="ctr"/>
+            <a:r>
+              <a:rPr lang="en-US"/>
+              <a:t>centroid:</a:t>
+            </a:r>
+          </a:p>
+          <a:p>
+            <a:pPr algn="ctr"/>
+            <a:r>
+              <a:rPr lang="en-US"/>
+              <a:t>500 Ω</a:t>
+            </a:r>
+          </a:p>
+        </p:txBody>
+      </p:sp>
+    </p:spTree>
+  </p:cSld>
+  <p:clrMapOvr>
+    <a:masterClrMapping/>
+  </p:clrMapOvr>
+  <p:timing>
+    <p:tnLst>
+      <p:par>
+        <p:cTn id="1" dur="indefinite" restart="never" nodeType="tmRoot"/>
+      </p:par>
+    </p:tnLst>
+  </p:timing>
+</p:sld>
+</file>
+
+<file path=ppt/slides/slide15.xml><?xml version="1.0" encoding="utf-8"?>
 <p:sld xmlns:a="http://schemas.openxmlformats.org/drawingml/2006/main" xmlns:r="http://schemas.openxmlformats.org/officeDocument/2006/relationships" xmlns:mc="http://schemas.openxmlformats.org/markup-compatibility/2006" xmlns:mv="urn:schemas-microsoft-com:mac:vml" xmlns:p="http://schemas.openxmlformats.org/presentationml/2006/main" mc:Ignorable="mv" mc:PreserveAttributes="mv:*">
   <p:cSld>
     <p:spTree>
@@ -5424,7 +6886,7 @@
         </p:nvCxnSpPr>
         <p:spPr>
           <a:xfrm rot="16200000" flipV="1">
-            <a:off x="4010776" y="3243660"/>
+            <a:off x="3986035" y="3243660"/>
             <a:ext cx="753060" cy="2"/>
           </a:xfrm>
           <a:prstGeom prst="straightConnector1">
@@ -5464,7 +6926,7 @@
         </p:nvSpPr>
         <p:spPr>
           <a:xfrm rot="16200000">
-            <a:off x="3585585" y="4303024"/>
+            <a:off x="3560844" y="4303024"/>
             <a:ext cx="1553962" cy="369332"/>
           </a:xfrm>
           <a:prstGeom prst="rect">
@@ -6749,7 +8211,10 @@
                     <a:lstStyle/>
                     <a:p>
                       <a:pPr algn="ctr"/>
-                      <a:endParaRPr lang="en-US" sz="2000"/>
+                      <a:r>
+                        <a:rPr lang="en-US" sz="2000"/>
+                        <a:t>1 mW</a:t>
+                      </a:r>
                     </a:p>
                   </a:txBody>
                   <a:tcPr anchor="ctr">
@@ -6901,6 +8366,14 @@
                     <a:lstStyle/>
                     <a:p>
                       <a:pPr algn="ctr"/>
+                      <a:r>
+                        <a:rPr lang="en-US" sz="2000"/>
+                        <a:t>0.15 mm</a:t>
+                      </a:r>
+                      <a:r>
+                        <a:rPr lang="en-US" sz="2000" baseline="30000"/>
+                        <a:t>2</a:t>
+                      </a:r>
                       <a:endParaRPr lang="en-US" sz="2000"/>
                     </a:p>
                   </a:txBody>
@@ -6948,7 +8421,31 @@
                     <a:bodyPr/>
                     <a:lstStyle/>
                     <a:p>
-                      <a:pPr algn="ctr"/>
+                      <a:pPr marL="0" marR="0" indent="0" algn="ctr" defTabSz="457200" rtl="0" eaLnBrk="1" fontAlgn="auto" latinLnBrk="0" hangingPunct="1">
+                        <a:lnSpc>
+                          <a:spcPct val="100000"/>
+                        </a:lnSpc>
+                        <a:spcBef>
+                          <a:spcPts val="0"/>
+                        </a:spcBef>
+                        <a:spcAft>
+                          <a:spcPts val="0"/>
+                        </a:spcAft>
+                        <a:buClrTx/>
+                        <a:buSzTx/>
+                        <a:buFontTx/>
+                        <a:buNone/>
+                        <a:tabLst/>
+                        <a:defRPr/>
+                      </a:pPr>
+                      <a:r>
+                        <a:rPr lang="en-US" sz="2000"/>
+                        <a:t>&gt;&gt; 0.15 mm</a:t>
+                      </a:r>
+                      <a:r>
+                        <a:rPr lang="en-US" sz="2000" baseline="30000"/>
+                        <a:t>2</a:t>
+                      </a:r>
                       <a:endParaRPr lang="en-US" sz="2000"/>
                     </a:p>
                   </a:txBody>
@@ -7001,7 +8498,7 @@
                       <a:pPr algn="ctr"/>
                       <a:r>
                         <a:rPr lang="en-US" sz="2000"/>
-                        <a:t>Max. Input (+50 mV)</a:t>
+                        <a:t>Max. Input (+200 mV)</a:t>
                       </a:r>
                     </a:p>
                   </a:txBody>
@@ -7050,7 +8547,10 @@
                     <a:lstStyle/>
                     <a:p>
                       <a:pPr algn="ctr"/>
-                      <a:endParaRPr lang="en-US" sz="2000"/>
+                      <a:r>
+                        <a:rPr lang="en-US" sz="2000"/>
+                        <a:t>8 Volts</a:t>
+                      </a:r>
                     </a:p>
                   </a:txBody>
                   <a:tcPr anchor="ctr">
@@ -7158,7 +8658,7 @@
                       <a:pPr algn="ctr"/>
                       <a:r>
                         <a:rPr lang="en-US" sz="2000"/>
-                        <a:t>Min. Input (-50 mV)</a:t>
+                        <a:t>Min. Input (-200 mV)</a:t>
                       </a:r>
                     </a:p>
                   </a:txBody>
@@ -7207,7 +8707,10 @@
                     <a:lstStyle/>
                     <a:p>
                       <a:pPr algn="ctr"/>
-                      <a:endParaRPr lang="en-US" sz="2000"/>
+                      <a:r>
+                        <a:rPr lang="en-US" sz="2000"/>
+                        <a:t>12 Volts</a:t>
+                      </a:r>
                     </a:p>
                   </a:txBody>
                   <a:tcPr anchor="ctr">
@@ -8977,14 +10480,14 @@
                 <a:latin typeface="Helvetica Neue"/>
                 <a:cs typeface="Helvetica Neue"/>
               </a:rPr>
-              <a:t>Control System: PID</a:t>
+              <a:t>Control System: P</a:t>
             </a:r>
           </a:p>
         </p:txBody>
       </p:sp>
       <p:pic>
         <p:nvPicPr>
-          <p:cNvPr id="6" name="Picture 5" descr="reduced_schematic.png"/>
+          <p:cNvPr id="5" name="Picture 4" descr="Screen Shot 2013-04-09 at 6.13.05 PM.png"/>
           <p:cNvPicPr>
             <a:picLocks noChangeAspect="1"/>
           </p:cNvPicPr>
@@ -8998,8 +10501,8 @@
         </p:blipFill>
         <p:spPr>
           <a:xfrm>
-            <a:off x="379637" y="1522365"/>
-            <a:ext cx="8360671" cy="3262984"/>
+            <a:off x="336408" y="1576783"/>
+            <a:ext cx="8454108" cy="3132130"/>
           </a:xfrm>
           <a:prstGeom prst="rect">
             <a:avLst/>
@@ -9078,7 +10581,7 @@
         </p:blipFill>
         <p:spPr>
           <a:xfrm>
-            <a:off x="302766" y="3048772"/>
+            <a:off x="302766" y="2677670"/>
             <a:ext cx="8544774" cy="2133226"/>
           </a:xfrm>
           <a:prstGeom prst="rect">
@@ -9125,6 +10628,43 @@
                 <a:cs typeface="Helvetica Neue"/>
               </a:rPr>
               <a:t>Steady State Output</a:t>
+            </a:r>
+          </a:p>
+        </p:txBody>
+      </p:sp>
+      <p:sp>
+        <p:nvSpPr>
+          <p:cNvPr id="6" name="TextBox 5"/>
+          <p:cNvSpPr txBox="1"/>
+          <p:nvPr/>
+        </p:nvSpPr>
+        <p:spPr>
+          <a:xfrm>
+            <a:off x="2672068" y="1245222"/>
+            <a:ext cx="3529769" cy="830997"/>
+          </a:xfrm>
+          <a:prstGeom prst="rect">
+            <a:avLst/>
+          </a:prstGeom>
+          <a:noFill/>
+        </p:spPr>
+        <p:txBody>
+          <a:bodyPr wrap="square" rtlCol="0">
+            <a:spAutoFit/>
+          </a:bodyPr>
+          <a:lstStyle/>
+          <a:p>
+            <a:pPr algn="ctr"/>
+            <a:r>
+              <a:rPr lang="en-US" sz="2400"/>
+              <a:t>Given 10 Volt Input</a:t>
+            </a:r>
+          </a:p>
+          <a:p>
+            <a:pPr algn="ctr"/>
+            <a:r>
+              <a:rPr lang="en-US" sz="2400"/>
+              <a:t>Easily Produces 5V Output</a:t>
             </a:r>
           </a:p>
         </p:txBody>
@@ -9230,7 +10770,7 @@
       </p:sp>
       <p:pic>
         <p:nvPicPr>
-          <p:cNvPr id="6" name="Picture 5" descr="out.png"/>
+          <p:cNvPr id="8" name="Picture 7" descr="Screen Shot 2013-04-09 at 6.14.37 PM.png"/>
           <p:cNvPicPr>
             <a:picLocks noChangeAspect="1"/>
           </p:cNvPicPr>
@@ -9244,8 +10784,8 @@
         </p:blipFill>
         <p:spPr>
           <a:xfrm>
-            <a:off x="558863" y="1017713"/>
-            <a:ext cx="8014058" cy="4349296"/>
+            <a:off x="484992" y="984071"/>
+            <a:ext cx="8211164" cy="4444863"/>
           </a:xfrm>
           <a:prstGeom prst="rect">
             <a:avLst/>

</xml_diff>

<commit_message>
updates to april 11 presentation
</commit_message>
<xml_diff>
--- a/project/april_11/john.pptx
+++ b/project/april_11/john.pptx
@@ -20,6 +20,7 @@
     <p:sldId id="282" r:id="rId14"/>
     <p:sldId id="292" r:id="rId15"/>
     <p:sldId id="283" r:id="rId16"/>
+    <p:sldId id="293" r:id="rId17"/>
   </p:sldIdLst>
   <p:sldSz cx="9144000" cy="6858000" type="screen4x3"/>
   <p:notesSz cx="6858000" cy="9144000"/>
@@ -3438,7 +3439,7 @@
                 <a:latin typeface="Helvetica Neue"/>
                 <a:cs typeface="Helvetica Neue"/>
               </a:rPr>
-              <a:t>DC Sweep VREF</a:t>
+              <a:t>VREF Sweep: Create Many Outputs</a:t>
             </a:r>
           </a:p>
         </p:txBody>
@@ -5166,6 +5167,206 @@
 </file>
 
 <file path=ppt/slides/slide15.xml><?xml version="1.0" encoding="utf-8"?>
+<p:sld xmlns:a="http://schemas.openxmlformats.org/drawingml/2006/main" xmlns:r="http://schemas.openxmlformats.org/officeDocument/2006/relationships" xmlns:mc="http://schemas.openxmlformats.org/markup-compatibility/2006" xmlns:mv="urn:schemas-microsoft-com:mac:vml" xmlns:p="http://schemas.openxmlformats.org/presentationml/2006/main" mc:Ignorable="mv" mc:PreserveAttributes="mv:*">
+  <p:cSld>
+    <p:spTree>
+      <p:nvGrpSpPr>
+        <p:cNvPr id="1" name=""/>
+        <p:cNvGrpSpPr/>
+        <p:nvPr/>
+      </p:nvGrpSpPr>
+      <p:grpSpPr>
+        <a:xfrm>
+          <a:off x="0" y="0"/>
+          <a:ext cx="0" cy="0"/>
+          <a:chOff x="0" y="0"/>
+          <a:chExt cx="0" cy="0"/>
+        </a:xfrm>
+      </p:grpSpPr>
+      <p:pic>
+        <p:nvPicPr>
+          <p:cNvPr id="4" name="Picture 3" descr="blank.png"/>
+          <p:cNvPicPr>
+            <a:picLocks noChangeAspect="1"/>
+          </p:cNvPicPr>
+          <p:nvPr/>
+        </p:nvPicPr>
+        <p:blipFill>
+          <a:blip r:embed="rId2"/>
+          <a:stretch>
+            <a:fillRect/>
+          </a:stretch>
+        </p:blipFill>
+        <p:spPr>
+          <a:xfrm>
+            <a:off x="0" y="0"/>
+            <a:ext cx="9144001" cy="6858001"/>
+          </a:xfrm>
+          <a:prstGeom prst="rect">
+            <a:avLst/>
+          </a:prstGeom>
+        </p:spPr>
+      </p:pic>
+      <p:sp>
+        <p:nvSpPr>
+          <p:cNvPr id="3" name="TextBox 2"/>
+          <p:cNvSpPr txBox="1"/>
+          <p:nvPr/>
+        </p:nvSpPr>
+        <p:spPr>
+          <a:xfrm>
+            <a:off x="-1" y="0"/>
+            <a:ext cx="9144001" cy="646331"/>
+          </a:xfrm>
+          <a:prstGeom prst="rect">
+            <a:avLst/>
+          </a:prstGeom>
+          <a:noFill/>
+        </p:spPr>
+        <p:txBody>
+          <a:bodyPr wrap="square" rtlCol="0">
+            <a:spAutoFit/>
+          </a:bodyPr>
+          <a:lstStyle/>
+          <a:p>
+            <a:pPr algn="ctr"/>
+            <a:r>
+              <a:rPr lang="en-US" sz="3600" b="1">
+                <a:solidFill>
+                  <a:schemeClr val="bg1"/>
+                </a:solidFill>
+                <a:effectLst>
+                  <a:outerShdw blurRad="50800" dist="38100" dir="2700000">
+                    <a:srgbClr val="000000">
+                      <a:alpha val="43000"/>
+                    </a:srgbClr>
+                  </a:outerShdw>
+                </a:effectLst>
+                <a:latin typeface="Helvetica Neue"/>
+                <a:cs typeface="Helvetica Neue"/>
+              </a:rPr>
+              <a:t>TODO</a:t>
+            </a:r>
+          </a:p>
+        </p:txBody>
+      </p:sp>
+      <p:sp>
+        <p:nvSpPr>
+          <p:cNvPr id="6" name="TextBox 5"/>
+          <p:cNvSpPr txBox="1"/>
+          <p:nvPr/>
+        </p:nvSpPr>
+        <p:spPr>
+          <a:xfrm>
+            <a:off x="684507" y="1179257"/>
+            <a:ext cx="7950229" cy="4401205"/>
+          </a:xfrm>
+          <a:prstGeom prst="rect">
+            <a:avLst/>
+          </a:prstGeom>
+          <a:noFill/>
+        </p:spPr>
+        <p:txBody>
+          <a:bodyPr wrap="square" rtlCol="0">
+            <a:spAutoFit/>
+          </a:bodyPr>
+          <a:lstStyle/>
+          <a:p>
+            <a:r>
+              <a:rPr lang="en-US" sz="2800" b="1"/>
+              <a:t>(1) Loop Gain</a:t>
+            </a:r>
+          </a:p>
+          <a:p>
+            <a:pPr>
+              <a:buFont typeface="Arial"/>
+              <a:buChar char="•"/>
+            </a:pPr>
+            <a:r>
+              <a:rPr lang="en-US" sz="2800"/>
+              <a:t> Not very high, I need to figure out how to increase it</a:t>
+            </a:r>
+          </a:p>
+          <a:p>
+            <a:pPr>
+              <a:buFont typeface="Arial"/>
+              <a:buChar char="•"/>
+            </a:pPr>
+            <a:r>
+              <a:rPr lang="en-US" sz="2800"/>
+              <a:t> This will increase my noise rejection</a:t>
+            </a:r>
+          </a:p>
+          <a:p>
+            <a:r>
+              <a:rPr lang="en-US" sz="2800" b="1"/>
+              <a:t>(2) Power MOSFET Tuning</a:t>
+            </a:r>
+          </a:p>
+          <a:p>
+            <a:pPr>
+              <a:buFont typeface="Arial"/>
+              <a:buChar char="•"/>
+            </a:pPr>
+            <a:r>
+              <a:rPr lang="en-US" sz="2800"/>
+              <a:t> Currently using a single MOSFET with W/L = 1000</a:t>
+            </a:r>
+          </a:p>
+          <a:p>
+            <a:pPr>
+              <a:buFont typeface="Arial"/>
+              <a:buChar char="•"/>
+            </a:pPr>
+            <a:r>
+              <a:rPr lang="en-US" sz="2800"/>
+              <a:t> Will experiment with different sizes</a:t>
+            </a:r>
+          </a:p>
+          <a:p>
+            <a:r>
+              <a:rPr lang="en-US" sz="2800" b="1"/>
+              <a:t>(3) Decrease Loop Phase Margin</a:t>
+            </a:r>
+          </a:p>
+          <a:p>
+            <a:pPr>
+              <a:buFont typeface="Arial"/>
+              <a:buChar char="•"/>
+            </a:pPr>
+            <a:r>
+              <a:rPr lang="en-US" sz="2800"/>
+              <a:t> Faster Response, fairly overdamped currently</a:t>
+            </a:r>
+          </a:p>
+          <a:p>
+            <a:r>
+              <a:rPr lang="en-US" sz="2800" b="1"/>
+              <a:t>(4) Finish Layout</a:t>
+            </a:r>
+            <a:endParaRPr lang="en-US" sz="2800"/>
+          </a:p>
+          <a:p>
+            <a:endParaRPr lang="en-US" sz="2800"/>
+          </a:p>
+        </p:txBody>
+      </p:sp>
+    </p:spTree>
+  </p:cSld>
+  <p:clrMapOvr>
+    <a:masterClrMapping/>
+  </p:clrMapOvr>
+  <p:timing>
+    <p:tnLst>
+      <p:par>
+        <p:cTn id="1" dur="indefinite" restart="never" nodeType="tmRoot"/>
+      </p:par>
+    </p:tnLst>
+  </p:timing>
+</p:sld>
+</file>
+
+<file path=ppt/slides/slide16.xml><?xml version="1.0" encoding="utf-8"?>
 <p:sld xmlns:a="http://schemas.openxmlformats.org/drawingml/2006/main" xmlns:r="http://schemas.openxmlformats.org/officeDocument/2006/relationships" xmlns:mc="http://schemas.openxmlformats.org/markup-compatibility/2006" xmlns:mv="urn:schemas-microsoft-com:mac:vml" xmlns:p="http://schemas.openxmlformats.org/presentationml/2006/main" mc:Ignorable="mv" mc:PreserveAttributes="mv:*">
   <p:cSld>
     <p:spTree>
@@ -9273,7 +9474,7 @@
                 <a:latin typeface="Helvetica Neue"/>
                 <a:cs typeface="Helvetica Neue"/>
               </a:rPr>
-              <a:t>Control System: PID</a:t>
+              <a:t>First Control System Attempt: PID</a:t>
             </a:r>
           </a:p>
         </p:txBody>
@@ -10357,7 +10558,7 @@
                 <a:latin typeface="Helvetica Neue"/>
                 <a:cs typeface="Helvetica Neue"/>
               </a:rPr>
-              <a:t>Control System: PID</a:t>
+              <a:t>PID: Great Results, But Too Large</a:t>
             </a:r>
           </a:p>
         </p:txBody>
@@ -10480,7 +10681,7 @@
                 <a:latin typeface="Helvetica Neue"/>
                 <a:cs typeface="Helvetica Neue"/>
               </a:rPr>
-              <a:t>Control System: P</a:t>
+              <a:t>Reduce to P: Small Enough to Fab</a:t>
             </a:r>
           </a:p>
         </p:txBody>

</xml_diff>